<commit_message>
Ajout annexes pour présentation
</commit_message>
<xml_diff>
--- a/Soutenance/Diaporama soutenance.pptx
+++ b/Soutenance/Diaporama soutenance.pptx
@@ -4,12 +4,25 @@
   <p:sldMasterIdLst>
     <p:sldMasterId id="2147483648" r:id="rId1"/>
   </p:sldMasterIdLst>
+  <p:notesMasterIdLst>
+    <p:notesMasterId r:id="rId17"/>
+  </p:notesMasterIdLst>
   <p:sldIdLst>
-    <p:sldId id="265" r:id="rId2"/>
+    <p:sldId id="276" r:id="rId2"/>
     <p:sldId id="259" r:id="rId3"/>
     <p:sldId id="256" r:id="rId4"/>
     <p:sldId id="260" r:id="rId5"/>
     <p:sldId id="257" r:id="rId6"/>
+    <p:sldId id="266" r:id="rId7"/>
+    <p:sldId id="267" r:id="rId8"/>
+    <p:sldId id="268" r:id="rId9"/>
+    <p:sldId id="270" r:id="rId10"/>
+    <p:sldId id="273" r:id="rId11"/>
+    <p:sldId id="275" r:id="rId12"/>
+    <p:sldId id="274" r:id="rId13"/>
+    <p:sldId id="269" r:id="rId14"/>
+    <p:sldId id="271" r:id="rId15"/>
+    <p:sldId id="272" r:id="rId16"/>
   </p:sldIdLst>
   <p:sldSz cx="12192000" cy="6858000"/>
   <p:notesSz cx="6858000" cy="9144000"/>
@@ -116,6 +129,356 @@
 </p:presentation>
 </file>
 
+<file path=ppt/notesMasters/notesMaster1.xml><?xml version="1.0" encoding="utf-8"?>
+<p:notesMaster xmlns:a="http://schemas.openxmlformats.org/drawingml/2006/main" xmlns:r="http://schemas.openxmlformats.org/officeDocument/2006/relationships" xmlns:p="http://schemas.openxmlformats.org/presentationml/2006/main">
+  <p:cSld>
+    <p:bg>
+      <p:bgRef idx="1001">
+        <a:schemeClr val="bg1"/>
+      </p:bgRef>
+    </p:bg>
+    <p:spTree>
+      <p:nvGrpSpPr>
+        <p:cNvPr id="1" name=""/>
+        <p:cNvGrpSpPr/>
+        <p:nvPr/>
+      </p:nvGrpSpPr>
+      <p:grpSpPr>
+        <a:xfrm>
+          <a:off x="0" y="0"/>
+          <a:ext cx="0" cy="0"/>
+          <a:chOff x="0" y="0"/>
+          <a:chExt cx="0" cy="0"/>
+        </a:xfrm>
+      </p:grpSpPr>
+      <p:sp>
+        <p:nvSpPr>
+          <p:cNvPr id="2" name="Espace réservé de l'en-tête 1"/>
+          <p:cNvSpPr>
+            <a:spLocks noGrp="1"/>
+          </p:cNvSpPr>
+          <p:nvPr>
+            <p:ph type="hdr" sz="quarter"/>
+          </p:nvPr>
+        </p:nvSpPr>
+        <p:spPr>
+          <a:xfrm>
+            <a:off x="0" y="0"/>
+            <a:ext cx="2971800" cy="458788"/>
+          </a:xfrm>
+          <a:prstGeom prst="rect">
+            <a:avLst/>
+          </a:prstGeom>
+        </p:spPr>
+        <p:txBody>
+          <a:bodyPr vert="horz" lIns="91440" tIns="45720" rIns="91440" bIns="45720" rtlCol="0"/>
+          <a:lstStyle>
+            <a:lvl1pPr algn="l">
+              <a:defRPr sz="1200"/>
+            </a:lvl1pPr>
+          </a:lstStyle>
+          <a:p>
+            <a:endParaRPr lang="fr-FR"/>
+          </a:p>
+        </p:txBody>
+      </p:sp>
+      <p:sp>
+        <p:nvSpPr>
+          <p:cNvPr id="3" name="Espace réservé de la date 2"/>
+          <p:cNvSpPr>
+            <a:spLocks noGrp="1"/>
+          </p:cNvSpPr>
+          <p:nvPr>
+            <p:ph type="dt" idx="1"/>
+          </p:nvPr>
+        </p:nvSpPr>
+        <p:spPr>
+          <a:xfrm>
+            <a:off x="3884613" y="0"/>
+            <a:ext cx="2971800" cy="458788"/>
+          </a:xfrm>
+          <a:prstGeom prst="rect">
+            <a:avLst/>
+          </a:prstGeom>
+        </p:spPr>
+        <p:txBody>
+          <a:bodyPr vert="horz" lIns="91440" tIns="45720" rIns="91440" bIns="45720" rtlCol="0"/>
+          <a:lstStyle>
+            <a:lvl1pPr algn="r">
+              <a:defRPr sz="1200"/>
+            </a:lvl1pPr>
+          </a:lstStyle>
+          <a:p>
+            <a:fld id="{BB37FE4E-BDFC-4658-A143-980754432A1D}" type="datetimeFigureOut">
+              <a:rPr lang="fr-FR" smtClean="0"/>
+              <a:t>11/01/2021</a:t>
+            </a:fld>
+            <a:endParaRPr lang="fr-FR"/>
+          </a:p>
+        </p:txBody>
+      </p:sp>
+      <p:sp>
+        <p:nvSpPr>
+          <p:cNvPr id="4" name="Espace réservé de l'image des diapositives 3"/>
+          <p:cNvSpPr>
+            <a:spLocks noGrp="1" noRot="1" noChangeAspect="1"/>
+          </p:cNvSpPr>
+          <p:nvPr>
+            <p:ph type="sldImg" idx="2"/>
+          </p:nvPr>
+        </p:nvSpPr>
+        <p:spPr>
+          <a:xfrm>
+            <a:off x="685800" y="1143000"/>
+            <a:ext cx="5486400" cy="3086100"/>
+          </a:xfrm>
+          <a:prstGeom prst="rect">
+            <a:avLst/>
+          </a:prstGeom>
+          <a:noFill/>
+          <a:ln w="12700">
+            <a:solidFill>
+              <a:prstClr val="black"/>
+            </a:solidFill>
+          </a:ln>
+        </p:spPr>
+        <p:txBody>
+          <a:bodyPr vert="horz" lIns="91440" tIns="45720" rIns="91440" bIns="45720" rtlCol="0" anchor="ctr"/>
+          <a:lstStyle/>
+          <a:p>
+            <a:endParaRPr lang="fr-FR"/>
+          </a:p>
+        </p:txBody>
+      </p:sp>
+      <p:sp>
+        <p:nvSpPr>
+          <p:cNvPr id="5" name="Espace réservé des notes 4"/>
+          <p:cNvSpPr>
+            <a:spLocks noGrp="1"/>
+          </p:cNvSpPr>
+          <p:nvPr>
+            <p:ph type="body" sz="quarter" idx="3"/>
+          </p:nvPr>
+        </p:nvSpPr>
+        <p:spPr>
+          <a:xfrm>
+            <a:off x="685800" y="4400550"/>
+            <a:ext cx="5486400" cy="3600450"/>
+          </a:xfrm>
+          <a:prstGeom prst="rect">
+            <a:avLst/>
+          </a:prstGeom>
+        </p:spPr>
+        <p:txBody>
+          <a:bodyPr vert="horz" lIns="91440" tIns="45720" rIns="91440" bIns="45720" rtlCol="0"/>
+          <a:lstStyle/>
+          <a:p>
+            <a:pPr lvl="0"/>
+            <a:r>
+              <a:rPr lang="fr-FR" smtClean="0"/>
+              <a:t>Modifier les styles du texte du masque</a:t>
+            </a:r>
+          </a:p>
+          <a:p>
+            <a:pPr lvl="1"/>
+            <a:r>
+              <a:rPr lang="fr-FR" smtClean="0"/>
+              <a:t>Deuxième niveau</a:t>
+            </a:r>
+          </a:p>
+          <a:p>
+            <a:pPr lvl="2"/>
+            <a:r>
+              <a:rPr lang="fr-FR" smtClean="0"/>
+              <a:t>Troisième niveau</a:t>
+            </a:r>
+          </a:p>
+          <a:p>
+            <a:pPr lvl="3"/>
+            <a:r>
+              <a:rPr lang="fr-FR" smtClean="0"/>
+              <a:t>Quatrième niveau</a:t>
+            </a:r>
+          </a:p>
+          <a:p>
+            <a:pPr lvl="4"/>
+            <a:r>
+              <a:rPr lang="fr-FR" smtClean="0"/>
+              <a:t>Cinquième niveau</a:t>
+            </a:r>
+            <a:endParaRPr lang="fr-FR"/>
+          </a:p>
+        </p:txBody>
+      </p:sp>
+      <p:sp>
+        <p:nvSpPr>
+          <p:cNvPr id="6" name="Espace réservé du pied de page 5"/>
+          <p:cNvSpPr>
+            <a:spLocks noGrp="1"/>
+          </p:cNvSpPr>
+          <p:nvPr>
+            <p:ph type="ftr" sz="quarter" idx="4"/>
+          </p:nvPr>
+        </p:nvSpPr>
+        <p:spPr>
+          <a:xfrm>
+            <a:off x="0" y="8685213"/>
+            <a:ext cx="2971800" cy="458787"/>
+          </a:xfrm>
+          <a:prstGeom prst="rect">
+            <a:avLst/>
+          </a:prstGeom>
+        </p:spPr>
+        <p:txBody>
+          <a:bodyPr vert="horz" lIns="91440" tIns="45720" rIns="91440" bIns="45720" rtlCol="0" anchor="b"/>
+          <a:lstStyle>
+            <a:lvl1pPr algn="l">
+              <a:defRPr sz="1200"/>
+            </a:lvl1pPr>
+          </a:lstStyle>
+          <a:p>
+            <a:endParaRPr lang="fr-FR"/>
+          </a:p>
+        </p:txBody>
+      </p:sp>
+      <p:sp>
+        <p:nvSpPr>
+          <p:cNvPr id="7" name="Espace réservé du numéro de diapositive 6"/>
+          <p:cNvSpPr>
+            <a:spLocks noGrp="1"/>
+          </p:cNvSpPr>
+          <p:nvPr>
+            <p:ph type="sldNum" sz="quarter" idx="5"/>
+          </p:nvPr>
+        </p:nvSpPr>
+        <p:spPr>
+          <a:xfrm>
+            <a:off x="3884613" y="8685213"/>
+            <a:ext cx="2971800" cy="458787"/>
+          </a:xfrm>
+          <a:prstGeom prst="rect">
+            <a:avLst/>
+          </a:prstGeom>
+        </p:spPr>
+        <p:txBody>
+          <a:bodyPr vert="horz" lIns="91440" tIns="45720" rIns="91440" bIns="45720" rtlCol="0" anchor="b"/>
+          <a:lstStyle>
+            <a:lvl1pPr algn="r">
+              <a:defRPr sz="1200"/>
+            </a:lvl1pPr>
+          </a:lstStyle>
+          <a:p>
+            <a:fld id="{8287AD1E-D813-4B35-B4A2-A120DD6D183F}" type="slidenum">
+              <a:rPr lang="fr-FR" smtClean="0"/>
+              <a:t>‹N°›</a:t>
+            </a:fld>
+            <a:endParaRPr lang="fr-FR"/>
+          </a:p>
+        </p:txBody>
+      </p:sp>
+    </p:spTree>
+    <p:extLst>
+      <p:ext uri="{BB962C8B-B14F-4D97-AF65-F5344CB8AC3E}">
+        <p14:creationId xmlns:p14="http://schemas.microsoft.com/office/powerpoint/2010/main" val="773522261"/>
+      </p:ext>
+    </p:extLst>
+  </p:cSld>
+  <p:clrMap bg1="lt1" tx1="dk1" bg2="lt2" tx2="dk2" accent1="accent1" accent2="accent2" accent3="accent3" accent4="accent4" accent5="accent5" accent6="accent6" hlink="hlink" folHlink="folHlink"/>
+  <p:notesStyle>
+    <a:lvl1pPr marL="0" algn="l" defTabSz="914400" rtl="0" eaLnBrk="1" latinLnBrk="0" hangingPunct="1">
+      <a:defRPr sz="1200" kern="1200">
+        <a:solidFill>
+          <a:schemeClr val="tx1"/>
+        </a:solidFill>
+        <a:latin typeface="+mn-lt"/>
+        <a:ea typeface="+mn-ea"/>
+        <a:cs typeface="+mn-cs"/>
+      </a:defRPr>
+    </a:lvl1pPr>
+    <a:lvl2pPr marL="457200" algn="l" defTabSz="914400" rtl="0" eaLnBrk="1" latinLnBrk="0" hangingPunct="1">
+      <a:defRPr sz="1200" kern="1200">
+        <a:solidFill>
+          <a:schemeClr val="tx1"/>
+        </a:solidFill>
+        <a:latin typeface="+mn-lt"/>
+        <a:ea typeface="+mn-ea"/>
+        <a:cs typeface="+mn-cs"/>
+      </a:defRPr>
+    </a:lvl2pPr>
+    <a:lvl3pPr marL="914400" algn="l" defTabSz="914400" rtl="0" eaLnBrk="1" latinLnBrk="0" hangingPunct="1">
+      <a:defRPr sz="1200" kern="1200">
+        <a:solidFill>
+          <a:schemeClr val="tx1"/>
+        </a:solidFill>
+        <a:latin typeface="+mn-lt"/>
+        <a:ea typeface="+mn-ea"/>
+        <a:cs typeface="+mn-cs"/>
+      </a:defRPr>
+    </a:lvl3pPr>
+    <a:lvl4pPr marL="1371600" algn="l" defTabSz="914400" rtl="0" eaLnBrk="1" latinLnBrk="0" hangingPunct="1">
+      <a:defRPr sz="1200" kern="1200">
+        <a:solidFill>
+          <a:schemeClr val="tx1"/>
+        </a:solidFill>
+        <a:latin typeface="+mn-lt"/>
+        <a:ea typeface="+mn-ea"/>
+        <a:cs typeface="+mn-cs"/>
+      </a:defRPr>
+    </a:lvl4pPr>
+    <a:lvl5pPr marL="1828800" algn="l" defTabSz="914400" rtl="0" eaLnBrk="1" latinLnBrk="0" hangingPunct="1">
+      <a:defRPr sz="1200" kern="1200">
+        <a:solidFill>
+          <a:schemeClr val="tx1"/>
+        </a:solidFill>
+        <a:latin typeface="+mn-lt"/>
+        <a:ea typeface="+mn-ea"/>
+        <a:cs typeface="+mn-cs"/>
+      </a:defRPr>
+    </a:lvl5pPr>
+    <a:lvl6pPr marL="2286000" algn="l" defTabSz="914400" rtl="0" eaLnBrk="1" latinLnBrk="0" hangingPunct="1">
+      <a:defRPr sz="1200" kern="1200">
+        <a:solidFill>
+          <a:schemeClr val="tx1"/>
+        </a:solidFill>
+        <a:latin typeface="+mn-lt"/>
+        <a:ea typeface="+mn-ea"/>
+        <a:cs typeface="+mn-cs"/>
+      </a:defRPr>
+    </a:lvl6pPr>
+    <a:lvl7pPr marL="2743200" algn="l" defTabSz="914400" rtl="0" eaLnBrk="1" latinLnBrk="0" hangingPunct="1">
+      <a:defRPr sz="1200" kern="1200">
+        <a:solidFill>
+          <a:schemeClr val="tx1"/>
+        </a:solidFill>
+        <a:latin typeface="+mn-lt"/>
+        <a:ea typeface="+mn-ea"/>
+        <a:cs typeface="+mn-cs"/>
+      </a:defRPr>
+    </a:lvl7pPr>
+    <a:lvl8pPr marL="3200400" algn="l" defTabSz="914400" rtl="0" eaLnBrk="1" latinLnBrk="0" hangingPunct="1">
+      <a:defRPr sz="1200" kern="1200">
+        <a:solidFill>
+          <a:schemeClr val="tx1"/>
+        </a:solidFill>
+        <a:latin typeface="+mn-lt"/>
+        <a:ea typeface="+mn-ea"/>
+        <a:cs typeface="+mn-cs"/>
+      </a:defRPr>
+    </a:lvl8pPr>
+    <a:lvl9pPr marL="3657600" algn="l" defTabSz="914400" rtl="0" eaLnBrk="1" latinLnBrk="0" hangingPunct="1">
+      <a:defRPr sz="1200" kern="1200">
+        <a:solidFill>
+          <a:schemeClr val="tx1"/>
+        </a:solidFill>
+        <a:latin typeface="+mn-lt"/>
+        <a:ea typeface="+mn-ea"/>
+        <a:cs typeface="+mn-cs"/>
+      </a:defRPr>
+    </a:lvl9pPr>
+  </p:notesStyle>
+</p:notesMaster>
+</file>
+
 <file path=ppt/slideLayouts/slideLayout1.xml><?xml version="1.0" encoding="utf-8"?>
 <p:sldLayout xmlns:a="http://schemas.openxmlformats.org/drawingml/2006/main" xmlns:r="http://schemas.openxmlformats.org/officeDocument/2006/relationships" xmlns:p="http://schemas.openxmlformats.org/presentationml/2006/main" type="title" preserve="1">
   <p:cSld name="Diapositive de titre">
@@ -261,9 +624,9 @@
           <a:bodyPr/>
           <a:lstStyle/>
           <a:p>
-            <a:fld id="{7B29DE73-DF9C-404E-B3B2-AD9CF44B3A42}" type="datetimeFigureOut">
+            <a:fld id="{532671B3-BBF1-4F1B-9872-014DD00A38C4}" type="datetime1">
               <a:rPr lang="fr-FR" smtClean="0"/>
-              <a:t>08/01/2021</a:t>
+              <a:t>11/01/2021</a:t>
             </a:fld>
             <a:endParaRPr lang="fr-FR"/>
           </a:p>
@@ -459,9 +822,9 @@
           <a:bodyPr/>
           <a:lstStyle/>
           <a:p>
-            <a:fld id="{7B29DE73-DF9C-404E-B3B2-AD9CF44B3A42}" type="datetimeFigureOut">
+            <a:fld id="{CB013246-8A02-4883-98A1-0C44042449B6}" type="datetime1">
               <a:rPr lang="fr-FR" smtClean="0"/>
-              <a:t>08/01/2021</a:t>
+              <a:t>11/01/2021</a:t>
             </a:fld>
             <a:endParaRPr lang="fr-FR"/>
           </a:p>
@@ -667,9 +1030,9 @@
           <a:bodyPr/>
           <a:lstStyle/>
           <a:p>
-            <a:fld id="{7B29DE73-DF9C-404E-B3B2-AD9CF44B3A42}" type="datetimeFigureOut">
+            <a:fld id="{2754B2FC-0EA2-4C92-9113-9051C0391890}" type="datetime1">
               <a:rPr lang="fr-FR" smtClean="0"/>
-              <a:t>08/01/2021</a:t>
+              <a:t>11/01/2021</a:t>
             </a:fld>
             <a:endParaRPr lang="fr-FR"/>
           </a:p>
@@ -865,9 +1228,9 @@
           <a:bodyPr/>
           <a:lstStyle/>
           <a:p>
-            <a:fld id="{7B29DE73-DF9C-404E-B3B2-AD9CF44B3A42}" type="datetimeFigureOut">
+            <a:fld id="{A28C7E96-FF72-4820-B8FD-D2293A20729D}" type="datetime1">
               <a:rPr lang="fr-FR" smtClean="0"/>
-              <a:t>08/01/2021</a:t>
+              <a:t>11/01/2021</a:t>
             </a:fld>
             <a:endParaRPr lang="fr-FR"/>
           </a:p>
@@ -1140,9 +1503,9 @@
           <a:bodyPr/>
           <a:lstStyle/>
           <a:p>
-            <a:fld id="{7B29DE73-DF9C-404E-B3B2-AD9CF44B3A42}" type="datetimeFigureOut">
+            <a:fld id="{04D6765C-484A-4F20-8513-C0921D8879B5}" type="datetime1">
               <a:rPr lang="fr-FR" smtClean="0"/>
-              <a:t>08/01/2021</a:t>
+              <a:t>11/01/2021</a:t>
             </a:fld>
             <a:endParaRPr lang="fr-FR"/>
           </a:p>
@@ -1405,9 +1768,9 @@
           <a:bodyPr/>
           <a:lstStyle/>
           <a:p>
-            <a:fld id="{7B29DE73-DF9C-404E-B3B2-AD9CF44B3A42}" type="datetimeFigureOut">
+            <a:fld id="{D6E58875-16B3-46DF-B5F8-DED33905D277}" type="datetime1">
               <a:rPr lang="fr-FR" smtClean="0"/>
-              <a:t>08/01/2021</a:t>
+              <a:t>11/01/2021</a:t>
             </a:fld>
             <a:endParaRPr lang="fr-FR"/>
           </a:p>
@@ -1817,9 +2180,9 @@
           <a:bodyPr/>
           <a:lstStyle/>
           <a:p>
-            <a:fld id="{7B29DE73-DF9C-404E-B3B2-AD9CF44B3A42}" type="datetimeFigureOut">
+            <a:fld id="{E4FD66E8-45C9-401B-B4AF-BA151BF897A7}" type="datetime1">
               <a:rPr lang="fr-FR" smtClean="0"/>
-              <a:t>08/01/2021</a:t>
+              <a:t>11/01/2021</a:t>
             </a:fld>
             <a:endParaRPr lang="fr-FR"/>
           </a:p>
@@ -1958,9 +2321,9 @@
           <a:bodyPr/>
           <a:lstStyle/>
           <a:p>
-            <a:fld id="{7B29DE73-DF9C-404E-B3B2-AD9CF44B3A42}" type="datetimeFigureOut">
+            <a:fld id="{2C90D6E2-414C-40A1-9E78-B4F718CCF9DF}" type="datetime1">
               <a:rPr lang="fr-FR" smtClean="0"/>
-              <a:t>08/01/2021</a:t>
+              <a:t>11/01/2021</a:t>
             </a:fld>
             <a:endParaRPr lang="fr-FR"/>
           </a:p>
@@ -2071,9 +2434,9 @@
           <a:bodyPr/>
           <a:lstStyle/>
           <a:p>
-            <a:fld id="{7B29DE73-DF9C-404E-B3B2-AD9CF44B3A42}" type="datetimeFigureOut">
+            <a:fld id="{E4BD776A-4E68-458E-8545-6DDFECAF07F8}" type="datetime1">
               <a:rPr lang="fr-FR" smtClean="0"/>
-              <a:t>08/01/2021</a:t>
+              <a:t>11/01/2021</a:t>
             </a:fld>
             <a:endParaRPr lang="fr-FR"/>
           </a:p>
@@ -2382,9 +2745,9 @@
           <a:bodyPr/>
           <a:lstStyle/>
           <a:p>
-            <a:fld id="{7B29DE73-DF9C-404E-B3B2-AD9CF44B3A42}" type="datetimeFigureOut">
+            <a:fld id="{75F3563C-E2D2-4B56-9A5D-AFC36D77BFF1}" type="datetime1">
               <a:rPr lang="fr-FR" smtClean="0"/>
-              <a:t>08/01/2021</a:t>
+              <a:t>11/01/2021</a:t>
             </a:fld>
             <a:endParaRPr lang="fr-FR"/>
           </a:p>
@@ -2670,9 +3033,9 @@
           <a:bodyPr/>
           <a:lstStyle/>
           <a:p>
-            <a:fld id="{7B29DE73-DF9C-404E-B3B2-AD9CF44B3A42}" type="datetimeFigureOut">
+            <a:fld id="{CB94E930-B493-4395-8195-A9F27F433C32}" type="datetime1">
               <a:rPr lang="fr-FR" smtClean="0"/>
-              <a:t>08/01/2021</a:t>
+              <a:t>11/01/2021</a:t>
             </a:fld>
             <a:endParaRPr lang="fr-FR"/>
           </a:p>
@@ -2911,9 +3274,9 @@
             </a:lvl1pPr>
           </a:lstStyle>
           <a:p>
-            <a:fld id="{7B29DE73-DF9C-404E-B3B2-AD9CF44B3A42}" type="datetimeFigureOut">
+            <a:fld id="{CC343135-F2A1-4B47-9F59-97AB1321E09E}" type="datetime1">
               <a:rPr lang="fr-FR" smtClean="0"/>
-              <a:t>08/01/2021</a:t>
+              <a:t>11/01/2021</a:t>
             </a:fld>
             <a:endParaRPr lang="fr-FR"/>
           </a:p>
@@ -3030,6 +3393,7 @@
     <p:sldLayoutId id="2147483658" r:id="rId10"/>
     <p:sldLayoutId id="2147483659" r:id="rId11"/>
   </p:sldLayoutIdLst>
+  <p:hf hdr="0" ftr="0" dt="0"/>
   <p:txStyles>
     <p:titleStyle>
       <a:lvl1pPr algn="l" defTabSz="914400" rtl="0" eaLnBrk="1" latinLnBrk="0" hangingPunct="1">
@@ -3330,65 +3694,9 @@
           <a:chExt cx="0" cy="0"/>
         </a:xfrm>
       </p:grpSpPr>
-      <p:sp>
-        <p:nvSpPr>
-          <p:cNvPr id="2" name="Titre 1">
-            <a:extLst>
-              <a:ext uri="{FF2B5EF4-FFF2-40B4-BE49-F238E27FC236}">
-                <a16:creationId xmlns:a16="http://schemas.microsoft.com/office/drawing/2014/main" id="{B0B2BB48-4D4D-4CF7-ADC3-968B4EADEECA}"/>
-              </a:ext>
-            </a:extLst>
-          </p:cNvPr>
-          <p:cNvSpPr>
-            <a:spLocks noGrp="1"/>
-          </p:cNvSpPr>
-          <p:nvPr>
-            <p:ph type="title"/>
-          </p:nvPr>
-        </p:nvSpPr>
-        <p:spPr/>
-        <p:txBody>
-          <a:bodyPr/>
-          <a:lstStyle/>
-          <a:p>
-            <a:endParaRPr lang="fr-FR"/>
-          </a:p>
-        </p:txBody>
-      </p:sp>
-      <p:sp>
-        <p:nvSpPr>
-          <p:cNvPr id="3" name="Espace réservé du contenu 2">
-            <a:extLst>
-              <a:ext uri="{FF2B5EF4-FFF2-40B4-BE49-F238E27FC236}">
-                <a16:creationId xmlns:a16="http://schemas.microsoft.com/office/drawing/2014/main" id="{E7A51406-B08A-4281-9385-C72EA5CC1903}"/>
-              </a:ext>
-            </a:extLst>
-          </p:cNvPr>
-          <p:cNvSpPr>
-            <a:spLocks noGrp="1"/>
-          </p:cNvSpPr>
-          <p:nvPr>
-            <p:ph idx="1"/>
-          </p:nvPr>
-        </p:nvSpPr>
-        <p:spPr/>
-        <p:txBody>
-          <a:bodyPr/>
-          <a:lstStyle/>
-          <a:p>
-            <a:endParaRPr lang="fr-FR"/>
-          </a:p>
-        </p:txBody>
-      </p:sp>
       <p:pic>
         <p:nvPicPr>
-          <p:cNvPr id="4" name="Image 3">
-            <a:extLst>
-              <a:ext uri="{FF2B5EF4-FFF2-40B4-BE49-F238E27FC236}">
-                <a16:creationId xmlns:a16="http://schemas.microsoft.com/office/drawing/2014/main" id="{99E71875-2BC2-46AC-B7E9-BD68E4F193B7}"/>
-              </a:ext>
-            </a:extLst>
-          </p:cNvPr>
+          <p:cNvPr id="6" name="Image 5"/>
           <p:cNvPicPr>
             <a:picLocks noChangeAspect="1"/>
           </p:cNvPicPr>
@@ -3396,23 +3704,1319 @@
         </p:nvPicPr>
         <p:blipFill rotWithShape="1">
           <a:blip r:embed="rId2"/>
-          <a:srcRect t="634" r="287"/>
+          <a:srcRect r="23414" b="14640"/>
           <a:stretch/>
         </p:blipFill>
         <p:spPr>
           <a:xfrm>
-            <a:off x="-36425" y="0"/>
-            <a:ext cx="12228426" cy="6858000"/>
+            <a:off x="0" y="0"/>
+            <a:ext cx="12192000" cy="6858000"/>
           </a:xfrm>
           <a:prstGeom prst="rect">
             <a:avLst/>
           </a:prstGeom>
+        </p:spPr>
+      </p:pic>
+      <p:sp>
+        <p:nvSpPr>
+          <p:cNvPr id="2" name="Titre 1">
+            <a:extLst>
+              <a:ext uri="{FF2B5EF4-FFF2-40B4-BE49-F238E27FC236}">
+                <a16:creationId xmlns:a16="http://schemas.microsoft.com/office/drawing/2014/main" id="{FD54377E-02B4-4BD1-A987-59D0EFD8F68E}"/>
+              </a:ext>
+            </a:extLst>
+          </p:cNvPr>
+          <p:cNvSpPr>
+            <a:spLocks noGrp="1"/>
+          </p:cNvSpPr>
+          <p:nvPr>
+            <p:ph type="ctrTitle"/>
+          </p:nvPr>
+        </p:nvSpPr>
+        <p:spPr>
+          <a:xfrm>
+            <a:off x="7315200" y="970548"/>
+            <a:ext cx="4676274" cy="2889114"/>
+          </a:xfrm>
+        </p:spPr>
+        <p:txBody>
+          <a:bodyPr anchor="b">
+            <a:noAutofit/>
+          </a:bodyPr>
+          <a:lstStyle/>
+          <a:p>
+            <a:pPr algn="r"/>
+            <a:r>
+              <a:rPr lang="fr-FR" dirty="0">
+                <a:solidFill>
+                  <a:schemeClr val="accent4"/>
+                </a:solidFill>
+                <a:latin typeface="+mn-lt"/>
+              </a:rPr>
+              <a:t>Visite virtuelle de l’IUT et Générateur de panorama</a:t>
+            </a:r>
+            <a:endParaRPr lang="fr-FR" dirty="0">
+              <a:latin typeface="+mn-lt"/>
+            </a:endParaRPr>
+          </a:p>
+        </p:txBody>
+      </p:sp>
+      <p:sp>
+        <p:nvSpPr>
+          <p:cNvPr id="3" name="Sous-titre 2">
+            <a:extLst>
+              <a:ext uri="{FF2B5EF4-FFF2-40B4-BE49-F238E27FC236}">
+                <a16:creationId xmlns:a16="http://schemas.microsoft.com/office/drawing/2014/main" id="{CECFBC4E-594C-49AC-B6A5-4A01BA1F80BA}"/>
+              </a:ext>
+            </a:extLst>
+          </p:cNvPr>
+          <p:cNvSpPr>
+            <a:spLocks noGrp="1"/>
+          </p:cNvSpPr>
+          <p:nvPr>
+            <p:ph type="subTitle" idx="1"/>
+          </p:nvPr>
+        </p:nvSpPr>
+        <p:spPr>
+          <a:xfrm>
+            <a:off x="7904169" y="4129261"/>
+            <a:ext cx="4087305" cy="2018875"/>
+          </a:xfrm>
+        </p:spPr>
+        <p:txBody>
+          <a:bodyPr anchor="t">
+            <a:normAutofit fontScale="77500" lnSpcReduction="20000"/>
+          </a:bodyPr>
+          <a:lstStyle/>
+          <a:p>
+            <a:pPr algn="r"/>
+            <a:endParaRPr lang="fr-FR" sz="2000" dirty="0">
+              <a:solidFill>
+                <a:schemeClr val="accent4">
+                  <a:lumMod val="60000"/>
+                  <a:lumOff val="40000"/>
+                </a:schemeClr>
+              </a:solidFill>
+            </a:endParaRPr>
+          </a:p>
+          <a:p>
+            <a:pPr algn="r"/>
+            <a:r>
+              <a:rPr lang="fr-FR" sz="2600" dirty="0">
+                <a:solidFill>
+                  <a:schemeClr val="accent4"/>
+                </a:solidFill>
+              </a:rPr>
+              <a:t>Lucile Velut</a:t>
+            </a:r>
+          </a:p>
+          <a:p>
+            <a:pPr algn="r"/>
+            <a:r>
+              <a:rPr lang="fr-FR" sz="2600" dirty="0">
+                <a:solidFill>
+                  <a:schemeClr val="accent4"/>
+                </a:solidFill>
+              </a:rPr>
+              <a:t>Clara Poncet-Taberlet</a:t>
+            </a:r>
+          </a:p>
+          <a:p>
+            <a:pPr algn="r"/>
+            <a:r>
+              <a:rPr lang="fr-FR" sz="2600" dirty="0">
+                <a:solidFill>
+                  <a:schemeClr val="accent4"/>
+                </a:solidFill>
+              </a:rPr>
+              <a:t>Enzo Mazella</a:t>
+            </a:r>
+          </a:p>
+          <a:p>
+            <a:pPr algn="r"/>
+            <a:r>
+              <a:rPr lang="fr-FR" sz="2600" dirty="0">
+                <a:solidFill>
+                  <a:schemeClr val="accent4"/>
+                </a:solidFill>
+              </a:rPr>
+              <a:t>Victor Mommalier</a:t>
+            </a:r>
+          </a:p>
+          <a:p>
+            <a:pPr algn="r"/>
+            <a:r>
+              <a:rPr lang="fr-FR" sz="2600" dirty="0">
+                <a:solidFill>
+                  <a:schemeClr val="accent4"/>
+                </a:solidFill>
+              </a:rPr>
+              <a:t>Clément Ferrere</a:t>
+            </a:r>
+          </a:p>
+        </p:txBody>
+      </p:sp>
+      <p:pic>
+        <p:nvPicPr>
+          <p:cNvPr id="5" name="Image 4">
+            <a:extLst>
+              <a:ext uri="{FF2B5EF4-FFF2-40B4-BE49-F238E27FC236}">
+                <a16:creationId xmlns:a16="http://schemas.microsoft.com/office/drawing/2014/main" id="{7C1B7BF9-50FD-4B80-A9EC-C299EF0CA9ED}"/>
+              </a:ext>
+            </a:extLst>
+          </p:cNvPr>
+          <p:cNvPicPr>
+            <a:picLocks noChangeAspect="1"/>
+          </p:cNvPicPr>
+          <p:nvPr/>
+        </p:nvPicPr>
+        <p:blipFill rotWithShape="1">
+          <a:blip r:embed="rId3">
+            <a:extLst>
+              <a:ext uri="{28A0092B-C50C-407E-A947-70E740481C1C}">
+                <a14:useLocalDpi xmlns:a14="http://schemas.microsoft.com/office/drawing/2010/main" val="0"/>
+              </a:ext>
+            </a:extLst>
+          </a:blip>
+          <a:srcRect l="20298" r="13855" b="1"/>
+          <a:stretch/>
+        </p:blipFill>
+        <p:spPr>
+          <a:xfrm>
+            <a:off x="1" y="10"/>
+            <a:ext cx="7028495" cy="6857990"/>
+          </a:xfrm>
+          <a:custGeom>
+            <a:avLst/>
+            <a:gdLst/>
+            <a:ahLst/>
+            <a:cxnLst/>
+            <a:rect l="l" t="t" r="r" b="b"/>
+            <a:pathLst>
+              <a:path w="7028495" h="6858000">
+                <a:moveTo>
+                  <a:pt x="0" y="0"/>
+                </a:moveTo>
+                <a:lnTo>
+                  <a:pt x="6915668" y="0"/>
+                </a:lnTo>
+                <a:lnTo>
+                  <a:pt x="6952411" y="219663"/>
+                </a:lnTo>
+                <a:cubicBezTo>
+                  <a:pt x="7002551" y="569921"/>
+                  <a:pt x="7028495" y="927986"/>
+                  <a:pt x="7028495" y="1292112"/>
+                </a:cubicBezTo>
+                <a:cubicBezTo>
+                  <a:pt x="7028495" y="3343346"/>
+                  <a:pt x="6205186" y="5202289"/>
+                  <a:pt x="4870994" y="6556512"/>
+                </a:cubicBezTo>
+                <a:lnTo>
+                  <a:pt x="4556185" y="6858000"/>
+                </a:lnTo>
+                <a:lnTo>
+                  <a:pt x="0" y="6858000"/>
+                </a:lnTo>
+                <a:close/>
+              </a:path>
+            </a:pathLst>
+          </a:custGeom>
         </p:spPr>
       </p:pic>
     </p:spTree>
     <p:extLst>
       <p:ext uri="{BB962C8B-B14F-4D97-AF65-F5344CB8AC3E}">
-        <p14:creationId xmlns:p14="http://schemas.microsoft.com/office/powerpoint/2010/main" val="4164950890"/>
+        <p14:creationId xmlns:p14="http://schemas.microsoft.com/office/powerpoint/2010/main" val="1154796879"/>
+      </p:ext>
+    </p:extLst>
+  </p:cSld>
+  <p:clrMapOvr>
+    <a:masterClrMapping/>
+  </p:clrMapOvr>
+</p:sld>
+</file>
+
+<file path=ppt/slides/slide10.xml><?xml version="1.0" encoding="utf-8"?>
+<p:sld xmlns:a="http://schemas.openxmlformats.org/drawingml/2006/main" xmlns:r="http://schemas.openxmlformats.org/officeDocument/2006/relationships" xmlns:p="http://schemas.openxmlformats.org/presentationml/2006/main">
+  <p:cSld>
+    <p:spTree>
+      <p:nvGrpSpPr>
+        <p:cNvPr id="1" name=""/>
+        <p:cNvGrpSpPr/>
+        <p:nvPr/>
+      </p:nvGrpSpPr>
+      <p:grpSpPr>
+        <a:xfrm>
+          <a:off x="0" y="0"/>
+          <a:ext cx="0" cy="0"/>
+          <a:chOff x="0" y="0"/>
+          <a:chExt cx="0" cy="0"/>
+        </a:xfrm>
+      </p:grpSpPr>
+      <p:pic>
+        <p:nvPicPr>
+          <p:cNvPr id="6" name="Image 5"/>
+          <p:cNvPicPr>
+            <a:picLocks noChangeAspect="1"/>
+          </p:cNvPicPr>
+          <p:nvPr/>
+        </p:nvPicPr>
+        <p:blipFill rotWithShape="1">
+          <a:blip r:embed="rId2"/>
+          <a:srcRect r="23414" b="14640"/>
+          <a:stretch/>
+        </p:blipFill>
+        <p:spPr>
+          <a:xfrm>
+            <a:off x="0" y="0"/>
+            <a:ext cx="12192000" cy="6858000"/>
+          </a:xfrm>
+          <a:prstGeom prst="rect">
+            <a:avLst/>
+          </a:prstGeom>
+        </p:spPr>
+      </p:pic>
+      <p:sp>
+        <p:nvSpPr>
+          <p:cNvPr id="5" name="Espace réservé du numéro de diapositive 4"/>
+          <p:cNvSpPr>
+            <a:spLocks noGrp="1"/>
+          </p:cNvSpPr>
+          <p:nvPr>
+            <p:ph type="sldNum" sz="quarter" idx="12"/>
+          </p:nvPr>
+        </p:nvSpPr>
+        <p:spPr/>
+        <p:txBody>
+          <a:bodyPr/>
+          <a:lstStyle/>
+          <a:p>
+            <a:fld id="{88DFB1D4-2421-4D0B-B32A-595002F349BD}" type="slidenum">
+              <a:rPr lang="fr-FR" smtClean="0"/>
+              <a:t>10</a:t>
+            </a:fld>
+            <a:endParaRPr lang="fr-FR"/>
+          </a:p>
+        </p:txBody>
+      </p:sp>
+      <p:sp>
+        <p:nvSpPr>
+          <p:cNvPr id="8" name="Titre 1">
+            <a:extLst>
+              <a:ext uri="{FF2B5EF4-FFF2-40B4-BE49-F238E27FC236}">
+                <a16:creationId xmlns:a16="http://schemas.microsoft.com/office/drawing/2014/main" id="{1E93D889-9138-4324-B692-3587155996A7}"/>
+              </a:ext>
+            </a:extLst>
+          </p:cNvPr>
+          <p:cNvSpPr>
+            <a:spLocks noGrp="1"/>
+          </p:cNvSpPr>
+          <p:nvPr>
+            <p:ph type="title"/>
+          </p:nvPr>
+        </p:nvSpPr>
+        <p:spPr>
+          <a:xfrm>
+            <a:off x="-3" y="425193"/>
+            <a:ext cx="12192000" cy="1134090"/>
+          </a:xfrm>
+        </p:spPr>
+        <p:txBody>
+          <a:bodyPr vert="horz" lIns="91440" tIns="45720" rIns="91440" bIns="45720" rtlCol="0" anchor="b">
+            <a:normAutofit/>
+          </a:bodyPr>
+          <a:lstStyle/>
+          <a:p>
+            <a:pPr algn="ctr">
+              <a:spcAft>
+                <a:spcPts val="600"/>
+              </a:spcAft>
+            </a:pPr>
+            <a:r>
+              <a:rPr lang="en-US" sz="6000" dirty="0" smtClean="0">
+                <a:solidFill>
+                  <a:schemeClr val="accent4"/>
+                </a:solidFill>
+                <a:latin typeface="+mn-lt"/>
+                <a:ea typeface="+mn-ea"/>
+                <a:cs typeface="+mn-cs"/>
+              </a:rPr>
+              <a:t>ANALYSE DU GENERATEUR</a:t>
+            </a:r>
+            <a:endParaRPr lang="en-US" sz="6000" dirty="0">
+              <a:solidFill>
+                <a:schemeClr val="accent4"/>
+              </a:solidFill>
+              <a:latin typeface="+mn-lt"/>
+              <a:ea typeface="+mn-ea"/>
+              <a:cs typeface="+mn-cs"/>
+            </a:endParaRPr>
+          </a:p>
+        </p:txBody>
+      </p:sp>
+      <p:sp>
+        <p:nvSpPr>
+          <p:cNvPr id="12" name="ZoneTexte 11"/>
+          <p:cNvSpPr txBox="1"/>
+          <p:nvPr/>
+        </p:nvSpPr>
+        <p:spPr>
+          <a:xfrm>
+            <a:off x="1902289" y="6174154"/>
+            <a:ext cx="8387419" cy="382954"/>
+          </a:xfrm>
+          <a:prstGeom prst="rect">
+            <a:avLst/>
+          </a:prstGeom>
+          <a:noFill/>
+        </p:spPr>
+        <p:txBody>
+          <a:bodyPr wrap="square" rtlCol="0">
+            <a:spAutoFit/>
+          </a:bodyPr>
+          <a:lstStyle/>
+          <a:p>
+            <a:pPr algn="ctr"/>
+            <a:r>
+              <a:rPr lang="fr-FR" i="1" dirty="0" smtClean="0">
+                <a:solidFill>
+                  <a:schemeClr val="bg1"/>
+                </a:solidFill>
+              </a:rPr>
+              <a:t>Diagramme de cas d’utilisation</a:t>
+            </a:r>
+            <a:endParaRPr lang="fr-FR" i="1" dirty="0">
+              <a:solidFill>
+                <a:schemeClr val="bg1"/>
+              </a:solidFill>
+            </a:endParaRPr>
+          </a:p>
+        </p:txBody>
+      </p:sp>
+      <p:pic>
+        <p:nvPicPr>
+          <p:cNvPr id="7" name="Image 6"/>
+          <p:cNvPicPr/>
+          <p:nvPr/>
+        </p:nvPicPr>
+        <p:blipFill>
+          <a:blip r:embed="rId3"/>
+          <a:stretch>
+            <a:fillRect/>
+          </a:stretch>
+        </p:blipFill>
+        <p:spPr>
+          <a:xfrm>
+            <a:off x="2295829" y="1741479"/>
+            <a:ext cx="7611915" cy="4131783"/>
+          </a:xfrm>
+          <a:prstGeom prst="rect">
+            <a:avLst/>
+          </a:prstGeom>
+        </p:spPr>
+      </p:pic>
+    </p:spTree>
+    <p:extLst>
+      <p:ext uri="{BB962C8B-B14F-4D97-AF65-F5344CB8AC3E}">
+        <p14:creationId xmlns:p14="http://schemas.microsoft.com/office/powerpoint/2010/main" val="1010072567"/>
+      </p:ext>
+    </p:extLst>
+  </p:cSld>
+  <p:clrMapOvr>
+    <a:masterClrMapping/>
+  </p:clrMapOvr>
+</p:sld>
+</file>
+
+<file path=ppt/slides/slide11.xml><?xml version="1.0" encoding="utf-8"?>
+<p:sld xmlns:a="http://schemas.openxmlformats.org/drawingml/2006/main" xmlns:r="http://schemas.openxmlformats.org/officeDocument/2006/relationships" xmlns:p="http://schemas.openxmlformats.org/presentationml/2006/main">
+  <p:cSld>
+    <p:spTree>
+      <p:nvGrpSpPr>
+        <p:cNvPr id="1" name=""/>
+        <p:cNvGrpSpPr/>
+        <p:nvPr/>
+      </p:nvGrpSpPr>
+      <p:grpSpPr>
+        <a:xfrm>
+          <a:off x="0" y="0"/>
+          <a:ext cx="0" cy="0"/>
+          <a:chOff x="0" y="0"/>
+          <a:chExt cx="0" cy="0"/>
+        </a:xfrm>
+      </p:grpSpPr>
+      <p:pic>
+        <p:nvPicPr>
+          <p:cNvPr id="6" name="Image 5"/>
+          <p:cNvPicPr>
+            <a:picLocks noChangeAspect="1"/>
+          </p:cNvPicPr>
+          <p:nvPr/>
+        </p:nvPicPr>
+        <p:blipFill rotWithShape="1">
+          <a:blip r:embed="rId2"/>
+          <a:srcRect r="23414" b="14640"/>
+          <a:stretch/>
+        </p:blipFill>
+        <p:spPr>
+          <a:xfrm>
+            <a:off x="0" y="0"/>
+            <a:ext cx="12192000" cy="6858000"/>
+          </a:xfrm>
+          <a:prstGeom prst="rect">
+            <a:avLst/>
+          </a:prstGeom>
+        </p:spPr>
+      </p:pic>
+      <p:sp>
+        <p:nvSpPr>
+          <p:cNvPr id="5" name="Espace réservé du numéro de diapositive 4"/>
+          <p:cNvSpPr>
+            <a:spLocks noGrp="1"/>
+          </p:cNvSpPr>
+          <p:nvPr>
+            <p:ph type="sldNum" sz="quarter" idx="12"/>
+          </p:nvPr>
+        </p:nvSpPr>
+        <p:spPr/>
+        <p:txBody>
+          <a:bodyPr/>
+          <a:lstStyle/>
+          <a:p>
+            <a:fld id="{88DFB1D4-2421-4D0B-B32A-595002F349BD}" type="slidenum">
+              <a:rPr lang="fr-FR" smtClean="0"/>
+              <a:t>11</a:t>
+            </a:fld>
+            <a:endParaRPr lang="fr-FR"/>
+          </a:p>
+        </p:txBody>
+      </p:sp>
+      <p:sp>
+        <p:nvSpPr>
+          <p:cNvPr id="8" name="Titre 1">
+            <a:extLst>
+              <a:ext uri="{FF2B5EF4-FFF2-40B4-BE49-F238E27FC236}">
+                <a16:creationId xmlns:a16="http://schemas.microsoft.com/office/drawing/2014/main" id="{1E93D889-9138-4324-B692-3587155996A7}"/>
+              </a:ext>
+            </a:extLst>
+          </p:cNvPr>
+          <p:cNvSpPr>
+            <a:spLocks noGrp="1"/>
+          </p:cNvSpPr>
+          <p:nvPr>
+            <p:ph type="title"/>
+          </p:nvPr>
+        </p:nvSpPr>
+        <p:spPr>
+          <a:xfrm>
+            <a:off x="-3" y="425193"/>
+            <a:ext cx="12192000" cy="1134090"/>
+          </a:xfrm>
+        </p:spPr>
+        <p:txBody>
+          <a:bodyPr vert="horz" lIns="91440" tIns="45720" rIns="91440" bIns="45720" rtlCol="0" anchor="b">
+            <a:normAutofit/>
+          </a:bodyPr>
+          <a:lstStyle/>
+          <a:p>
+            <a:pPr algn="ctr">
+              <a:spcAft>
+                <a:spcPts val="600"/>
+              </a:spcAft>
+            </a:pPr>
+            <a:r>
+              <a:rPr lang="en-US" sz="6000" dirty="0" smtClean="0">
+                <a:solidFill>
+                  <a:schemeClr val="accent4"/>
+                </a:solidFill>
+                <a:latin typeface="+mn-lt"/>
+                <a:ea typeface="+mn-ea"/>
+                <a:cs typeface="+mn-cs"/>
+              </a:rPr>
+              <a:t>ANALYSE DU GENERATEUR</a:t>
+            </a:r>
+            <a:endParaRPr lang="en-US" sz="6000" dirty="0">
+              <a:solidFill>
+                <a:schemeClr val="accent4"/>
+              </a:solidFill>
+              <a:latin typeface="+mn-lt"/>
+              <a:ea typeface="+mn-ea"/>
+              <a:cs typeface="+mn-cs"/>
+            </a:endParaRPr>
+          </a:p>
+        </p:txBody>
+      </p:sp>
+      <p:sp>
+        <p:nvSpPr>
+          <p:cNvPr id="12" name="ZoneTexte 11"/>
+          <p:cNvSpPr txBox="1"/>
+          <p:nvPr/>
+        </p:nvSpPr>
+        <p:spPr>
+          <a:xfrm>
+            <a:off x="1902289" y="6174154"/>
+            <a:ext cx="8387419" cy="382954"/>
+          </a:xfrm>
+          <a:prstGeom prst="rect">
+            <a:avLst/>
+          </a:prstGeom>
+          <a:noFill/>
+        </p:spPr>
+        <p:txBody>
+          <a:bodyPr wrap="square" rtlCol="0">
+            <a:spAutoFit/>
+          </a:bodyPr>
+          <a:lstStyle/>
+          <a:p>
+            <a:pPr algn="ctr"/>
+            <a:r>
+              <a:rPr lang="fr-FR" i="1" dirty="0" smtClean="0">
+                <a:solidFill>
+                  <a:schemeClr val="bg1"/>
+                </a:solidFill>
+              </a:rPr>
+              <a:t>Diagramme d’activité</a:t>
+            </a:r>
+            <a:endParaRPr lang="fr-FR" i="1" dirty="0">
+              <a:solidFill>
+                <a:schemeClr val="bg1"/>
+              </a:solidFill>
+            </a:endParaRPr>
+          </a:p>
+        </p:txBody>
+      </p:sp>
+      <p:pic>
+        <p:nvPicPr>
+          <p:cNvPr id="7" name="Image 6"/>
+          <p:cNvPicPr/>
+          <p:nvPr/>
+        </p:nvPicPr>
+        <p:blipFill>
+          <a:blip r:embed="rId3"/>
+          <a:stretch>
+            <a:fillRect/>
+          </a:stretch>
+        </p:blipFill>
+        <p:spPr>
+          <a:xfrm>
+            <a:off x="4037442" y="1559283"/>
+            <a:ext cx="4261606" cy="4450504"/>
+          </a:xfrm>
+          <a:prstGeom prst="rect">
+            <a:avLst/>
+          </a:prstGeom>
+        </p:spPr>
+      </p:pic>
+    </p:spTree>
+    <p:extLst>
+      <p:ext uri="{BB962C8B-B14F-4D97-AF65-F5344CB8AC3E}">
+        <p14:creationId xmlns:p14="http://schemas.microsoft.com/office/powerpoint/2010/main" val="2434321287"/>
+      </p:ext>
+    </p:extLst>
+  </p:cSld>
+  <p:clrMapOvr>
+    <a:masterClrMapping/>
+  </p:clrMapOvr>
+</p:sld>
+</file>
+
+<file path=ppt/slides/slide12.xml><?xml version="1.0" encoding="utf-8"?>
+<p:sld xmlns:a="http://schemas.openxmlformats.org/drawingml/2006/main" xmlns:r="http://schemas.openxmlformats.org/officeDocument/2006/relationships" xmlns:p="http://schemas.openxmlformats.org/presentationml/2006/main">
+  <p:cSld>
+    <p:spTree>
+      <p:nvGrpSpPr>
+        <p:cNvPr id="1" name=""/>
+        <p:cNvGrpSpPr/>
+        <p:nvPr/>
+      </p:nvGrpSpPr>
+      <p:grpSpPr>
+        <a:xfrm>
+          <a:off x="0" y="0"/>
+          <a:ext cx="0" cy="0"/>
+          <a:chOff x="0" y="0"/>
+          <a:chExt cx="0" cy="0"/>
+        </a:xfrm>
+      </p:grpSpPr>
+      <p:pic>
+        <p:nvPicPr>
+          <p:cNvPr id="6" name="Image 5"/>
+          <p:cNvPicPr>
+            <a:picLocks noChangeAspect="1"/>
+          </p:cNvPicPr>
+          <p:nvPr/>
+        </p:nvPicPr>
+        <p:blipFill rotWithShape="1">
+          <a:blip r:embed="rId2"/>
+          <a:srcRect r="23414" b="14640"/>
+          <a:stretch/>
+        </p:blipFill>
+        <p:spPr>
+          <a:xfrm>
+            <a:off x="0" y="0"/>
+            <a:ext cx="12192000" cy="6858000"/>
+          </a:xfrm>
+          <a:prstGeom prst="rect">
+            <a:avLst/>
+          </a:prstGeom>
+        </p:spPr>
+      </p:pic>
+      <p:sp>
+        <p:nvSpPr>
+          <p:cNvPr id="5" name="Espace réservé du numéro de diapositive 4"/>
+          <p:cNvSpPr>
+            <a:spLocks noGrp="1"/>
+          </p:cNvSpPr>
+          <p:nvPr>
+            <p:ph type="sldNum" sz="quarter" idx="12"/>
+          </p:nvPr>
+        </p:nvSpPr>
+        <p:spPr/>
+        <p:txBody>
+          <a:bodyPr/>
+          <a:lstStyle/>
+          <a:p>
+            <a:fld id="{88DFB1D4-2421-4D0B-B32A-595002F349BD}" type="slidenum">
+              <a:rPr lang="fr-FR" smtClean="0"/>
+              <a:t>12</a:t>
+            </a:fld>
+            <a:endParaRPr lang="fr-FR"/>
+          </a:p>
+        </p:txBody>
+      </p:sp>
+      <p:sp>
+        <p:nvSpPr>
+          <p:cNvPr id="8" name="Titre 1">
+            <a:extLst>
+              <a:ext uri="{FF2B5EF4-FFF2-40B4-BE49-F238E27FC236}">
+                <a16:creationId xmlns:a16="http://schemas.microsoft.com/office/drawing/2014/main" id="{1E93D889-9138-4324-B692-3587155996A7}"/>
+              </a:ext>
+            </a:extLst>
+          </p:cNvPr>
+          <p:cNvSpPr>
+            <a:spLocks noGrp="1"/>
+          </p:cNvSpPr>
+          <p:nvPr>
+            <p:ph type="title"/>
+          </p:nvPr>
+        </p:nvSpPr>
+        <p:spPr>
+          <a:xfrm>
+            <a:off x="-3" y="425193"/>
+            <a:ext cx="12192000" cy="1134090"/>
+          </a:xfrm>
+        </p:spPr>
+        <p:txBody>
+          <a:bodyPr vert="horz" lIns="91440" tIns="45720" rIns="91440" bIns="45720" rtlCol="0" anchor="b">
+            <a:normAutofit/>
+          </a:bodyPr>
+          <a:lstStyle/>
+          <a:p>
+            <a:pPr algn="ctr">
+              <a:spcAft>
+                <a:spcPts val="600"/>
+              </a:spcAft>
+            </a:pPr>
+            <a:r>
+              <a:rPr lang="en-US" sz="6000" dirty="0" smtClean="0">
+                <a:solidFill>
+                  <a:schemeClr val="accent4"/>
+                </a:solidFill>
+                <a:latin typeface="+mn-lt"/>
+                <a:ea typeface="+mn-ea"/>
+                <a:cs typeface="+mn-cs"/>
+              </a:rPr>
+              <a:t>ANALYSE DU GENERATEUR</a:t>
+            </a:r>
+            <a:endParaRPr lang="en-US" sz="6000" dirty="0">
+              <a:solidFill>
+                <a:schemeClr val="accent4"/>
+              </a:solidFill>
+              <a:latin typeface="+mn-lt"/>
+              <a:ea typeface="+mn-ea"/>
+              <a:cs typeface="+mn-cs"/>
+            </a:endParaRPr>
+          </a:p>
+        </p:txBody>
+      </p:sp>
+      <p:sp>
+        <p:nvSpPr>
+          <p:cNvPr id="12" name="ZoneTexte 11"/>
+          <p:cNvSpPr txBox="1"/>
+          <p:nvPr/>
+        </p:nvSpPr>
+        <p:spPr>
+          <a:xfrm>
+            <a:off x="1902289" y="6174154"/>
+            <a:ext cx="8387419" cy="382954"/>
+          </a:xfrm>
+          <a:prstGeom prst="rect">
+            <a:avLst/>
+          </a:prstGeom>
+          <a:noFill/>
+        </p:spPr>
+        <p:txBody>
+          <a:bodyPr wrap="square" rtlCol="0">
+            <a:spAutoFit/>
+          </a:bodyPr>
+          <a:lstStyle/>
+          <a:p>
+            <a:pPr algn="ctr"/>
+            <a:r>
+              <a:rPr lang="fr-FR" i="1" dirty="0" smtClean="0">
+                <a:solidFill>
+                  <a:schemeClr val="bg1"/>
+                </a:solidFill>
+              </a:rPr>
+              <a:t>Diagramme de classe</a:t>
+            </a:r>
+            <a:endParaRPr lang="fr-FR" i="1" dirty="0">
+              <a:solidFill>
+                <a:schemeClr val="bg1"/>
+              </a:solidFill>
+            </a:endParaRPr>
+          </a:p>
+        </p:txBody>
+      </p:sp>
+      <p:pic>
+        <p:nvPicPr>
+          <p:cNvPr id="7" name="Image 6"/>
+          <p:cNvPicPr/>
+          <p:nvPr/>
+        </p:nvPicPr>
+        <p:blipFill>
+          <a:blip r:embed="rId3"/>
+          <a:stretch>
+            <a:fillRect/>
+          </a:stretch>
+        </p:blipFill>
+        <p:spPr>
+          <a:xfrm>
+            <a:off x="2838306" y="1559283"/>
+            <a:ext cx="6907578" cy="4450504"/>
+          </a:xfrm>
+          <a:prstGeom prst="rect">
+            <a:avLst/>
+          </a:prstGeom>
+        </p:spPr>
+      </p:pic>
+    </p:spTree>
+    <p:extLst>
+      <p:ext uri="{BB962C8B-B14F-4D97-AF65-F5344CB8AC3E}">
+        <p14:creationId xmlns:p14="http://schemas.microsoft.com/office/powerpoint/2010/main" val="598592944"/>
+      </p:ext>
+    </p:extLst>
+  </p:cSld>
+  <p:clrMapOvr>
+    <a:masterClrMapping/>
+  </p:clrMapOvr>
+</p:sld>
+</file>
+
+<file path=ppt/slides/slide13.xml><?xml version="1.0" encoding="utf-8"?>
+<p:sld xmlns:a="http://schemas.openxmlformats.org/drawingml/2006/main" xmlns:r="http://schemas.openxmlformats.org/officeDocument/2006/relationships" xmlns:p="http://schemas.openxmlformats.org/presentationml/2006/main">
+  <p:cSld>
+    <p:spTree>
+      <p:nvGrpSpPr>
+        <p:cNvPr id="1" name=""/>
+        <p:cNvGrpSpPr/>
+        <p:nvPr/>
+      </p:nvGrpSpPr>
+      <p:grpSpPr>
+        <a:xfrm>
+          <a:off x="0" y="0"/>
+          <a:ext cx="0" cy="0"/>
+          <a:chOff x="0" y="0"/>
+          <a:chExt cx="0" cy="0"/>
+        </a:xfrm>
+      </p:grpSpPr>
+      <p:pic>
+        <p:nvPicPr>
+          <p:cNvPr id="6" name="Image 5"/>
+          <p:cNvPicPr>
+            <a:picLocks noChangeAspect="1"/>
+          </p:cNvPicPr>
+          <p:nvPr/>
+        </p:nvPicPr>
+        <p:blipFill rotWithShape="1">
+          <a:blip r:embed="rId2"/>
+          <a:srcRect r="23414" b="14640"/>
+          <a:stretch/>
+        </p:blipFill>
+        <p:spPr>
+          <a:xfrm>
+            <a:off x="0" y="0"/>
+            <a:ext cx="12192000" cy="6858000"/>
+          </a:xfrm>
+          <a:prstGeom prst="rect">
+            <a:avLst/>
+          </a:prstGeom>
+        </p:spPr>
+      </p:pic>
+      <p:sp>
+        <p:nvSpPr>
+          <p:cNvPr id="5" name="Espace réservé du numéro de diapositive 4"/>
+          <p:cNvSpPr>
+            <a:spLocks noGrp="1"/>
+          </p:cNvSpPr>
+          <p:nvPr>
+            <p:ph type="sldNum" sz="quarter" idx="12"/>
+          </p:nvPr>
+        </p:nvSpPr>
+        <p:spPr/>
+        <p:txBody>
+          <a:bodyPr/>
+          <a:lstStyle/>
+          <a:p>
+            <a:fld id="{88DFB1D4-2421-4D0B-B32A-595002F349BD}" type="slidenum">
+              <a:rPr lang="fr-FR" smtClean="0"/>
+              <a:t>13</a:t>
+            </a:fld>
+            <a:endParaRPr lang="fr-FR"/>
+          </a:p>
+        </p:txBody>
+      </p:sp>
+      <p:sp>
+        <p:nvSpPr>
+          <p:cNvPr id="7" name="Titre 1">
+            <a:extLst>
+              <a:ext uri="{FF2B5EF4-FFF2-40B4-BE49-F238E27FC236}">
+                <a16:creationId xmlns:a16="http://schemas.microsoft.com/office/drawing/2014/main" id="{1E93D889-9138-4324-B692-3587155996A7}"/>
+              </a:ext>
+            </a:extLst>
+          </p:cNvPr>
+          <p:cNvSpPr>
+            <a:spLocks noGrp="1"/>
+          </p:cNvSpPr>
+          <p:nvPr>
+            <p:ph type="title"/>
+          </p:nvPr>
+        </p:nvSpPr>
+        <p:spPr>
+          <a:xfrm>
+            <a:off x="0" y="669460"/>
+            <a:ext cx="12192000" cy="1134090"/>
+          </a:xfrm>
+        </p:spPr>
+        <p:txBody>
+          <a:bodyPr vert="horz" lIns="91440" tIns="45720" rIns="91440" bIns="45720" rtlCol="0" anchor="b">
+            <a:normAutofit/>
+          </a:bodyPr>
+          <a:lstStyle/>
+          <a:p>
+            <a:pPr algn="ctr">
+              <a:spcAft>
+                <a:spcPts val="600"/>
+              </a:spcAft>
+            </a:pPr>
+            <a:r>
+              <a:rPr lang="en-US" sz="6000" dirty="0" smtClean="0">
+                <a:solidFill>
+                  <a:schemeClr val="accent4"/>
+                </a:solidFill>
+                <a:latin typeface="+mn-lt"/>
+                <a:ea typeface="+mn-ea"/>
+                <a:cs typeface="+mn-cs"/>
+              </a:rPr>
+              <a:t>A-FRAME</a:t>
+            </a:r>
+            <a:endParaRPr lang="en-US" sz="6000" dirty="0">
+              <a:solidFill>
+                <a:schemeClr val="accent4"/>
+              </a:solidFill>
+              <a:latin typeface="+mn-lt"/>
+              <a:ea typeface="+mn-ea"/>
+              <a:cs typeface="+mn-cs"/>
+            </a:endParaRPr>
+          </a:p>
+        </p:txBody>
+      </p:sp>
+      <p:sp>
+        <p:nvSpPr>
+          <p:cNvPr id="8" name="Rectangle 7"/>
+          <p:cNvSpPr/>
+          <p:nvPr/>
+        </p:nvSpPr>
+        <p:spPr>
+          <a:xfrm>
+            <a:off x="1647496" y="2794234"/>
+            <a:ext cx="8897007" cy="1200329"/>
+          </a:xfrm>
+          <a:prstGeom prst="rect">
+            <a:avLst/>
+          </a:prstGeom>
+        </p:spPr>
+        <p:txBody>
+          <a:bodyPr wrap="square">
+            <a:spAutoFit/>
+          </a:bodyPr>
+          <a:lstStyle/>
+          <a:p>
+            <a:r>
+              <a:rPr lang="fr-FR" sz="2400" dirty="0" smtClean="0">
+                <a:solidFill>
+                  <a:schemeClr val="bg1"/>
+                </a:solidFill>
+              </a:rPr>
+              <a:t>A-Frame est un Framework créé en décembre 2015. Il open-source libre sous licence MIT pour la construction d’expériences de réalité virtuelle.</a:t>
+            </a:r>
+            <a:endParaRPr lang="fr-FR" sz="2400" dirty="0">
+              <a:solidFill>
+                <a:schemeClr val="bg1"/>
+              </a:solidFill>
+            </a:endParaRPr>
+          </a:p>
+        </p:txBody>
+      </p:sp>
+    </p:spTree>
+    <p:extLst>
+      <p:ext uri="{BB962C8B-B14F-4D97-AF65-F5344CB8AC3E}">
+        <p14:creationId xmlns:p14="http://schemas.microsoft.com/office/powerpoint/2010/main" val="1871363097"/>
+      </p:ext>
+    </p:extLst>
+  </p:cSld>
+  <p:clrMapOvr>
+    <a:masterClrMapping/>
+  </p:clrMapOvr>
+</p:sld>
+</file>
+
+<file path=ppt/slides/slide14.xml><?xml version="1.0" encoding="utf-8"?>
+<p:sld xmlns:a="http://schemas.openxmlformats.org/drawingml/2006/main" xmlns:r="http://schemas.openxmlformats.org/officeDocument/2006/relationships" xmlns:p="http://schemas.openxmlformats.org/presentationml/2006/main">
+  <p:cSld>
+    <p:spTree>
+      <p:nvGrpSpPr>
+        <p:cNvPr id="1" name=""/>
+        <p:cNvGrpSpPr/>
+        <p:nvPr/>
+      </p:nvGrpSpPr>
+      <p:grpSpPr>
+        <a:xfrm>
+          <a:off x="0" y="0"/>
+          <a:ext cx="0" cy="0"/>
+          <a:chOff x="0" y="0"/>
+          <a:chExt cx="0" cy="0"/>
+        </a:xfrm>
+      </p:grpSpPr>
+      <p:pic>
+        <p:nvPicPr>
+          <p:cNvPr id="6" name="Image 5"/>
+          <p:cNvPicPr>
+            <a:picLocks noChangeAspect="1"/>
+          </p:cNvPicPr>
+          <p:nvPr/>
+        </p:nvPicPr>
+        <p:blipFill rotWithShape="1">
+          <a:blip r:embed="rId2"/>
+          <a:srcRect r="23414" b="14640"/>
+          <a:stretch/>
+        </p:blipFill>
+        <p:spPr>
+          <a:xfrm>
+            <a:off x="0" y="0"/>
+            <a:ext cx="12192000" cy="6858000"/>
+          </a:xfrm>
+          <a:prstGeom prst="rect">
+            <a:avLst/>
+          </a:prstGeom>
+        </p:spPr>
+      </p:pic>
+      <p:sp>
+        <p:nvSpPr>
+          <p:cNvPr id="5" name="Espace réservé du numéro de diapositive 4"/>
+          <p:cNvSpPr>
+            <a:spLocks noGrp="1"/>
+          </p:cNvSpPr>
+          <p:nvPr>
+            <p:ph type="sldNum" sz="quarter" idx="12"/>
+          </p:nvPr>
+        </p:nvSpPr>
+        <p:spPr/>
+        <p:txBody>
+          <a:bodyPr/>
+          <a:lstStyle/>
+          <a:p>
+            <a:fld id="{88DFB1D4-2421-4D0B-B32A-595002F349BD}" type="slidenum">
+              <a:rPr lang="fr-FR" smtClean="0"/>
+              <a:t>14</a:t>
+            </a:fld>
+            <a:endParaRPr lang="fr-FR"/>
+          </a:p>
+        </p:txBody>
+      </p:sp>
+      <p:sp>
+        <p:nvSpPr>
+          <p:cNvPr id="7" name="Titre 1">
+            <a:extLst>
+              <a:ext uri="{FF2B5EF4-FFF2-40B4-BE49-F238E27FC236}">
+                <a16:creationId xmlns:a16="http://schemas.microsoft.com/office/drawing/2014/main" id="{1E93D889-9138-4324-B692-3587155996A7}"/>
+              </a:ext>
+            </a:extLst>
+          </p:cNvPr>
+          <p:cNvSpPr>
+            <a:spLocks noGrp="1"/>
+          </p:cNvSpPr>
+          <p:nvPr>
+            <p:ph type="title"/>
+          </p:nvPr>
+        </p:nvSpPr>
+        <p:spPr>
+          <a:xfrm>
+            <a:off x="0" y="669460"/>
+            <a:ext cx="12192000" cy="1134090"/>
+          </a:xfrm>
+        </p:spPr>
+        <p:txBody>
+          <a:bodyPr vert="horz" lIns="91440" tIns="45720" rIns="91440" bIns="45720" rtlCol="0" anchor="b">
+            <a:normAutofit/>
+          </a:bodyPr>
+          <a:lstStyle/>
+          <a:p>
+            <a:pPr algn="ctr">
+              <a:spcAft>
+                <a:spcPts val="600"/>
+              </a:spcAft>
+            </a:pPr>
+            <a:r>
+              <a:rPr lang="en-US" sz="6000" dirty="0" smtClean="0">
+                <a:solidFill>
+                  <a:schemeClr val="accent4"/>
+                </a:solidFill>
+                <a:latin typeface="+mn-lt"/>
+                <a:ea typeface="+mn-ea"/>
+                <a:cs typeface="+mn-cs"/>
+              </a:rPr>
+              <a:t>EXEMPLE CODE A-FRAME</a:t>
+            </a:r>
+            <a:endParaRPr lang="en-US" sz="6000" dirty="0">
+              <a:solidFill>
+                <a:schemeClr val="accent4"/>
+              </a:solidFill>
+              <a:latin typeface="+mn-lt"/>
+              <a:ea typeface="+mn-ea"/>
+              <a:cs typeface="+mn-cs"/>
+            </a:endParaRPr>
+          </a:p>
+        </p:txBody>
+      </p:sp>
+      <p:pic>
+        <p:nvPicPr>
+          <p:cNvPr id="1028" name="Picture 4" descr="Aucune description disponible."/>
+          <p:cNvPicPr>
+            <a:picLocks noChangeAspect="1" noChangeArrowheads="1"/>
+          </p:cNvPicPr>
+          <p:nvPr/>
+        </p:nvPicPr>
+        <p:blipFill>
+          <a:blip r:embed="rId3">
+            <a:extLst>
+              <a:ext uri="{28A0092B-C50C-407E-A947-70E740481C1C}">
+                <a14:useLocalDpi xmlns:a14="http://schemas.microsoft.com/office/drawing/2010/main" val="0"/>
+              </a:ext>
+            </a:extLst>
+          </a:blip>
+          <a:srcRect/>
+          <a:stretch>
+            <a:fillRect/>
+          </a:stretch>
+        </p:blipFill>
+        <p:spPr bwMode="auto">
+          <a:xfrm>
+            <a:off x="1847850" y="2674936"/>
+            <a:ext cx="8496300" cy="2743201"/>
+          </a:xfrm>
+          <a:prstGeom prst="rect">
+            <a:avLst/>
+          </a:prstGeom>
+          <a:noFill/>
+          <a:extLst>
+            <a:ext uri="{909E8E84-426E-40DD-AFC4-6F175D3DCCD1}">
+              <a14:hiddenFill xmlns:a14="http://schemas.microsoft.com/office/drawing/2010/main">
+                <a:solidFill>
+                  <a:srgbClr val="FFFFFF"/>
+                </a:solidFill>
+              </a14:hiddenFill>
+            </a:ext>
+          </a:extLst>
+        </p:spPr>
+      </p:pic>
+    </p:spTree>
+    <p:extLst>
+      <p:ext uri="{BB962C8B-B14F-4D97-AF65-F5344CB8AC3E}">
+        <p14:creationId xmlns:p14="http://schemas.microsoft.com/office/powerpoint/2010/main" val="2483663196"/>
+      </p:ext>
+    </p:extLst>
+  </p:cSld>
+  <p:clrMapOvr>
+    <a:masterClrMapping/>
+  </p:clrMapOvr>
+</p:sld>
+</file>
+
+<file path=ppt/slides/slide15.xml><?xml version="1.0" encoding="utf-8"?>
+<p:sld xmlns:a="http://schemas.openxmlformats.org/drawingml/2006/main" xmlns:r="http://schemas.openxmlformats.org/officeDocument/2006/relationships" xmlns:p="http://schemas.openxmlformats.org/presentationml/2006/main">
+  <p:cSld>
+    <p:spTree>
+      <p:nvGrpSpPr>
+        <p:cNvPr id="1" name=""/>
+        <p:cNvGrpSpPr/>
+        <p:nvPr/>
+      </p:nvGrpSpPr>
+      <p:grpSpPr>
+        <a:xfrm>
+          <a:off x="0" y="0"/>
+          <a:ext cx="0" cy="0"/>
+          <a:chOff x="0" y="0"/>
+          <a:chExt cx="0" cy="0"/>
+        </a:xfrm>
+      </p:grpSpPr>
+      <p:pic>
+        <p:nvPicPr>
+          <p:cNvPr id="6" name="Image 5"/>
+          <p:cNvPicPr>
+            <a:picLocks noChangeAspect="1"/>
+          </p:cNvPicPr>
+          <p:nvPr/>
+        </p:nvPicPr>
+        <p:blipFill rotWithShape="1">
+          <a:blip r:embed="rId2"/>
+          <a:srcRect r="23414" b="14640"/>
+          <a:stretch/>
+        </p:blipFill>
+        <p:spPr>
+          <a:xfrm>
+            <a:off x="0" y="0"/>
+            <a:ext cx="12192000" cy="6858000"/>
+          </a:xfrm>
+          <a:prstGeom prst="rect">
+            <a:avLst/>
+          </a:prstGeom>
+        </p:spPr>
+      </p:pic>
+      <p:sp>
+        <p:nvSpPr>
+          <p:cNvPr id="5" name="Espace réservé du numéro de diapositive 4"/>
+          <p:cNvSpPr>
+            <a:spLocks noGrp="1"/>
+          </p:cNvSpPr>
+          <p:nvPr>
+            <p:ph type="sldNum" sz="quarter" idx="12"/>
+          </p:nvPr>
+        </p:nvSpPr>
+        <p:spPr/>
+        <p:txBody>
+          <a:bodyPr/>
+          <a:lstStyle/>
+          <a:p>
+            <a:fld id="{88DFB1D4-2421-4D0B-B32A-595002F349BD}" type="slidenum">
+              <a:rPr lang="fr-FR" smtClean="0"/>
+              <a:t>15</a:t>
+            </a:fld>
+            <a:endParaRPr lang="fr-FR"/>
+          </a:p>
+        </p:txBody>
+      </p:sp>
+      <p:sp>
+        <p:nvSpPr>
+          <p:cNvPr id="7" name="Titre 1">
+            <a:extLst>
+              <a:ext uri="{FF2B5EF4-FFF2-40B4-BE49-F238E27FC236}">
+                <a16:creationId xmlns:a16="http://schemas.microsoft.com/office/drawing/2014/main" id="{1E93D889-9138-4324-B692-3587155996A7}"/>
+              </a:ext>
+            </a:extLst>
+          </p:cNvPr>
+          <p:cNvSpPr>
+            <a:spLocks noGrp="1"/>
+          </p:cNvSpPr>
+          <p:nvPr>
+            <p:ph type="title"/>
+          </p:nvPr>
+        </p:nvSpPr>
+        <p:spPr>
+          <a:xfrm>
+            <a:off x="0" y="669460"/>
+            <a:ext cx="12192000" cy="1134090"/>
+          </a:xfrm>
+        </p:spPr>
+        <p:txBody>
+          <a:bodyPr vert="horz" lIns="91440" tIns="45720" rIns="91440" bIns="45720" rtlCol="0" anchor="b">
+            <a:normAutofit/>
+          </a:bodyPr>
+          <a:lstStyle/>
+          <a:p>
+            <a:pPr algn="ctr">
+              <a:spcAft>
+                <a:spcPts val="600"/>
+              </a:spcAft>
+            </a:pPr>
+            <a:r>
+              <a:rPr lang="en-US" sz="6000" dirty="0" smtClean="0">
+                <a:solidFill>
+                  <a:schemeClr val="accent4"/>
+                </a:solidFill>
+                <a:latin typeface="+mn-lt"/>
+                <a:ea typeface="+mn-ea"/>
+                <a:cs typeface="+mn-cs"/>
+              </a:rPr>
+              <a:t>EXEMPLE CODE A-FRAME</a:t>
+            </a:r>
+            <a:endParaRPr lang="en-US" sz="6000" dirty="0">
+              <a:solidFill>
+                <a:schemeClr val="accent4"/>
+              </a:solidFill>
+              <a:latin typeface="+mn-lt"/>
+              <a:ea typeface="+mn-ea"/>
+              <a:cs typeface="+mn-cs"/>
+            </a:endParaRPr>
+          </a:p>
+        </p:txBody>
+      </p:sp>
+      <p:pic>
+        <p:nvPicPr>
+          <p:cNvPr id="2050" name="Picture 2" descr="Aucune description disponible."/>
+          <p:cNvPicPr>
+            <a:picLocks noChangeAspect="1" noChangeArrowheads="1"/>
+          </p:cNvPicPr>
+          <p:nvPr/>
+        </p:nvPicPr>
+        <p:blipFill>
+          <a:blip r:embed="rId3">
+            <a:extLst>
+              <a:ext uri="{28A0092B-C50C-407E-A947-70E740481C1C}">
+                <a14:useLocalDpi xmlns:a14="http://schemas.microsoft.com/office/drawing/2010/main" val="0"/>
+              </a:ext>
+            </a:extLst>
+          </a:blip>
+          <a:srcRect/>
+          <a:stretch>
+            <a:fillRect/>
+          </a:stretch>
+        </p:blipFill>
+        <p:spPr bwMode="auto">
+          <a:xfrm>
+            <a:off x="1881187" y="1927224"/>
+            <a:ext cx="8429625" cy="4429126"/>
+          </a:xfrm>
+          <a:prstGeom prst="rect">
+            <a:avLst/>
+          </a:prstGeom>
+          <a:noFill/>
+          <a:extLst>
+            <a:ext uri="{909E8E84-426E-40DD-AFC4-6F175D3DCCD1}">
+              <a14:hiddenFill xmlns:a14="http://schemas.microsoft.com/office/drawing/2010/main">
+                <a:solidFill>
+                  <a:srgbClr val="FFFFFF"/>
+                </a:solidFill>
+              </a14:hiddenFill>
+            </a:ext>
+          </a:extLst>
+        </p:spPr>
+      </p:pic>
+    </p:spTree>
+    <p:extLst>
+      <p:ext uri="{BB962C8B-B14F-4D97-AF65-F5344CB8AC3E}">
+        <p14:creationId xmlns:p14="http://schemas.microsoft.com/office/powerpoint/2010/main" val="3991535109"/>
       </p:ext>
     </p:extLst>
   </p:cSld>
@@ -4142,6 +5746,29 @@
           </a:p>
         </p:txBody>
       </p:sp>
+      <p:sp>
+        <p:nvSpPr>
+          <p:cNvPr id="3" name="Espace réservé du numéro de diapositive 2"/>
+          <p:cNvSpPr>
+            <a:spLocks noGrp="1"/>
+          </p:cNvSpPr>
+          <p:nvPr>
+            <p:ph type="sldNum" sz="quarter" idx="12"/>
+          </p:nvPr>
+        </p:nvSpPr>
+        <p:spPr/>
+        <p:txBody>
+          <a:bodyPr/>
+          <a:lstStyle/>
+          <a:p>
+            <a:fld id="{88DFB1D4-2421-4D0B-B32A-595002F349BD}" type="slidenum">
+              <a:rPr lang="fr-FR" smtClean="0"/>
+              <a:t>2</a:t>
+            </a:fld>
+            <a:endParaRPr lang="fr-FR"/>
+          </a:p>
+        </p:txBody>
+      </p:sp>
     </p:spTree>
     <p:extLst>
       <p:ext uri="{BB962C8B-B14F-4D97-AF65-F5344CB8AC3E}">
@@ -4294,6 +5921,29 @@
           </a:extLst>
         </p:spPr>
       </p:pic>
+      <p:sp>
+        <p:nvSpPr>
+          <p:cNvPr id="2" name="Espace réservé du numéro de diapositive 1"/>
+          <p:cNvSpPr>
+            <a:spLocks noGrp="1"/>
+          </p:cNvSpPr>
+          <p:nvPr>
+            <p:ph type="sldNum" sz="quarter" idx="12"/>
+          </p:nvPr>
+        </p:nvSpPr>
+        <p:spPr/>
+        <p:txBody>
+          <a:bodyPr/>
+          <a:lstStyle/>
+          <a:p>
+            <a:fld id="{88DFB1D4-2421-4D0B-B32A-595002F349BD}" type="slidenum">
+              <a:rPr lang="fr-FR" smtClean="0"/>
+              <a:t>3</a:t>
+            </a:fld>
+            <a:endParaRPr lang="fr-FR"/>
+          </a:p>
+        </p:txBody>
+      </p:sp>
     </p:spTree>
     <p:extLst>
       <p:ext uri="{BB962C8B-B14F-4D97-AF65-F5344CB8AC3E}">
@@ -4392,7 +6042,7 @@
                 <a16:creationId xmlns:a16="http://schemas.microsoft.com/office/drawing/2014/main" id="{0C45045A-6083-4B3E-956A-67582337527D}"/>
               </a:ext>
               <a:ext uri="{C183D7F6-B498-43B3-948B-1728B52AA6E4}">
-                <adec:decorative xmlns:adec="http://schemas.microsoft.com/office/drawing/2017/decorative" val="1"/>
+                <adec:decorative xmlns="" xmlns:adec="http://schemas.microsoft.com/office/drawing/2017/decorative" val="1"/>
               </a:ext>
             </a:extLst>
           </p:cNvPr>
@@ -4486,7 +6136,7 @@
                 <a16:creationId xmlns:a16="http://schemas.microsoft.com/office/drawing/2014/main" id="{EBD2B2B2-1395-4E7B-87A0-BD34551C01B6}"/>
               </a:ext>
               <a:ext uri="{C183D7F6-B498-43B3-948B-1728B52AA6E4}">
-                <adec:decorative xmlns:adec="http://schemas.microsoft.com/office/drawing/2017/decorative" val="1"/>
+                <adec:decorative xmlns="" xmlns:adec="http://schemas.microsoft.com/office/drawing/2017/decorative" val="1"/>
               </a:ext>
             </a:extLst>
           </p:cNvPr>
@@ -4608,7 +6258,7 @@
                 <a16:creationId xmlns:a16="http://schemas.microsoft.com/office/drawing/2014/main" id="{42875DDC-0225-45F8-B745-78688F2D1ADC}"/>
               </a:ext>
               <a:ext uri="{C183D7F6-B498-43B3-948B-1728B52AA6E4}">
-                <adec:decorative xmlns:adec="http://schemas.microsoft.com/office/drawing/2017/decorative" val="1"/>
+                <adec:decorative xmlns="" xmlns:adec="http://schemas.microsoft.com/office/drawing/2017/decorative" val="1"/>
               </a:ext>
             </a:extLst>
           </p:cNvPr>
@@ -4702,7 +6352,7 @@
                 <a16:creationId xmlns:a16="http://schemas.microsoft.com/office/drawing/2014/main" id="{4F329563-0961-4426-90D2-2DF4888E5461}"/>
               </a:ext>
               <a:ext uri="{C183D7F6-B498-43B3-948B-1728B52AA6E4}">
-                <adec:decorative xmlns:adec="http://schemas.microsoft.com/office/drawing/2017/decorative" val="1"/>
+                <adec:decorative xmlns="" xmlns:adec="http://schemas.microsoft.com/office/drawing/2017/decorative" val="1"/>
               </a:ext>
             </a:extLst>
           </p:cNvPr>
@@ -4824,7 +6474,7 @@
                 <a16:creationId xmlns:a16="http://schemas.microsoft.com/office/drawing/2014/main" id="{12617755-D451-4BAF-9B55-518297BFF42D}"/>
               </a:ext>
               <a:ext uri="{C183D7F6-B498-43B3-948B-1728B52AA6E4}">
-                <adec:decorative xmlns:adec="http://schemas.microsoft.com/office/drawing/2017/decorative" val="1"/>
+                <adec:decorative xmlns="" xmlns:adec="http://schemas.microsoft.com/office/drawing/2017/decorative" val="1"/>
               </a:ext>
             </a:extLst>
           </p:cNvPr>
@@ -4918,7 +6568,7 @@
                 <a16:creationId xmlns:a16="http://schemas.microsoft.com/office/drawing/2014/main" id="{86C062C2-3673-4248-BE21-B51B16E63267}"/>
               </a:ext>
               <a:ext uri="{C183D7F6-B498-43B3-948B-1728B52AA6E4}">
-                <adec:decorative xmlns:adec="http://schemas.microsoft.com/office/drawing/2017/decorative" val="1"/>
+                <adec:decorative xmlns="" xmlns:adec="http://schemas.microsoft.com/office/drawing/2017/decorative" val="1"/>
               </a:ext>
             </a:extLst>
           </p:cNvPr>
@@ -5032,6 +6682,29 @@
           </a:prstGeom>
         </p:spPr>
       </p:pic>
+      <p:sp>
+        <p:nvSpPr>
+          <p:cNvPr id="2" name="Espace réservé du numéro de diapositive 1"/>
+          <p:cNvSpPr>
+            <a:spLocks noGrp="1"/>
+          </p:cNvSpPr>
+          <p:nvPr>
+            <p:ph type="sldNum" sz="quarter" idx="12"/>
+          </p:nvPr>
+        </p:nvSpPr>
+        <p:spPr/>
+        <p:txBody>
+          <a:bodyPr/>
+          <a:lstStyle/>
+          <a:p>
+            <a:fld id="{88DFB1D4-2421-4D0B-B32A-595002F349BD}" type="slidenum">
+              <a:rPr lang="fr-FR" smtClean="0"/>
+              <a:t>4</a:t>
+            </a:fld>
+            <a:endParaRPr lang="fr-FR" dirty="0"/>
+          </a:p>
+        </p:txBody>
+      </p:sp>
     </p:spTree>
     <p:extLst>
       <p:ext uri="{BB962C8B-B14F-4D97-AF65-F5344CB8AC3E}">
@@ -5078,7 +6751,7 @@
                 <a16:creationId xmlns:a16="http://schemas.microsoft.com/office/drawing/2014/main" id="{0DE6A193-4755-479A-BC6F-A7EBCA73BE1A}"/>
               </a:ext>
               <a:ext uri="{C183D7F6-B498-43B3-948B-1728B52AA6E4}">
-                <adec:decorative xmlns:adec="http://schemas.microsoft.com/office/drawing/2017/decorative" val="1"/>
+                <adec:decorative xmlns="" xmlns:adec="http://schemas.microsoft.com/office/drawing/2017/decorative" val="1"/>
               </a:ext>
             </a:extLst>
           </p:cNvPr>
@@ -5141,7 +6814,7 @@
                 <a16:creationId xmlns:a16="http://schemas.microsoft.com/office/drawing/2014/main" id="{5A55B759-31A7-423C-9BC2-A8BC09FE98B9}"/>
               </a:ext>
               <a:ext uri="{C183D7F6-B498-43B3-948B-1728B52AA6E4}">
-                <adec:decorative xmlns:adec="http://schemas.microsoft.com/office/drawing/2017/decorative" val="1"/>
+                <adec:decorative xmlns="" xmlns:adec="http://schemas.microsoft.com/office/drawing/2017/decorative" val="1"/>
               </a:ext>
             </a:extLst>
           </p:cNvPr>
@@ -5298,7 +6971,7 @@
                 <a16:creationId xmlns:a16="http://schemas.microsoft.com/office/drawing/2014/main" id="{F78796AF-79A0-47AC-BEFD-BFFC00F968C4}"/>
               </a:ext>
               <a:ext uri="{C183D7F6-B498-43B3-948B-1728B52AA6E4}">
-                <adec:decorative xmlns:adec="http://schemas.microsoft.com/office/drawing/2017/decorative" val="1"/>
+                <adec:decorative xmlns="" xmlns:adec="http://schemas.microsoft.com/office/drawing/2017/decorative" val="1"/>
               </a:ext>
             </a:extLst>
           </p:cNvPr>
@@ -5551,7 +7224,7 @@
         </p:blipFill>
         <p:spPr>
           <a:xfrm>
-            <a:off x="6096000" y="4846055"/>
+            <a:off x="5953781" y="4674227"/>
             <a:ext cx="5702113" cy="1682123"/>
           </a:xfrm>
           <a:prstGeom prst="rect">
@@ -5559,6 +7232,29 @@
           </a:prstGeom>
         </p:spPr>
       </p:pic>
+      <p:sp>
+        <p:nvSpPr>
+          <p:cNvPr id="3" name="Espace réservé du numéro de diapositive 2"/>
+          <p:cNvSpPr>
+            <a:spLocks noGrp="1"/>
+          </p:cNvSpPr>
+          <p:nvPr>
+            <p:ph type="sldNum" sz="quarter" idx="12"/>
+          </p:nvPr>
+        </p:nvSpPr>
+        <p:spPr/>
+        <p:txBody>
+          <a:bodyPr/>
+          <a:lstStyle/>
+          <a:p>
+            <a:fld id="{88DFB1D4-2421-4D0B-B32A-595002F349BD}" type="slidenum">
+              <a:rPr lang="fr-FR" smtClean="0"/>
+              <a:t>5</a:t>
+            </a:fld>
+            <a:endParaRPr lang="fr-FR"/>
+          </a:p>
+        </p:txBody>
+      </p:sp>
     </p:spTree>
     <p:extLst>
       <p:ext uri="{BB962C8B-B14F-4D97-AF65-F5344CB8AC3E}">
@@ -5568,6 +7264,688 @@
   </p:cSld>
   <p:clrMapOvr>
     <a:overrideClrMapping bg1="dk1" tx1="lt1" bg2="dk2" tx2="lt2" accent1="accent1" accent2="accent2" accent3="accent3" accent4="accent4" accent5="accent5" accent6="accent6" hlink="hlink" folHlink="folHlink"/>
+  </p:clrMapOvr>
+</p:sld>
+</file>
+
+<file path=ppt/slides/slide6.xml><?xml version="1.0" encoding="utf-8"?>
+<p:sld xmlns:a="http://schemas.openxmlformats.org/drawingml/2006/main" xmlns:r="http://schemas.openxmlformats.org/officeDocument/2006/relationships" xmlns:p="http://schemas.openxmlformats.org/presentationml/2006/main">
+  <p:cSld>
+    <p:spTree>
+      <p:nvGrpSpPr>
+        <p:cNvPr id="1" name=""/>
+        <p:cNvGrpSpPr/>
+        <p:nvPr/>
+      </p:nvGrpSpPr>
+      <p:grpSpPr>
+        <a:xfrm>
+          <a:off x="0" y="0"/>
+          <a:ext cx="0" cy="0"/>
+          <a:chOff x="0" y="0"/>
+          <a:chExt cx="0" cy="0"/>
+        </a:xfrm>
+      </p:grpSpPr>
+      <p:pic>
+        <p:nvPicPr>
+          <p:cNvPr id="6" name="Image 5"/>
+          <p:cNvPicPr>
+            <a:picLocks noChangeAspect="1"/>
+          </p:cNvPicPr>
+          <p:nvPr/>
+        </p:nvPicPr>
+        <p:blipFill rotWithShape="1">
+          <a:blip r:embed="rId2"/>
+          <a:srcRect r="23414" b="14640"/>
+          <a:stretch/>
+        </p:blipFill>
+        <p:spPr>
+          <a:xfrm>
+            <a:off x="0" y="0"/>
+            <a:ext cx="12192000" cy="6858000"/>
+          </a:xfrm>
+          <a:prstGeom prst="rect">
+            <a:avLst/>
+          </a:prstGeom>
+        </p:spPr>
+      </p:pic>
+      <p:sp>
+        <p:nvSpPr>
+          <p:cNvPr id="5" name="Espace réservé du numéro de diapositive 4"/>
+          <p:cNvSpPr>
+            <a:spLocks noGrp="1"/>
+          </p:cNvSpPr>
+          <p:nvPr>
+            <p:ph type="sldNum" sz="quarter" idx="12"/>
+          </p:nvPr>
+        </p:nvSpPr>
+        <p:spPr/>
+        <p:txBody>
+          <a:bodyPr/>
+          <a:lstStyle/>
+          <a:p>
+            <a:fld id="{88DFB1D4-2421-4D0B-B32A-595002F349BD}" type="slidenum">
+              <a:rPr lang="fr-FR" smtClean="0"/>
+              <a:t>6</a:t>
+            </a:fld>
+            <a:endParaRPr lang="fr-FR"/>
+          </a:p>
+        </p:txBody>
+      </p:sp>
+      <p:sp>
+        <p:nvSpPr>
+          <p:cNvPr id="7" name="Titre 1">
+            <a:extLst>
+              <a:ext uri="{FF2B5EF4-FFF2-40B4-BE49-F238E27FC236}">
+                <a16:creationId xmlns:a16="http://schemas.microsoft.com/office/drawing/2014/main" id="{1E93D889-9138-4324-B692-3587155996A7}"/>
+              </a:ext>
+            </a:extLst>
+          </p:cNvPr>
+          <p:cNvSpPr>
+            <a:spLocks noGrp="1"/>
+          </p:cNvSpPr>
+          <p:nvPr>
+            <p:ph type="title"/>
+          </p:nvPr>
+        </p:nvSpPr>
+        <p:spPr>
+          <a:xfrm>
+            <a:off x="4532767" y="2719755"/>
+            <a:ext cx="3126466" cy="1134090"/>
+          </a:xfrm>
+        </p:spPr>
+        <p:txBody>
+          <a:bodyPr vert="horz" lIns="91440" tIns="45720" rIns="91440" bIns="45720" rtlCol="0" anchor="b">
+            <a:normAutofit/>
+          </a:bodyPr>
+          <a:lstStyle/>
+          <a:p>
+            <a:pPr>
+              <a:spcAft>
+                <a:spcPts val="600"/>
+              </a:spcAft>
+            </a:pPr>
+            <a:r>
+              <a:rPr lang="en-US" sz="6000" dirty="0" smtClean="0">
+                <a:solidFill>
+                  <a:schemeClr val="accent4"/>
+                </a:solidFill>
+                <a:latin typeface="+mn-lt"/>
+                <a:ea typeface="+mn-ea"/>
+                <a:cs typeface="+mn-cs"/>
+              </a:rPr>
+              <a:t>ANNEXES</a:t>
+            </a:r>
+            <a:endParaRPr lang="en-US" sz="6000" dirty="0">
+              <a:solidFill>
+                <a:schemeClr val="accent4"/>
+              </a:solidFill>
+              <a:latin typeface="+mn-lt"/>
+              <a:ea typeface="+mn-ea"/>
+              <a:cs typeface="+mn-cs"/>
+            </a:endParaRPr>
+          </a:p>
+        </p:txBody>
+      </p:sp>
+    </p:spTree>
+    <p:extLst>
+      <p:ext uri="{BB962C8B-B14F-4D97-AF65-F5344CB8AC3E}">
+        <p14:creationId xmlns:p14="http://schemas.microsoft.com/office/powerpoint/2010/main" val="349950186"/>
+      </p:ext>
+    </p:extLst>
+  </p:cSld>
+  <p:clrMapOvr>
+    <a:masterClrMapping/>
+  </p:clrMapOvr>
+</p:sld>
+</file>
+
+<file path=ppt/slides/slide7.xml><?xml version="1.0" encoding="utf-8"?>
+<p:sld xmlns:a="http://schemas.openxmlformats.org/drawingml/2006/main" xmlns:r="http://schemas.openxmlformats.org/officeDocument/2006/relationships" xmlns:p="http://schemas.openxmlformats.org/presentationml/2006/main">
+  <p:cSld>
+    <p:spTree>
+      <p:nvGrpSpPr>
+        <p:cNvPr id="1" name=""/>
+        <p:cNvGrpSpPr/>
+        <p:nvPr/>
+      </p:nvGrpSpPr>
+      <p:grpSpPr>
+        <a:xfrm>
+          <a:off x="0" y="0"/>
+          <a:ext cx="0" cy="0"/>
+          <a:chOff x="0" y="0"/>
+          <a:chExt cx="0" cy="0"/>
+        </a:xfrm>
+      </p:grpSpPr>
+      <p:pic>
+        <p:nvPicPr>
+          <p:cNvPr id="6" name="Image 5"/>
+          <p:cNvPicPr>
+            <a:picLocks noChangeAspect="1"/>
+          </p:cNvPicPr>
+          <p:nvPr/>
+        </p:nvPicPr>
+        <p:blipFill rotWithShape="1">
+          <a:blip r:embed="rId2"/>
+          <a:srcRect r="23414" b="14640"/>
+          <a:stretch/>
+        </p:blipFill>
+        <p:spPr>
+          <a:xfrm>
+            <a:off x="0" y="0"/>
+            <a:ext cx="12192000" cy="6858000"/>
+          </a:xfrm>
+          <a:prstGeom prst="rect">
+            <a:avLst/>
+          </a:prstGeom>
+        </p:spPr>
+      </p:pic>
+      <p:sp>
+        <p:nvSpPr>
+          <p:cNvPr id="5" name="Espace réservé du numéro de diapositive 4"/>
+          <p:cNvSpPr>
+            <a:spLocks noGrp="1"/>
+          </p:cNvSpPr>
+          <p:nvPr>
+            <p:ph type="sldNum" sz="quarter" idx="12"/>
+          </p:nvPr>
+        </p:nvSpPr>
+        <p:spPr/>
+        <p:txBody>
+          <a:bodyPr/>
+          <a:lstStyle/>
+          <a:p>
+            <a:fld id="{88DFB1D4-2421-4D0B-B32A-595002F349BD}" type="slidenum">
+              <a:rPr lang="fr-FR" smtClean="0"/>
+              <a:t>7</a:t>
+            </a:fld>
+            <a:endParaRPr lang="fr-FR"/>
+          </a:p>
+        </p:txBody>
+      </p:sp>
+      <p:sp>
+        <p:nvSpPr>
+          <p:cNvPr id="7" name="Titre 1">
+            <a:extLst>
+              <a:ext uri="{FF2B5EF4-FFF2-40B4-BE49-F238E27FC236}">
+                <a16:creationId xmlns:a16="http://schemas.microsoft.com/office/drawing/2014/main" id="{1E93D889-9138-4324-B692-3587155996A7}"/>
+              </a:ext>
+            </a:extLst>
+          </p:cNvPr>
+          <p:cNvSpPr>
+            <a:spLocks noGrp="1"/>
+          </p:cNvSpPr>
+          <p:nvPr>
+            <p:ph type="title"/>
+          </p:nvPr>
+        </p:nvSpPr>
+        <p:spPr>
+          <a:xfrm>
+            <a:off x="0" y="669460"/>
+            <a:ext cx="12192000" cy="1134090"/>
+          </a:xfrm>
+        </p:spPr>
+        <p:txBody>
+          <a:bodyPr vert="horz" lIns="91440" tIns="45720" rIns="91440" bIns="45720" rtlCol="0" anchor="b">
+            <a:normAutofit/>
+          </a:bodyPr>
+          <a:lstStyle/>
+          <a:p>
+            <a:pPr algn="ctr">
+              <a:spcAft>
+                <a:spcPts val="600"/>
+              </a:spcAft>
+            </a:pPr>
+            <a:r>
+              <a:rPr lang="en-US" sz="6000" dirty="0" smtClean="0">
+                <a:solidFill>
+                  <a:schemeClr val="accent4"/>
+                </a:solidFill>
+                <a:latin typeface="+mn-lt"/>
+                <a:ea typeface="+mn-ea"/>
+                <a:cs typeface="+mn-cs"/>
+              </a:rPr>
+              <a:t>DEFINITION D’UN PANORAMA</a:t>
+            </a:r>
+            <a:endParaRPr lang="en-US" sz="6000" dirty="0">
+              <a:solidFill>
+                <a:schemeClr val="accent4"/>
+              </a:solidFill>
+              <a:latin typeface="+mn-lt"/>
+              <a:ea typeface="+mn-ea"/>
+              <a:cs typeface="+mn-cs"/>
+            </a:endParaRPr>
+          </a:p>
+        </p:txBody>
+      </p:sp>
+      <p:sp>
+        <p:nvSpPr>
+          <p:cNvPr id="8" name="Rectangle 7"/>
+          <p:cNvSpPr/>
+          <p:nvPr/>
+        </p:nvSpPr>
+        <p:spPr>
+          <a:xfrm>
+            <a:off x="1647496" y="2794234"/>
+            <a:ext cx="8897007" cy="1938992"/>
+          </a:xfrm>
+          <a:prstGeom prst="rect">
+            <a:avLst/>
+          </a:prstGeom>
+        </p:spPr>
+        <p:txBody>
+          <a:bodyPr wrap="square">
+            <a:spAutoFit/>
+          </a:bodyPr>
+          <a:lstStyle/>
+          <a:p>
+            <a:r>
+              <a:rPr lang="fr-FR" sz="2400" dirty="0">
+                <a:solidFill>
+                  <a:schemeClr val="bg1"/>
+                </a:solidFill>
+              </a:rPr>
+              <a:t>Un panorama est défini comme un enchainement de scènes composées de photos 360°. Ces scènes seront accompagnées de panneaux informatifs, de points de navigation permettant de circuler d’une scène à l’autre, et d’une carte interactive facilitant les déplacements et apportant une vue d’ensemble du panorama.</a:t>
+            </a:r>
+          </a:p>
+        </p:txBody>
+      </p:sp>
+    </p:spTree>
+    <p:extLst>
+      <p:ext uri="{BB962C8B-B14F-4D97-AF65-F5344CB8AC3E}">
+        <p14:creationId xmlns:p14="http://schemas.microsoft.com/office/powerpoint/2010/main" val="4160747563"/>
+      </p:ext>
+    </p:extLst>
+  </p:cSld>
+  <p:clrMapOvr>
+    <a:masterClrMapping/>
+  </p:clrMapOvr>
+</p:sld>
+</file>
+
+<file path=ppt/slides/slide8.xml><?xml version="1.0" encoding="utf-8"?>
+<p:sld xmlns:a="http://schemas.openxmlformats.org/drawingml/2006/main" xmlns:r="http://schemas.openxmlformats.org/officeDocument/2006/relationships" xmlns:p="http://schemas.openxmlformats.org/presentationml/2006/main">
+  <p:cSld>
+    <p:spTree>
+      <p:nvGrpSpPr>
+        <p:cNvPr id="1" name=""/>
+        <p:cNvGrpSpPr/>
+        <p:nvPr/>
+      </p:nvGrpSpPr>
+      <p:grpSpPr>
+        <a:xfrm>
+          <a:off x="0" y="0"/>
+          <a:ext cx="0" cy="0"/>
+          <a:chOff x="0" y="0"/>
+          <a:chExt cx="0" cy="0"/>
+        </a:xfrm>
+      </p:grpSpPr>
+      <p:pic>
+        <p:nvPicPr>
+          <p:cNvPr id="6" name="Image 5"/>
+          <p:cNvPicPr>
+            <a:picLocks noChangeAspect="1"/>
+          </p:cNvPicPr>
+          <p:nvPr/>
+        </p:nvPicPr>
+        <p:blipFill rotWithShape="1">
+          <a:blip r:embed="rId2"/>
+          <a:srcRect r="23414" b="14640"/>
+          <a:stretch/>
+        </p:blipFill>
+        <p:spPr>
+          <a:xfrm>
+            <a:off x="0" y="0"/>
+            <a:ext cx="12192000" cy="6858000"/>
+          </a:xfrm>
+          <a:prstGeom prst="rect">
+            <a:avLst/>
+          </a:prstGeom>
+        </p:spPr>
+      </p:pic>
+      <p:sp>
+        <p:nvSpPr>
+          <p:cNvPr id="5" name="Espace réservé du numéro de diapositive 4"/>
+          <p:cNvSpPr>
+            <a:spLocks noGrp="1"/>
+          </p:cNvSpPr>
+          <p:nvPr>
+            <p:ph type="sldNum" sz="quarter" idx="12"/>
+          </p:nvPr>
+        </p:nvSpPr>
+        <p:spPr/>
+        <p:txBody>
+          <a:bodyPr/>
+          <a:lstStyle/>
+          <a:p>
+            <a:fld id="{88DFB1D4-2421-4D0B-B32A-595002F349BD}" type="slidenum">
+              <a:rPr lang="fr-FR" smtClean="0"/>
+              <a:t>8</a:t>
+            </a:fld>
+            <a:endParaRPr lang="fr-FR"/>
+          </a:p>
+        </p:txBody>
+      </p:sp>
+      <p:sp>
+        <p:nvSpPr>
+          <p:cNvPr id="8" name="Titre 1">
+            <a:extLst>
+              <a:ext uri="{FF2B5EF4-FFF2-40B4-BE49-F238E27FC236}">
+                <a16:creationId xmlns:a16="http://schemas.microsoft.com/office/drawing/2014/main" id="{1E93D889-9138-4324-B692-3587155996A7}"/>
+              </a:ext>
+            </a:extLst>
+          </p:cNvPr>
+          <p:cNvSpPr>
+            <a:spLocks noGrp="1"/>
+          </p:cNvSpPr>
+          <p:nvPr>
+            <p:ph type="title"/>
+          </p:nvPr>
+        </p:nvSpPr>
+        <p:spPr>
+          <a:xfrm>
+            <a:off x="-2" y="461681"/>
+            <a:ext cx="12192000" cy="1134090"/>
+          </a:xfrm>
+        </p:spPr>
+        <p:txBody>
+          <a:bodyPr vert="horz" lIns="91440" tIns="45720" rIns="91440" bIns="45720" rtlCol="0" anchor="b">
+            <a:normAutofit/>
+          </a:bodyPr>
+          <a:lstStyle/>
+          <a:p>
+            <a:pPr algn="ctr">
+              <a:spcAft>
+                <a:spcPts val="600"/>
+              </a:spcAft>
+            </a:pPr>
+            <a:r>
+              <a:rPr lang="en-US" sz="6000" dirty="0" smtClean="0">
+                <a:solidFill>
+                  <a:schemeClr val="accent4"/>
+                </a:solidFill>
+                <a:latin typeface="+mn-lt"/>
+                <a:ea typeface="+mn-ea"/>
+                <a:cs typeface="+mn-cs"/>
+              </a:rPr>
+              <a:t>ANALYSE DU PANORAMA</a:t>
+            </a:r>
+            <a:endParaRPr lang="en-US" sz="6000" dirty="0">
+              <a:solidFill>
+                <a:schemeClr val="accent4"/>
+              </a:solidFill>
+              <a:latin typeface="+mn-lt"/>
+              <a:ea typeface="+mn-ea"/>
+              <a:cs typeface="+mn-cs"/>
+            </a:endParaRPr>
+          </a:p>
+        </p:txBody>
+      </p:sp>
+      <p:pic>
+        <p:nvPicPr>
+          <p:cNvPr id="10" name="Image 9"/>
+          <p:cNvPicPr>
+            <a:picLocks noChangeAspect="1"/>
+          </p:cNvPicPr>
+          <p:nvPr/>
+        </p:nvPicPr>
+        <p:blipFill>
+          <a:blip r:embed="rId3"/>
+          <a:stretch>
+            <a:fillRect/>
+          </a:stretch>
+        </p:blipFill>
+        <p:spPr>
+          <a:xfrm>
+            <a:off x="1902290" y="2057452"/>
+            <a:ext cx="8387419" cy="4044996"/>
+          </a:xfrm>
+          <a:prstGeom prst="rect">
+            <a:avLst/>
+          </a:prstGeom>
+        </p:spPr>
+      </p:pic>
+      <p:sp>
+        <p:nvSpPr>
+          <p:cNvPr id="12" name="ZoneTexte 11"/>
+          <p:cNvSpPr txBox="1"/>
+          <p:nvPr/>
+        </p:nvSpPr>
+        <p:spPr>
+          <a:xfrm>
+            <a:off x="1902289" y="6174154"/>
+            <a:ext cx="8387419" cy="382954"/>
+          </a:xfrm>
+          <a:prstGeom prst="rect">
+            <a:avLst/>
+          </a:prstGeom>
+          <a:noFill/>
+        </p:spPr>
+        <p:txBody>
+          <a:bodyPr wrap="square" rtlCol="0">
+            <a:spAutoFit/>
+          </a:bodyPr>
+          <a:lstStyle/>
+          <a:p>
+            <a:pPr algn="ctr"/>
+            <a:r>
+              <a:rPr lang="fr-FR" i="1" dirty="0" smtClean="0">
+                <a:solidFill>
+                  <a:schemeClr val="bg1"/>
+                </a:solidFill>
+              </a:rPr>
+              <a:t>Diagramme de cas d’utilisation</a:t>
+            </a:r>
+            <a:endParaRPr lang="fr-FR" i="1" dirty="0">
+              <a:solidFill>
+                <a:schemeClr val="bg1"/>
+              </a:solidFill>
+            </a:endParaRPr>
+          </a:p>
+        </p:txBody>
+      </p:sp>
+    </p:spTree>
+    <p:extLst>
+      <p:ext uri="{BB962C8B-B14F-4D97-AF65-F5344CB8AC3E}">
+        <p14:creationId xmlns:p14="http://schemas.microsoft.com/office/powerpoint/2010/main" val="2971345195"/>
+      </p:ext>
+    </p:extLst>
+  </p:cSld>
+  <p:clrMapOvr>
+    <a:masterClrMapping/>
+  </p:clrMapOvr>
+</p:sld>
+</file>
+
+<file path=ppt/slides/slide9.xml><?xml version="1.0" encoding="utf-8"?>
+<p:sld xmlns:a="http://schemas.openxmlformats.org/drawingml/2006/main" xmlns:r="http://schemas.openxmlformats.org/officeDocument/2006/relationships" xmlns:p="http://schemas.openxmlformats.org/presentationml/2006/main">
+  <p:cSld>
+    <p:spTree>
+      <p:nvGrpSpPr>
+        <p:cNvPr id="1" name=""/>
+        <p:cNvGrpSpPr/>
+        <p:nvPr/>
+      </p:nvGrpSpPr>
+      <p:grpSpPr>
+        <a:xfrm>
+          <a:off x="0" y="0"/>
+          <a:ext cx="0" cy="0"/>
+          <a:chOff x="0" y="0"/>
+          <a:chExt cx="0" cy="0"/>
+        </a:xfrm>
+      </p:grpSpPr>
+      <p:pic>
+        <p:nvPicPr>
+          <p:cNvPr id="6" name="Image 5"/>
+          <p:cNvPicPr>
+            <a:picLocks noChangeAspect="1"/>
+          </p:cNvPicPr>
+          <p:nvPr/>
+        </p:nvPicPr>
+        <p:blipFill rotWithShape="1">
+          <a:blip r:embed="rId2"/>
+          <a:srcRect r="23414" b="14640"/>
+          <a:stretch/>
+        </p:blipFill>
+        <p:spPr>
+          <a:xfrm>
+            <a:off x="0" y="0"/>
+            <a:ext cx="12192000" cy="6858000"/>
+          </a:xfrm>
+          <a:prstGeom prst="rect">
+            <a:avLst/>
+          </a:prstGeom>
+        </p:spPr>
+      </p:pic>
+      <p:sp>
+        <p:nvSpPr>
+          <p:cNvPr id="5" name="Espace réservé du numéro de diapositive 4"/>
+          <p:cNvSpPr>
+            <a:spLocks noGrp="1"/>
+          </p:cNvSpPr>
+          <p:nvPr>
+            <p:ph type="sldNum" sz="quarter" idx="12"/>
+          </p:nvPr>
+        </p:nvSpPr>
+        <p:spPr/>
+        <p:txBody>
+          <a:bodyPr/>
+          <a:lstStyle/>
+          <a:p>
+            <a:fld id="{88DFB1D4-2421-4D0B-B32A-595002F349BD}" type="slidenum">
+              <a:rPr lang="fr-FR" smtClean="0"/>
+              <a:t>9</a:t>
+            </a:fld>
+            <a:endParaRPr lang="fr-FR"/>
+          </a:p>
+        </p:txBody>
+      </p:sp>
+      <p:sp>
+        <p:nvSpPr>
+          <p:cNvPr id="8" name="Titre 1">
+            <a:extLst>
+              <a:ext uri="{FF2B5EF4-FFF2-40B4-BE49-F238E27FC236}">
+                <a16:creationId xmlns:a16="http://schemas.microsoft.com/office/drawing/2014/main" id="{1E93D889-9138-4324-B692-3587155996A7}"/>
+              </a:ext>
+            </a:extLst>
+          </p:cNvPr>
+          <p:cNvSpPr>
+            <a:spLocks noGrp="1"/>
+          </p:cNvSpPr>
+          <p:nvPr>
+            <p:ph type="title"/>
+          </p:nvPr>
+        </p:nvSpPr>
+        <p:spPr>
+          <a:xfrm>
+            <a:off x="-3" y="425193"/>
+            <a:ext cx="12192000" cy="1134090"/>
+          </a:xfrm>
+        </p:spPr>
+        <p:txBody>
+          <a:bodyPr vert="horz" lIns="91440" tIns="45720" rIns="91440" bIns="45720" rtlCol="0" anchor="b">
+            <a:normAutofit/>
+          </a:bodyPr>
+          <a:lstStyle/>
+          <a:p>
+            <a:pPr algn="ctr">
+              <a:spcAft>
+                <a:spcPts val="600"/>
+              </a:spcAft>
+            </a:pPr>
+            <a:r>
+              <a:rPr lang="en-US" sz="6000" dirty="0" smtClean="0">
+                <a:solidFill>
+                  <a:schemeClr val="accent4"/>
+                </a:solidFill>
+                <a:latin typeface="+mn-lt"/>
+                <a:ea typeface="+mn-ea"/>
+                <a:cs typeface="+mn-cs"/>
+              </a:rPr>
+              <a:t>ANALYSE DU PANORAMA</a:t>
+            </a:r>
+            <a:endParaRPr lang="en-US" sz="6000" dirty="0">
+              <a:solidFill>
+                <a:schemeClr val="accent4"/>
+              </a:solidFill>
+              <a:latin typeface="+mn-lt"/>
+              <a:ea typeface="+mn-ea"/>
+              <a:cs typeface="+mn-cs"/>
+            </a:endParaRPr>
+          </a:p>
+        </p:txBody>
+      </p:sp>
+      <p:sp>
+        <p:nvSpPr>
+          <p:cNvPr id="12" name="ZoneTexte 11"/>
+          <p:cNvSpPr txBox="1"/>
+          <p:nvPr/>
+        </p:nvSpPr>
+        <p:spPr>
+          <a:xfrm>
+            <a:off x="1902289" y="6174154"/>
+            <a:ext cx="8387419" cy="382954"/>
+          </a:xfrm>
+          <a:prstGeom prst="rect">
+            <a:avLst/>
+          </a:prstGeom>
+          <a:noFill/>
+        </p:spPr>
+        <p:txBody>
+          <a:bodyPr wrap="square" rtlCol="0">
+            <a:spAutoFit/>
+          </a:bodyPr>
+          <a:lstStyle/>
+          <a:p>
+            <a:pPr algn="ctr"/>
+            <a:r>
+              <a:rPr lang="fr-FR" i="1" dirty="0" smtClean="0">
+                <a:solidFill>
+                  <a:schemeClr val="bg1"/>
+                </a:solidFill>
+              </a:rPr>
+              <a:t>Diagramme de classe</a:t>
+            </a:r>
+            <a:endParaRPr lang="fr-FR" i="1" dirty="0">
+              <a:solidFill>
+                <a:schemeClr val="bg1"/>
+              </a:solidFill>
+            </a:endParaRPr>
+          </a:p>
+        </p:txBody>
+      </p:sp>
+      <p:pic>
+        <p:nvPicPr>
+          <p:cNvPr id="2" name="Image 1"/>
+          <p:cNvPicPr>
+            <a:picLocks noChangeAspect="1"/>
+          </p:cNvPicPr>
+          <p:nvPr/>
+        </p:nvPicPr>
+        <p:blipFill>
+          <a:blip r:embed="rId3"/>
+          <a:stretch>
+            <a:fillRect/>
+          </a:stretch>
+        </p:blipFill>
+        <p:spPr>
+          <a:xfrm>
+            <a:off x="2068484" y="1984476"/>
+            <a:ext cx="8055027" cy="4008752"/>
+          </a:xfrm>
+          <a:prstGeom prst="rect">
+            <a:avLst/>
+          </a:prstGeom>
+        </p:spPr>
+      </p:pic>
+    </p:spTree>
+    <p:extLst>
+      <p:ext uri="{BB962C8B-B14F-4D97-AF65-F5344CB8AC3E}">
+        <p14:creationId xmlns:p14="http://schemas.microsoft.com/office/powerpoint/2010/main" val="2491028048"/>
+      </p:ext>
+    </p:extLst>
+  </p:cSld>
+  <p:clrMapOvr>
+    <a:masterClrMapping/>
   </p:clrMapOvr>
 </p:sld>
 </file>
@@ -5865,4 +8243,265 @@
     </a:ext>
   </a:extLst>
 </a:theme>
+</file>
+
+<file path=ppt/theme/theme2.xml><?xml version="1.0" encoding="utf-8"?>
+<a:theme xmlns:a="http://schemas.openxmlformats.org/drawingml/2006/main" name="Thème Office">
+  <a:themeElements>
+    <a:clrScheme name="Office">
+      <a:dk1>
+        <a:sysClr val="windowText" lastClr="000000"/>
+      </a:dk1>
+      <a:lt1>
+        <a:sysClr val="window" lastClr="FFFFFF"/>
+      </a:lt1>
+      <a:dk2>
+        <a:srgbClr val="44546A"/>
+      </a:dk2>
+      <a:lt2>
+        <a:srgbClr val="E7E6E6"/>
+      </a:lt2>
+      <a:accent1>
+        <a:srgbClr val="5B9BD5"/>
+      </a:accent1>
+      <a:accent2>
+        <a:srgbClr val="ED7D31"/>
+      </a:accent2>
+      <a:accent3>
+        <a:srgbClr val="A5A5A5"/>
+      </a:accent3>
+      <a:accent4>
+        <a:srgbClr val="FFC000"/>
+      </a:accent4>
+      <a:accent5>
+        <a:srgbClr val="4472C4"/>
+      </a:accent5>
+      <a:accent6>
+        <a:srgbClr val="70AD47"/>
+      </a:accent6>
+      <a:hlink>
+        <a:srgbClr val="0563C1"/>
+      </a:hlink>
+      <a:folHlink>
+        <a:srgbClr val="954F72"/>
+      </a:folHlink>
+    </a:clrScheme>
+    <a:fontScheme name="Office">
+      <a:majorFont>
+        <a:latin typeface="Calibri Light" panose="020F0302020204030204"/>
+        <a:ea typeface=""/>
+        <a:cs typeface=""/>
+        <a:font script="Jpan" typeface="游ゴシック Light"/>
+        <a:font script="Hang" typeface="맑은 고딕"/>
+        <a:font script="Hans" typeface="等线 Light"/>
+        <a:font script="Hant" typeface="新細明體"/>
+        <a:font script="Arab" typeface="Times New Roman"/>
+        <a:font script="Hebr" typeface="Times New Roman"/>
+        <a:font script="Thai" typeface="Angsana New"/>
+        <a:font script="Ethi" typeface="Nyala"/>
+        <a:font script="Beng" typeface="Vrinda"/>
+        <a:font script="Gujr" typeface="Shruti"/>
+        <a:font script="Khmr" typeface="MoolBoran"/>
+        <a:font script="Knda" typeface="Tunga"/>
+        <a:font script="Guru" typeface="Raavi"/>
+        <a:font script="Cans" typeface="Euphemia"/>
+        <a:font script="Cher" typeface="Plantagenet Cherokee"/>
+        <a:font script="Yiii" typeface="Microsoft Yi Baiti"/>
+        <a:font script="Tibt" typeface="Microsoft Himalaya"/>
+        <a:font script="Thaa" typeface="MV Boli"/>
+        <a:font script="Deva" typeface="Mangal"/>
+        <a:font script="Telu" typeface="Gautami"/>
+        <a:font script="Taml" typeface="Latha"/>
+        <a:font script="Syrc" typeface="Estrangelo Edessa"/>
+        <a:font script="Orya" typeface="Kalinga"/>
+        <a:font script="Mlym" typeface="Kartika"/>
+        <a:font script="Laoo" typeface="DokChampa"/>
+        <a:font script="Sinh" typeface="Iskoola Pota"/>
+        <a:font script="Mong" typeface="Mongolian Baiti"/>
+        <a:font script="Viet" typeface="Times New Roman"/>
+        <a:font script="Uigh" typeface="Microsoft Uighur"/>
+        <a:font script="Geor" typeface="Sylfaen"/>
+      </a:majorFont>
+      <a:minorFont>
+        <a:latin typeface="Calibri" panose="020F0502020204030204"/>
+        <a:ea typeface=""/>
+        <a:cs typeface=""/>
+        <a:font script="Jpan" typeface="游ゴシック"/>
+        <a:font script="Hang" typeface="맑은 고딕"/>
+        <a:font script="Hans" typeface="等线"/>
+        <a:font script="Hant" typeface="新細明體"/>
+        <a:font script="Arab" typeface="Arial"/>
+        <a:font script="Hebr" typeface="Arial"/>
+        <a:font script="Thai" typeface="Cordia New"/>
+        <a:font script="Ethi" typeface="Nyala"/>
+        <a:font script="Beng" typeface="Vrinda"/>
+        <a:font script="Gujr" typeface="Shruti"/>
+        <a:font script="Khmr" typeface="DaunPenh"/>
+        <a:font script="Knda" typeface="Tunga"/>
+        <a:font script="Guru" typeface="Raavi"/>
+        <a:font script="Cans" typeface="Euphemia"/>
+        <a:font script="Cher" typeface="Plantagenet Cherokee"/>
+        <a:font script="Yiii" typeface="Microsoft Yi Baiti"/>
+        <a:font script="Tibt" typeface="Microsoft Himalaya"/>
+        <a:font script="Thaa" typeface="MV Boli"/>
+        <a:font script="Deva" typeface="Mangal"/>
+        <a:font script="Telu" typeface="Gautami"/>
+        <a:font script="Taml" typeface="Latha"/>
+        <a:font script="Syrc" typeface="Estrangelo Edessa"/>
+        <a:font script="Orya" typeface="Kalinga"/>
+        <a:font script="Mlym" typeface="Kartika"/>
+        <a:font script="Laoo" typeface="DokChampa"/>
+        <a:font script="Sinh" typeface="Iskoola Pota"/>
+        <a:font script="Mong" typeface="Mongolian Baiti"/>
+        <a:font script="Viet" typeface="Arial"/>
+        <a:font script="Uigh" typeface="Microsoft Uighur"/>
+        <a:font script="Geor" typeface="Sylfaen"/>
+      </a:minorFont>
+    </a:fontScheme>
+    <a:fmtScheme name="Office">
+      <a:fillStyleLst>
+        <a:solidFill>
+          <a:schemeClr val="phClr"/>
+        </a:solidFill>
+        <a:gradFill rotWithShape="1">
+          <a:gsLst>
+            <a:gs pos="0">
+              <a:schemeClr val="phClr">
+                <a:lumMod val="110000"/>
+                <a:satMod val="105000"/>
+                <a:tint val="67000"/>
+              </a:schemeClr>
+            </a:gs>
+            <a:gs pos="50000">
+              <a:schemeClr val="phClr">
+                <a:lumMod val="105000"/>
+                <a:satMod val="103000"/>
+                <a:tint val="73000"/>
+              </a:schemeClr>
+            </a:gs>
+            <a:gs pos="100000">
+              <a:schemeClr val="phClr">
+                <a:lumMod val="105000"/>
+                <a:satMod val="109000"/>
+                <a:tint val="81000"/>
+              </a:schemeClr>
+            </a:gs>
+          </a:gsLst>
+          <a:lin ang="5400000" scaled="0"/>
+        </a:gradFill>
+        <a:gradFill rotWithShape="1">
+          <a:gsLst>
+            <a:gs pos="0">
+              <a:schemeClr val="phClr">
+                <a:satMod val="103000"/>
+                <a:lumMod val="102000"/>
+                <a:tint val="94000"/>
+              </a:schemeClr>
+            </a:gs>
+            <a:gs pos="50000">
+              <a:schemeClr val="phClr">
+                <a:satMod val="110000"/>
+                <a:lumMod val="100000"/>
+                <a:shade val="100000"/>
+              </a:schemeClr>
+            </a:gs>
+            <a:gs pos="100000">
+              <a:schemeClr val="phClr">
+                <a:lumMod val="99000"/>
+                <a:satMod val="120000"/>
+                <a:shade val="78000"/>
+              </a:schemeClr>
+            </a:gs>
+          </a:gsLst>
+          <a:lin ang="5400000" scaled="0"/>
+        </a:gradFill>
+      </a:fillStyleLst>
+      <a:lnStyleLst>
+        <a:ln w="6350" cap="flat" cmpd="sng" algn="ctr">
+          <a:solidFill>
+            <a:schemeClr val="phClr"/>
+          </a:solidFill>
+          <a:prstDash val="solid"/>
+          <a:miter lim="800000"/>
+        </a:ln>
+        <a:ln w="12700" cap="flat" cmpd="sng" algn="ctr">
+          <a:solidFill>
+            <a:schemeClr val="phClr"/>
+          </a:solidFill>
+          <a:prstDash val="solid"/>
+          <a:miter lim="800000"/>
+        </a:ln>
+        <a:ln w="19050" cap="flat" cmpd="sng" algn="ctr">
+          <a:solidFill>
+            <a:schemeClr val="phClr"/>
+          </a:solidFill>
+          <a:prstDash val="solid"/>
+          <a:miter lim="800000"/>
+        </a:ln>
+      </a:lnStyleLst>
+      <a:effectStyleLst>
+        <a:effectStyle>
+          <a:effectLst/>
+        </a:effectStyle>
+        <a:effectStyle>
+          <a:effectLst/>
+        </a:effectStyle>
+        <a:effectStyle>
+          <a:effectLst>
+            <a:outerShdw blurRad="57150" dist="19050" dir="5400000" algn="ctr" rotWithShape="0">
+              <a:srgbClr val="000000">
+                <a:alpha val="63000"/>
+              </a:srgbClr>
+            </a:outerShdw>
+          </a:effectLst>
+        </a:effectStyle>
+      </a:effectStyleLst>
+      <a:bgFillStyleLst>
+        <a:solidFill>
+          <a:schemeClr val="phClr"/>
+        </a:solidFill>
+        <a:solidFill>
+          <a:schemeClr val="phClr">
+            <a:tint val="95000"/>
+            <a:satMod val="170000"/>
+          </a:schemeClr>
+        </a:solidFill>
+        <a:gradFill rotWithShape="1">
+          <a:gsLst>
+            <a:gs pos="0">
+              <a:schemeClr val="phClr">
+                <a:tint val="93000"/>
+                <a:satMod val="150000"/>
+                <a:shade val="98000"/>
+                <a:lumMod val="102000"/>
+              </a:schemeClr>
+            </a:gs>
+            <a:gs pos="50000">
+              <a:schemeClr val="phClr">
+                <a:tint val="98000"/>
+                <a:satMod val="130000"/>
+                <a:shade val="90000"/>
+                <a:lumMod val="103000"/>
+              </a:schemeClr>
+            </a:gs>
+            <a:gs pos="100000">
+              <a:schemeClr val="phClr">
+                <a:shade val="63000"/>
+                <a:satMod val="120000"/>
+              </a:schemeClr>
+            </a:gs>
+          </a:gsLst>
+          <a:lin ang="5400000" scaled="0"/>
+        </a:gradFill>
+      </a:bgFillStyleLst>
+    </a:fmtScheme>
+  </a:themeElements>
+  <a:objectDefaults/>
+  <a:extraClrSchemeLst/>
+  <a:extLst>
+    <a:ext uri="{05A4C25C-085E-4340-85A3-A5531E510DB2}">
+      <thm15:themeFamily xmlns:thm15="http://schemas.microsoft.com/office/thememl/2012/main" name="Office Theme" id="{62F939B6-93AF-4DB8-9C6B-D6C7DFDC589F}" vid="{4A3C46E8-61CC-4603-A589-7422A47A8E4A}"/>
+    </a:ext>
+  </a:extLst>
+</a:theme>
 </file>
</xml_diff>

<commit_message>
J'ai refait ma diapo sur les techno
</commit_message>
<xml_diff>
--- a/Soutenance/Diaporama soutenance.pptx
+++ b/Soutenance/Diaporama soutenance.pptx
@@ -10,8 +10,8 @@
   <p:sldIdLst>
     <p:sldId id="276" r:id="rId2"/>
     <p:sldId id="259" r:id="rId3"/>
-    <p:sldId id="256" r:id="rId4"/>
-    <p:sldId id="260" r:id="rId5"/>
+    <p:sldId id="260" r:id="rId4"/>
+    <p:sldId id="256" r:id="rId5"/>
     <p:sldId id="257" r:id="rId6"/>
     <p:sldId id="266" r:id="rId7"/>
     <p:sldId id="267" r:id="rId8"/>
@@ -211,7 +211,7 @@
           <a:p>
             <a:fld id="{BB37FE4E-BDFC-4658-A143-980754432A1D}" type="datetimeFigureOut">
               <a:rPr lang="fr-FR" smtClean="0"/>
-              <a:t>11/01/2021</a:t>
+              <a:t>17/01/2021</a:t>
             </a:fld>
             <a:endParaRPr lang="fr-FR"/>
           </a:p>
@@ -275,38 +275,37 @@
           <a:p>
             <a:pPr lvl="0"/>
             <a:r>
-              <a:rPr lang="fr-FR" smtClean="0"/>
+              <a:rPr lang="fr-FR"/>
               <a:t>Modifier les styles du texte du masque</a:t>
             </a:r>
           </a:p>
           <a:p>
             <a:pPr lvl="1"/>
             <a:r>
-              <a:rPr lang="fr-FR" smtClean="0"/>
+              <a:rPr lang="fr-FR"/>
               <a:t>Deuxième niveau</a:t>
             </a:r>
           </a:p>
           <a:p>
             <a:pPr lvl="2"/>
             <a:r>
-              <a:rPr lang="fr-FR" smtClean="0"/>
+              <a:rPr lang="fr-FR"/>
               <a:t>Troisième niveau</a:t>
             </a:r>
           </a:p>
           <a:p>
             <a:pPr lvl="3"/>
             <a:r>
-              <a:rPr lang="fr-FR" smtClean="0"/>
+              <a:rPr lang="fr-FR"/>
               <a:t>Quatrième niveau</a:t>
             </a:r>
           </a:p>
           <a:p>
             <a:pPr lvl="4"/>
             <a:r>
-              <a:rPr lang="fr-FR" smtClean="0"/>
+              <a:rPr lang="fr-FR"/>
               <a:t>Cinquième niveau</a:t>
             </a:r>
-            <a:endParaRPr lang="fr-FR"/>
           </a:p>
         </p:txBody>
       </p:sp>
@@ -626,7 +625,7 @@
           <a:p>
             <a:fld id="{532671B3-BBF1-4F1B-9872-014DD00A38C4}" type="datetime1">
               <a:rPr lang="fr-FR" smtClean="0"/>
-              <a:t>11/01/2021</a:t>
+              <a:t>17/01/2021</a:t>
             </a:fld>
             <a:endParaRPr lang="fr-FR"/>
           </a:p>
@@ -824,7 +823,7 @@
           <a:p>
             <a:fld id="{CB013246-8A02-4883-98A1-0C44042449B6}" type="datetime1">
               <a:rPr lang="fr-FR" smtClean="0"/>
-              <a:t>11/01/2021</a:t>
+              <a:t>17/01/2021</a:t>
             </a:fld>
             <a:endParaRPr lang="fr-FR"/>
           </a:p>
@@ -1032,7 +1031,7 @@
           <a:p>
             <a:fld id="{2754B2FC-0EA2-4C92-9113-9051C0391890}" type="datetime1">
               <a:rPr lang="fr-FR" smtClean="0"/>
-              <a:t>11/01/2021</a:t>
+              <a:t>17/01/2021</a:t>
             </a:fld>
             <a:endParaRPr lang="fr-FR"/>
           </a:p>
@@ -1230,7 +1229,7 @@
           <a:p>
             <a:fld id="{A28C7E96-FF72-4820-B8FD-D2293A20729D}" type="datetime1">
               <a:rPr lang="fr-FR" smtClean="0"/>
-              <a:t>11/01/2021</a:t>
+              <a:t>17/01/2021</a:t>
             </a:fld>
             <a:endParaRPr lang="fr-FR"/>
           </a:p>
@@ -1505,7 +1504,7 @@
           <a:p>
             <a:fld id="{04D6765C-484A-4F20-8513-C0921D8879B5}" type="datetime1">
               <a:rPr lang="fr-FR" smtClean="0"/>
-              <a:t>11/01/2021</a:t>
+              <a:t>17/01/2021</a:t>
             </a:fld>
             <a:endParaRPr lang="fr-FR"/>
           </a:p>
@@ -1770,7 +1769,7 @@
           <a:p>
             <a:fld id="{D6E58875-16B3-46DF-B5F8-DED33905D277}" type="datetime1">
               <a:rPr lang="fr-FR" smtClean="0"/>
-              <a:t>11/01/2021</a:t>
+              <a:t>17/01/2021</a:t>
             </a:fld>
             <a:endParaRPr lang="fr-FR"/>
           </a:p>
@@ -2182,7 +2181,7 @@
           <a:p>
             <a:fld id="{E4FD66E8-45C9-401B-B4AF-BA151BF897A7}" type="datetime1">
               <a:rPr lang="fr-FR" smtClean="0"/>
-              <a:t>11/01/2021</a:t>
+              <a:t>17/01/2021</a:t>
             </a:fld>
             <a:endParaRPr lang="fr-FR"/>
           </a:p>
@@ -2323,7 +2322,7 @@
           <a:p>
             <a:fld id="{2C90D6E2-414C-40A1-9E78-B4F718CCF9DF}" type="datetime1">
               <a:rPr lang="fr-FR" smtClean="0"/>
-              <a:t>11/01/2021</a:t>
+              <a:t>17/01/2021</a:t>
             </a:fld>
             <a:endParaRPr lang="fr-FR"/>
           </a:p>
@@ -2436,7 +2435,7 @@
           <a:p>
             <a:fld id="{E4BD776A-4E68-458E-8545-6DDFECAF07F8}" type="datetime1">
               <a:rPr lang="fr-FR" smtClean="0"/>
-              <a:t>11/01/2021</a:t>
+              <a:t>17/01/2021</a:t>
             </a:fld>
             <a:endParaRPr lang="fr-FR"/>
           </a:p>
@@ -2747,7 +2746,7 @@
           <a:p>
             <a:fld id="{75F3563C-E2D2-4B56-9A5D-AFC36D77BFF1}" type="datetime1">
               <a:rPr lang="fr-FR" smtClean="0"/>
-              <a:t>11/01/2021</a:t>
+              <a:t>17/01/2021</a:t>
             </a:fld>
             <a:endParaRPr lang="fr-FR"/>
           </a:p>
@@ -3035,7 +3034,7 @@
           <a:p>
             <a:fld id="{CB94E930-B493-4395-8195-A9F27F433C32}" type="datetime1">
               <a:rPr lang="fr-FR" smtClean="0"/>
-              <a:t>11/01/2021</a:t>
+              <a:t>17/01/2021</a:t>
             </a:fld>
             <a:endParaRPr lang="fr-FR"/>
           </a:p>
@@ -3276,7 +3275,7 @@
           <a:p>
             <a:fld id="{CC343135-F2A1-4B47-9F59-97AB1321E09E}" type="datetime1">
               <a:rPr lang="fr-FR" smtClean="0"/>
-              <a:t>11/01/2021</a:t>
+              <a:t>17/01/2021</a:t>
             </a:fld>
             <a:endParaRPr lang="fr-FR"/>
           </a:p>
@@ -4035,7 +4034,7 @@
               </a:spcAft>
             </a:pPr>
             <a:r>
-              <a:rPr lang="en-US" sz="6000" dirty="0" smtClean="0">
+              <a:rPr lang="en-US" sz="6000" dirty="0">
                 <a:solidFill>
                   <a:schemeClr val="accent4"/>
                 </a:solidFill>
@@ -4045,14 +4044,6 @@
               </a:rPr>
               <a:t>ANALYSE DU GENERATEUR</a:t>
             </a:r>
-            <a:endParaRPr lang="en-US" sz="6000" dirty="0">
-              <a:solidFill>
-                <a:schemeClr val="accent4"/>
-              </a:solidFill>
-              <a:latin typeface="+mn-lt"/>
-              <a:ea typeface="+mn-ea"/>
-              <a:cs typeface="+mn-cs"/>
-            </a:endParaRPr>
           </a:p>
         </p:txBody>
       </p:sp>
@@ -4080,18 +4071,13 @@
           <a:p>
             <a:pPr algn="ctr"/>
             <a:r>
-              <a:rPr lang="fr-FR" i="1" dirty="0" smtClean="0">
+              <a:rPr lang="fr-FR" i="1" dirty="0">
                 <a:solidFill>
                   <a:schemeClr val="bg1"/>
                 </a:solidFill>
               </a:rPr>
               <a:t>Diagramme de cas d’utilisation</a:t>
             </a:r>
-            <a:endParaRPr lang="fr-FR" i="1" dirty="0">
-              <a:solidFill>
-                <a:schemeClr val="bg1"/>
-              </a:solidFill>
-            </a:endParaRPr>
           </a:p>
         </p:txBody>
       </p:sp>
@@ -4227,7 +4213,7 @@
               </a:spcAft>
             </a:pPr>
             <a:r>
-              <a:rPr lang="en-US" sz="6000" dirty="0" smtClean="0">
+              <a:rPr lang="en-US" sz="6000" dirty="0">
                 <a:solidFill>
                   <a:schemeClr val="accent4"/>
                 </a:solidFill>
@@ -4237,14 +4223,6 @@
               </a:rPr>
               <a:t>ANALYSE DU GENERATEUR</a:t>
             </a:r>
-            <a:endParaRPr lang="en-US" sz="6000" dirty="0">
-              <a:solidFill>
-                <a:schemeClr val="accent4"/>
-              </a:solidFill>
-              <a:latin typeface="+mn-lt"/>
-              <a:ea typeface="+mn-ea"/>
-              <a:cs typeface="+mn-cs"/>
-            </a:endParaRPr>
           </a:p>
         </p:txBody>
       </p:sp>
@@ -4272,18 +4250,13 @@
           <a:p>
             <a:pPr algn="ctr"/>
             <a:r>
-              <a:rPr lang="fr-FR" i="1" dirty="0" smtClean="0">
+              <a:rPr lang="fr-FR" i="1" dirty="0">
                 <a:solidFill>
                   <a:schemeClr val="bg1"/>
                 </a:solidFill>
               </a:rPr>
               <a:t>Diagramme d’activité</a:t>
             </a:r>
-            <a:endParaRPr lang="fr-FR" i="1" dirty="0">
-              <a:solidFill>
-                <a:schemeClr val="bg1"/>
-              </a:solidFill>
-            </a:endParaRPr>
           </a:p>
         </p:txBody>
       </p:sp>
@@ -4419,7 +4392,7 @@
               </a:spcAft>
             </a:pPr>
             <a:r>
-              <a:rPr lang="en-US" sz="6000" dirty="0" smtClean="0">
+              <a:rPr lang="en-US" sz="6000" dirty="0">
                 <a:solidFill>
                   <a:schemeClr val="accent4"/>
                 </a:solidFill>
@@ -4429,14 +4402,6 @@
               </a:rPr>
               <a:t>ANALYSE DU GENERATEUR</a:t>
             </a:r>
-            <a:endParaRPr lang="en-US" sz="6000" dirty="0">
-              <a:solidFill>
-                <a:schemeClr val="accent4"/>
-              </a:solidFill>
-              <a:latin typeface="+mn-lt"/>
-              <a:ea typeface="+mn-ea"/>
-              <a:cs typeface="+mn-cs"/>
-            </a:endParaRPr>
           </a:p>
         </p:txBody>
       </p:sp>
@@ -4464,18 +4429,13 @@
           <a:p>
             <a:pPr algn="ctr"/>
             <a:r>
-              <a:rPr lang="fr-FR" i="1" dirty="0" smtClean="0">
+              <a:rPr lang="fr-FR" i="1" dirty="0">
                 <a:solidFill>
                   <a:schemeClr val="bg1"/>
                 </a:solidFill>
               </a:rPr>
               <a:t>Diagramme de classe</a:t>
             </a:r>
-            <a:endParaRPr lang="fr-FR" i="1" dirty="0">
-              <a:solidFill>
-                <a:schemeClr val="bg1"/>
-              </a:solidFill>
-            </a:endParaRPr>
           </a:p>
         </p:txBody>
       </p:sp>
@@ -4611,7 +4571,7 @@
               </a:spcAft>
             </a:pPr>
             <a:r>
-              <a:rPr lang="en-US" sz="6000" dirty="0" smtClean="0">
+              <a:rPr lang="en-US" sz="6000" dirty="0">
                 <a:solidFill>
                   <a:schemeClr val="accent4"/>
                 </a:solidFill>
@@ -4621,14 +4581,6 @@
               </a:rPr>
               <a:t>A-FRAME</a:t>
             </a:r>
-            <a:endParaRPr lang="en-US" sz="6000" dirty="0">
-              <a:solidFill>
-                <a:schemeClr val="accent4"/>
-              </a:solidFill>
-              <a:latin typeface="+mn-lt"/>
-              <a:ea typeface="+mn-ea"/>
-              <a:cs typeface="+mn-cs"/>
-            </a:endParaRPr>
           </a:p>
         </p:txBody>
       </p:sp>
@@ -4654,18 +4606,13 @@
           <a:lstStyle/>
           <a:p>
             <a:r>
-              <a:rPr lang="fr-FR" sz="2400" dirty="0" smtClean="0">
+              <a:rPr lang="fr-FR" sz="2400" dirty="0">
                 <a:solidFill>
                   <a:schemeClr val="bg1"/>
                 </a:solidFill>
               </a:rPr>
               <a:t>A-Frame est un Framework créé en décembre 2015. Il open-source libre sous licence MIT pour la construction d’expériences de réalité virtuelle.</a:t>
             </a:r>
-            <a:endParaRPr lang="fr-FR" sz="2400" dirty="0">
-              <a:solidFill>
-                <a:schemeClr val="bg1"/>
-              </a:solidFill>
-            </a:endParaRPr>
           </a:p>
         </p:txBody>
       </p:sp>
@@ -4779,7 +4726,7 @@
               </a:spcAft>
             </a:pPr>
             <a:r>
-              <a:rPr lang="en-US" sz="6000" dirty="0" smtClean="0">
+              <a:rPr lang="en-US" sz="6000" dirty="0">
                 <a:solidFill>
                   <a:schemeClr val="accent4"/>
                 </a:solidFill>
@@ -4789,14 +4736,6 @@
               </a:rPr>
               <a:t>EXEMPLE CODE A-FRAME</a:t>
             </a:r>
-            <a:endParaRPr lang="en-US" sz="6000" dirty="0">
-              <a:solidFill>
-                <a:schemeClr val="accent4"/>
-              </a:solidFill>
-              <a:latin typeface="+mn-lt"/>
-              <a:ea typeface="+mn-ea"/>
-              <a:cs typeface="+mn-cs"/>
-            </a:endParaRPr>
           </a:p>
         </p:txBody>
       </p:sp>
@@ -4951,7 +4890,7 @@
               </a:spcAft>
             </a:pPr>
             <a:r>
-              <a:rPr lang="en-US" sz="6000" dirty="0" smtClean="0">
+              <a:rPr lang="en-US" sz="6000" dirty="0">
                 <a:solidFill>
                   <a:schemeClr val="accent4"/>
                 </a:solidFill>
@@ -4961,14 +4900,6 @@
               </a:rPr>
               <a:t>EXEMPLE CODE A-FRAME</a:t>
             </a:r>
-            <a:endParaRPr lang="en-US" sz="6000" dirty="0">
-              <a:solidFill>
-                <a:schemeClr val="accent4"/>
-              </a:solidFill>
-              <a:latin typeface="+mn-lt"/>
-              <a:ea typeface="+mn-ea"/>
-              <a:cs typeface="+mn-cs"/>
-            </a:endParaRPr>
           </a:p>
         </p:txBody>
       </p:sp>
@@ -5785,181 +5716,6 @@
 <file path=ppt/slides/slide3.xml><?xml version="1.0" encoding="utf-8"?>
 <p:sld xmlns:a="http://schemas.openxmlformats.org/drawingml/2006/main" xmlns:r="http://schemas.openxmlformats.org/officeDocument/2006/relationships" xmlns:p="http://schemas.openxmlformats.org/presentationml/2006/main">
   <p:cSld>
-    <p:spTree>
-      <p:nvGrpSpPr>
-        <p:cNvPr id="1" name=""/>
-        <p:cNvGrpSpPr/>
-        <p:nvPr/>
-      </p:nvGrpSpPr>
-      <p:grpSpPr>
-        <a:xfrm>
-          <a:off x="0" y="0"/>
-          <a:ext cx="0" cy="0"/>
-          <a:chOff x="0" y="0"/>
-          <a:chExt cx="0" cy="0"/>
-        </a:xfrm>
-      </p:grpSpPr>
-      <p:pic>
-        <p:nvPicPr>
-          <p:cNvPr id="5" name="Image 4">
-            <a:extLst>
-              <a:ext uri="{FF2B5EF4-FFF2-40B4-BE49-F238E27FC236}">
-                <a16:creationId xmlns:a16="http://schemas.microsoft.com/office/drawing/2014/main" id="{20AF37C8-99B4-4C3B-9EA2-1557CB9D7439}"/>
-              </a:ext>
-            </a:extLst>
-          </p:cNvPr>
-          <p:cNvPicPr>
-            <a:picLocks noChangeAspect="1"/>
-          </p:cNvPicPr>
-          <p:nvPr/>
-        </p:nvPicPr>
-        <p:blipFill>
-          <a:blip r:embed="rId2"/>
-          <a:stretch>
-            <a:fillRect/>
-          </a:stretch>
-        </p:blipFill>
-        <p:spPr>
-          <a:xfrm>
-            <a:off x="0" y="-1"/>
-            <a:ext cx="12192000" cy="1358046"/>
-          </a:xfrm>
-          <a:prstGeom prst="rect">
-            <a:avLst/>
-          </a:prstGeom>
-        </p:spPr>
-      </p:pic>
-      <p:sp>
-        <p:nvSpPr>
-          <p:cNvPr id="6" name="ZoneTexte 5">
-            <a:extLst>
-              <a:ext uri="{FF2B5EF4-FFF2-40B4-BE49-F238E27FC236}">
-                <a16:creationId xmlns:a16="http://schemas.microsoft.com/office/drawing/2014/main" id="{2531C32E-BC53-4813-BE93-82037C55E91D}"/>
-              </a:ext>
-            </a:extLst>
-          </p:cNvPr>
-          <p:cNvSpPr txBox="1"/>
-          <p:nvPr/>
-        </p:nvSpPr>
-        <p:spPr>
-          <a:xfrm>
-            <a:off x="0" y="171190"/>
-            <a:ext cx="12191999" cy="1015663"/>
-          </a:xfrm>
-          <a:prstGeom prst="rect">
-            <a:avLst/>
-          </a:prstGeom>
-          <a:noFill/>
-        </p:spPr>
-        <p:txBody>
-          <a:bodyPr wrap="square" rtlCol="0">
-            <a:spAutoFit/>
-          </a:bodyPr>
-          <a:lstStyle/>
-          <a:p>
-            <a:pPr algn="ctr"/>
-            <a:r>
-              <a:rPr lang="fr-FR" sz="6000">
-                <a:solidFill>
-                  <a:schemeClr val="accent4"/>
-                </a:solidFill>
-              </a:rPr>
-              <a:t>AVANCEMENT DU PROJET</a:t>
-            </a:r>
-            <a:endParaRPr lang="fr-FR" sz="6000" dirty="0">
-              <a:solidFill>
-                <a:schemeClr val="accent4"/>
-              </a:solidFill>
-            </a:endParaRPr>
-          </a:p>
-        </p:txBody>
-      </p:sp>
-      <p:pic>
-        <p:nvPicPr>
-          <p:cNvPr id="1032" name="Picture 8">
-            <a:extLst>
-              <a:ext uri="{FF2B5EF4-FFF2-40B4-BE49-F238E27FC236}">
-                <a16:creationId xmlns:a16="http://schemas.microsoft.com/office/drawing/2014/main" id="{4E1E10BC-F447-41B4-8FF2-346145AE35C9}"/>
-              </a:ext>
-            </a:extLst>
-          </p:cNvPr>
-          <p:cNvPicPr>
-            <a:picLocks noChangeAspect="1" noChangeArrowheads="1"/>
-          </p:cNvPicPr>
-          <p:nvPr/>
-        </p:nvPicPr>
-        <p:blipFill>
-          <a:blip r:embed="rId3">
-            <a:extLst>
-              <a:ext uri="{28A0092B-C50C-407E-A947-70E740481C1C}">
-                <a14:useLocalDpi xmlns:a14="http://schemas.microsoft.com/office/drawing/2010/main" val="0"/>
-              </a:ext>
-            </a:extLst>
-          </a:blip>
-          <a:srcRect/>
-          <a:stretch>
-            <a:fillRect/>
-          </a:stretch>
-        </p:blipFill>
-        <p:spPr bwMode="auto">
-          <a:xfrm>
-            <a:off x="1202870" y="1367248"/>
-            <a:ext cx="9786257" cy="5490752"/>
-          </a:xfrm>
-          <a:prstGeom prst="rect">
-            <a:avLst/>
-          </a:prstGeom>
-          <a:noFill/>
-          <a:extLst>
-            <a:ext uri="{909E8E84-426E-40DD-AFC4-6F175D3DCCD1}">
-              <a14:hiddenFill xmlns:a14="http://schemas.microsoft.com/office/drawing/2010/main">
-                <a:solidFill>
-                  <a:srgbClr val="FFFFFF"/>
-                </a:solidFill>
-              </a14:hiddenFill>
-            </a:ext>
-          </a:extLst>
-        </p:spPr>
-      </p:pic>
-      <p:sp>
-        <p:nvSpPr>
-          <p:cNvPr id="2" name="Espace réservé du numéro de diapositive 1"/>
-          <p:cNvSpPr>
-            <a:spLocks noGrp="1"/>
-          </p:cNvSpPr>
-          <p:nvPr>
-            <p:ph type="sldNum" sz="quarter" idx="12"/>
-          </p:nvPr>
-        </p:nvSpPr>
-        <p:spPr/>
-        <p:txBody>
-          <a:bodyPr/>
-          <a:lstStyle/>
-          <a:p>
-            <a:fld id="{88DFB1D4-2421-4D0B-B32A-595002F349BD}" type="slidenum">
-              <a:rPr lang="fr-FR" smtClean="0"/>
-              <a:t>3</a:t>
-            </a:fld>
-            <a:endParaRPr lang="fr-FR"/>
-          </a:p>
-        </p:txBody>
-      </p:sp>
-    </p:spTree>
-    <p:extLst>
-      <p:ext uri="{BB962C8B-B14F-4D97-AF65-F5344CB8AC3E}">
-        <p14:creationId xmlns:p14="http://schemas.microsoft.com/office/powerpoint/2010/main" val="3784089036"/>
-      </p:ext>
-    </p:extLst>
-  </p:cSld>
-  <p:clrMapOvr>
-    <a:masterClrMapping/>
-  </p:clrMapOvr>
-</p:sld>
-</file>
-
-<file path=ppt/slides/slide4.xml><?xml version="1.0" encoding="utf-8"?>
-<p:sld xmlns:a="http://schemas.openxmlformats.org/drawingml/2006/main" xmlns:r="http://schemas.openxmlformats.org/officeDocument/2006/relationships" xmlns:p="http://schemas.openxmlformats.org/presentationml/2006/main">
-  <p:cSld>
     <p:bg>
       <p:bgPr>
         <a:solidFill>
@@ -5987,62 +5743,13 @@
       </p:grpSpPr>
       <p:sp>
         <p:nvSpPr>
-          <p:cNvPr id="21" name="ZoneTexte 20">
-            <a:extLst>
-              <a:ext uri="{FF2B5EF4-FFF2-40B4-BE49-F238E27FC236}">
-                <a16:creationId xmlns:a16="http://schemas.microsoft.com/office/drawing/2014/main" id="{34949E6E-0F70-41B1-8434-B0C4561C7FC5}"/>
-              </a:ext>
-            </a:extLst>
-          </p:cNvPr>
-          <p:cNvSpPr txBox="1"/>
-          <p:nvPr/>
-        </p:nvSpPr>
-        <p:spPr>
-          <a:xfrm>
-            <a:off x="1803662" y="5118754"/>
-            <a:ext cx="8584676" cy="1044301"/>
-          </a:xfrm>
-          <a:prstGeom prst="rect">
-            <a:avLst/>
-          </a:prstGeom>
-        </p:spPr>
-        <p:txBody>
-          <a:bodyPr vert="horz" lIns="91440" tIns="45720" rIns="91440" bIns="45720" rtlCol="0" anchor="t">
-            <a:normAutofit/>
-          </a:bodyPr>
-          <a:lstStyle/>
-          <a:p>
-            <a:pPr algn="ctr">
-              <a:lnSpc>
-                <a:spcPct val="90000"/>
-              </a:lnSpc>
-              <a:spcBef>
-                <a:spcPct val="0"/>
-              </a:spcBef>
-              <a:spcAft>
-                <a:spcPts val="600"/>
-              </a:spcAft>
-            </a:pPr>
-            <a:r>
-              <a:rPr lang="en-US" sz="6000" dirty="0">
-                <a:solidFill>
-                  <a:schemeClr val="accent4"/>
-                </a:solidFill>
-              </a:rPr>
-              <a:t>TECHNOLOGIES</a:t>
-            </a:r>
-          </a:p>
-        </p:txBody>
-      </p:sp>
-      <p:sp>
-        <p:nvSpPr>
-          <p:cNvPr id="54" name="Oval 53">
-            <a:extLst>
-              <a:ext uri="{FF2B5EF4-FFF2-40B4-BE49-F238E27FC236}">
-                <a16:creationId xmlns:a16="http://schemas.microsoft.com/office/drawing/2014/main" id="{0C45045A-6083-4B3E-956A-67582337527D}"/>
+          <p:cNvPr id="58" name="Oval 57">
+            <a:extLst>
+              <a:ext uri="{FF2B5EF4-FFF2-40B4-BE49-F238E27FC236}">
+                <a16:creationId xmlns:a16="http://schemas.microsoft.com/office/drawing/2014/main" id="{42875DDC-0225-45F8-B745-78688F2D1ADC}"/>
               </a:ext>
               <a:ext uri="{C183D7F6-B498-43B3-948B-1728B52AA6E4}">
-                <adec:decorative xmlns="" xmlns:adec="http://schemas.microsoft.com/office/drawing/2017/decorative" val="1"/>
+                <adec:decorative xmlns:adec="http://schemas.microsoft.com/office/drawing/2017/decorative" val="1"/>
               </a:ext>
             </a:extLst>
           </p:cNvPr>
@@ -6059,7 +5766,7 @@
         </p:nvSpPr>
         <p:spPr>
           <a:xfrm>
-            <a:off x="730744" y="832894"/>
+            <a:off x="4445509" y="832894"/>
             <a:ext cx="3300984" cy="3300984"/>
           </a:xfrm>
           <a:prstGeom prst="ellipse">
@@ -6130,13 +5837,13 @@
       </p:sp>
       <p:sp>
         <p:nvSpPr>
-          <p:cNvPr id="56" name="Oval 55">
-            <a:extLst>
-              <a:ext uri="{FF2B5EF4-FFF2-40B4-BE49-F238E27FC236}">
-                <a16:creationId xmlns:a16="http://schemas.microsoft.com/office/drawing/2014/main" id="{EBD2B2B2-1395-4E7B-87A0-BD34551C01B6}"/>
+          <p:cNvPr id="60" name="Oval 59">
+            <a:extLst>
+              <a:ext uri="{FF2B5EF4-FFF2-40B4-BE49-F238E27FC236}">
+                <a16:creationId xmlns:a16="http://schemas.microsoft.com/office/drawing/2014/main" id="{4F329563-0961-4426-90D2-2DF4888E5461}"/>
               </a:ext>
               <a:ext uri="{C183D7F6-B498-43B3-948B-1728B52AA6E4}">
-                <adec:decorative xmlns="" xmlns:adec="http://schemas.microsoft.com/office/drawing/2017/decorative" val="1"/>
+                <adec:decorative xmlns:adec="http://schemas.microsoft.com/office/drawing/2017/decorative" val="1"/>
               </a:ext>
             </a:extLst>
           </p:cNvPr>
@@ -6153,7 +5860,7 @@
         </p:nvSpPr>
         <p:spPr>
           <a:xfrm>
-            <a:off x="895336" y="997486"/>
+            <a:off x="4610101" y="997486"/>
             <a:ext cx="2971800" cy="2971800"/>
           </a:xfrm>
           <a:prstGeom prst="ellipse">
@@ -6220,12 +5927,61 @@
           </a:p>
         </p:txBody>
       </p:sp>
+      <p:sp>
+        <p:nvSpPr>
+          <p:cNvPr id="21" name="ZoneTexte 20">
+            <a:extLst>
+              <a:ext uri="{FF2B5EF4-FFF2-40B4-BE49-F238E27FC236}">
+                <a16:creationId xmlns:a16="http://schemas.microsoft.com/office/drawing/2014/main" id="{34949E6E-0F70-41B1-8434-B0C4561C7FC5}"/>
+              </a:ext>
+            </a:extLst>
+          </p:cNvPr>
+          <p:cNvSpPr txBox="1"/>
+          <p:nvPr/>
+        </p:nvSpPr>
+        <p:spPr>
+          <a:xfrm>
+            <a:off x="1803662" y="5118754"/>
+            <a:ext cx="8584676" cy="1044301"/>
+          </a:xfrm>
+          <a:prstGeom prst="rect">
+            <a:avLst/>
+          </a:prstGeom>
+        </p:spPr>
+        <p:txBody>
+          <a:bodyPr vert="horz" lIns="91440" tIns="45720" rIns="91440" bIns="45720" rtlCol="0" anchor="t">
+            <a:normAutofit/>
+          </a:bodyPr>
+          <a:lstStyle/>
+          <a:p>
+            <a:pPr algn="ctr">
+              <a:lnSpc>
+                <a:spcPct val="90000"/>
+              </a:lnSpc>
+              <a:spcBef>
+                <a:spcPct val="0"/>
+              </a:spcBef>
+              <a:spcAft>
+                <a:spcPts val="600"/>
+              </a:spcAft>
+            </a:pPr>
+            <a:r>
+              <a:rPr lang="en-US" sz="6000" dirty="0">
+                <a:solidFill>
+                  <a:schemeClr val="accent4"/>
+                </a:solidFill>
+              </a:rPr>
+              <a:t>TECHNOLOGIES</a:t>
+            </a:r>
+          </a:p>
+        </p:txBody>
+      </p:sp>
       <p:pic>
         <p:nvPicPr>
-          <p:cNvPr id="6" name="Image 5">
-            <a:extLst>
-              <a:ext uri="{FF2B5EF4-FFF2-40B4-BE49-F238E27FC236}">
-                <a16:creationId xmlns:a16="http://schemas.microsoft.com/office/drawing/2014/main" id="{BC78CC54-A85A-6349-A419-2A8EF2144A79}"/>
+          <p:cNvPr id="4" name="Image 3">
+            <a:extLst>
+              <a:ext uri="{FF2B5EF4-FFF2-40B4-BE49-F238E27FC236}">
+                <a16:creationId xmlns:a16="http://schemas.microsoft.com/office/drawing/2014/main" id="{E6EC185E-D043-DD41-BD73-068357D06CA7}"/>
               </a:ext>
             </a:extLst>
           </p:cNvPr>
@@ -6234,16 +5990,21 @@
           </p:cNvPicPr>
           <p:nvPr/>
         </p:nvPicPr>
-        <p:blipFill>
-          <a:blip r:embed="rId2"/>
-          <a:stretch>
-            <a:fillRect/>
-          </a:stretch>
+        <p:blipFill rotWithShape="1">
+          <a:blip r:embed="rId2">
+            <a:extLst>
+              <a:ext uri="{28A0092B-C50C-407E-A947-70E740481C1C}">
+                <a14:useLocalDpi xmlns:a14="http://schemas.microsoft.com/office/drawing/2010/main" val="0"/>
+              </a:ext>
+            </a:extLst>
+          </a:blip>
+          <a:srcRect l="1758" t="4893" r="3776" b="4239"/>
+          <a:stretch/>
         </p:blipFill>
         <p:spPr>
           <a:xfrm>
-            <a:off x="1412961" y="1360696"/>
-            <a:ext cx="1928953" cy="2249420"/>
+            <a:off x="5045579" y="1499016"/>
+            <a:ext cx="2006383" cy="1929984"/>
           </a:xfrm>
           <a:prstGeom prst="rect">
             <a:avLst/>
@@ -6252,13 +6013,13 @@
       </p:pic>
       <p:sp>
         <p:nvSpPr>
-          <p:cNvPr id="58" name="Oval 57">
-            <a:extLst>
-              <a:ext uri="{FF2B5EF4-FFF2-40B4-BE49-F238E27FC236}">
-                <a16:creationId xmlns:a16="http://schemas.microsoft.com/office/drawing/2014/main" id="{42875DDC-0225-45F8-B745-78688F2D1ADC}"/>
+          <p:cNvPr id="54" name="Oval 53">
+            <a:extLst>
+              <a:ext uri="{FF2B5EF4-FFF2-40B4-BE49-F238E27FC236}">
+                <a16:creationId xmlns:a16="http://schemas.microsoft.com/office/drawing/2014/main" id="{0C45045A-6083-4B3E-956A-67582337527D}"/>
               </a:ext>
               <a:ext uri="{C183D7F6-B498-43B3-948B-1728B52AA6E4}">
-                <adec:decorative xmlns="" xmlns:adec="http://schemas.microsoft.com/office/drawing/2017/decorative" val="1"/>
+                <adec:decorative xmlns:adec="http://schemas.microsoft.com/office/drawing/2017/decorative" val="1"/>
               </a:ext>
             </a:extLst>
           </p:cNvPr>
@@ -6275,7 +6036,7 @@
         </p:nvSpPr>
         <p:spPr>
           <a:xfrm>
-            <a:off x="4445509" y="832894"/>
+            <a:off x="730744" y="832894"/>
             <a:ext cx="3300984" cy="3300984"/>
           </a:xfrm>
           <a:prstGeom prst="ellipse">
@@ -6346,13 +6107,13 @@
       </p:sp>
       <p:sp>
         <p:nvSpPr>
-          <p:cNvPr id="60" name="Oval 59">
-            <a:extLst>
-              <a:ext uri="{FF2B5EF4-FFF2-40B4-BE49-F238E27FC236}">
-                <a16:creationId xmlns:a16="http://schemas.microsoft.com/office/drawing/2014/main" id="{4F329563-0961-4426-90D2-2DF4888E5461}"/>
+          <p:cNvPr id="56" name="Oval 55">
+            <a:extLst>
+              <a:ext uri="{FF2B5EF4-FFF2-40B4-BE49-F238E27FC236}">
+                <a16:creationId xmlns:a16="http://schemas.microsoft.com/office/drawing/2014/main" id="{EBD2B2B2-1395-4E7B-87A0-BD34551C01B6}"/>
               </a:ext>
               <a:ext uri="{C183D7F6-B498-43B3-948B-1728B52AA6E4}">
-                <adec:decorative xmlns="" xmlns:adec="http://schemas.microsoft.com/office/drawing/2017/decorative" val="1"/>
+                <adec:decorative xmlns:adec="http://schemas.microsoft.com/office/drawing/2017/decorative" val="1"/>
               </a:ext>
             </a:extLst>
           </p:cNvPr>
@@ -6369,7 +6130,7 @@
         </p:nvSpPr>
         <p:spPr>
           <a:xfrm>
-            <a:off x="4610101" y="997486"/>
+            <a:off x="895336" y="997486"/>
             <a:ext cx="2971800" cy="2971800"/>
           </a:xfrm>
           <a:prstGeom prst="ellipse">
@@ -6438,10 +6199,10 @@
       </p:sp>
       <p:pic>
         <p:nvPicPr>
-          <p:cNvPr id="14" name="Image 13">
-            <a:extLst>
-              <a:ext uri="{FF2B5EF4-FFF2-40B4-BE49-F238E27FC236}">
-                <a16:creationId xmlns:a16="http://schemas.microsoft.com/office/drawing/2014/main" id="{B1AF83CE-5E06-A348-BECC-8A3F1FB84F02}"/>
+          <p:cNvPr id="6" name="Image 5">
+            <a:extLst>
+              <a:ext uri="{FF2B5EF4-FFF2-40B4-BE49-F238E27FC236}">
+                <a16:creationId xmlns:a16="http://schemas.microsoft.com/office/drawing/2014/main" id="{BC78CC54-A85A-6349-A419-2A8EF2144A79}"/>
               </a:ext>
             </a:extLst>
           </p:cNvPr>
@@ -6458,8 +6219,8 @@
         </p:blipFill>
         <p:spPr>
           <a:xfrm>
-            <a:off x="4811267" y="1240769"/>
-            <a:ext cx="2569465" cy="2569465"/>
+            <a:off x="1412961" y="1360696"/>
+            <a:ext cx="1928953" cy="2249420"/>
           </a:xfrm>
           <a:prstGeom prst="rect">
             <a:avLst/>
@@ -6474,7 +6235,7 @@
                 <a16:creationId xmlns:a16="http://schemas.microsoft.com/office/drawing/2014/main" id="{12617755-D451-4BAF-9B55-518297BFF42D}"/>
               </a:ext>
               <a:ext uri="{C183D7F6-B498-43B3-948B-1728B52AA6E4}">
-                <adec:decorative xmlns="" xmlns:adec="http://schemas.microsoft.com/office/drawing/2017/decorative" val="1"/>
+                <adec:decorative xmlns:adec="http://schemas.microsoft.com/office/drawing/2017/decorative" val="1"/>
               </a:ext>
             </a:extLst>
           </p:cNvPr>
@@ -6568,7 +6329,7 @@
                 <a16:creationId xmlns:a16="http://schemas.microsoft.com/office/drawing/2014/main" id="{86C062C2-3673-4248-BE21-B51B16E63267}"/>
               </a:ext>
               <a:ext uri="{C183D7F6-B498-43B3-948B-1728B52AA6E4}">
-                <adec:decorative xmlns="" xmlns:adec="http://schemas.microsoft.com/office/drawing/2017/decorative" val="1"/>
+                <adec:decorative xmlns:adec="http://schemas.microsoft.com/office/drawing/2017/decorative" val="1"/>
               </a:ext>
             </a:extLst>
           </p:cNvPr>
@@ -6699,7 +6460,7 @@
           <a:p>
             <a:fld id="{88DFB1D4-2421-4D0B-B32A-595002F349BD}" type="slidenum">
               <a:rPr lang="fr-FR" smtClean="0"/>
-              <a:t>4</a:t>
+              <a:t>3</a:t>
             </a:fld>
             <a:endParaRPr lang="fr-FR" dirty="0"/>
           </a:p>
@@ -6714,6 +6475,181 @@
   </p:cSld>
   <p:clrMapOvr>
     <a:overrideClrMapping bg1="dk1" tx1="lt1" bg2="dk2" tx2="lt2" accent1="accent1" accent2="accent2" accent3="accent3" accent4="accent4" accent5="accent5" accent6="accent6" hlink="hlink" folHlink="folHlink"/>
+  </p:clrMapOvr>
+</p:sld>
+</file>
+
+<file path=ppt/slides/slide4.xml><?xml version="1.0" encoding="utf-8"?>
+<p:sld xmlns:a="http://schemas.openxmlformats.org/drawingml/2006/main" xmlns:r="http://schemas.openxmlformats.org/officeDocument/2006/relationships" xmlns:p="http://schemas.openxmlformats.org/presentationml/2006/main">
+  <p:cSld>
+    <p:spTree>
+      <p:nvGrpSpPr>
+        <p:cNvPr id="1" name=""/>
+        <p:cNvGrpSpPr/>
+        <p:nvPr/>
+      </p:nvGrpSpPr>
+      <p:grpSpPr>
+        <a:xfrm>
+          <a:off x="0" y="0"/>
+          <a:ext cx="0" cy="0"/>
+          <a:chOff x="0" y="0"/>
+          <a:chExt cx="0" cy="0"/>
+        </a:xfrm>
+      </p:grpSpPr>
+      <p:pic>
+        <p:nvPicPr>
+          <p:cNvPr id="5" name="Image 4">
+            <a:extLst>
+              <a:ext uri="{FF2B5EF4-FFF2-40B4-BE49-F238E27FC236}">
+                <a16:creationId xmlns:a16="http://schemas.microsoft.com/office/drawing/2014/main" id="{20AF37C8-99B4-4C3B-9EA2-1557CB9D7439}"/>
+              </a:ext>
+            </a:extLst>
+          </p:cNvPr>
+          <p:cNvPicPr>
+            <a:picLocks noChangeAspect="1"/>
+          </p:cNvPicPr>
+          <p:nvPr/>
+        </p:nvPicPr>
+        <p:blipFill>
+          <a:blip r:embed="rId2"/>
+          <a:stretch>
+            <a:fillRect/>
+          </a:stretch>
+        </p:blipFill>
+        <p:spPr>
+          <a:xfrm>
+            <a:off x="0" y="-1"/>
+            <a:ext cx="12192000" cy="1358046"/>
+          </a:xfrm>
+          <a:prstGeom prst="rect">
+            <a:avLst/>
+          </a:prstGeom>
+        </p:spPr>
+      </p:pic>
+      <p:sp>
+        <p:nvSpPr>
+          <p:cNvPr id="6" name="ZoneTexte 5">
+            <a:extLst>
+              <a:ext uri="{FF2B5EF4-FFF2-40B4-BE49-F238E27FC236}">
+                <a16:creationId xmlns:a16="http://schemas.microsoft.com/office/drawing/2014/main" id="{2531C32E-BC53-4813-BE93-82037C55E91D}"/>
+              </a:ext>
+            </a:extLst>
+          </p:cNvPr>
+          <p:cNvSpPr txBox="1"/>
+          <p:nvPr/>
+        </p:nvSpPr>
+        <p:spPr>
+          <a:xfrm>
+            <a:off x="0" y="171190"/>
+            <a:ext cx="12191999" cy="1015663"/>
+          </a:xfrm>
+          <a:prstGeom prst="rect">
+            <a:avLst/>
+          </a:prstGeom>
+          <a:noFill/>
+        </p:spPr>
+        <p:txBody>
+          <a:bodyPr wrap="square" rtlCol="0">
+            <a:spAutoFit/>
+          </a:bodyPr>
+          <a:lstStyle/>
+          <a:p>
+            <a:pPr algn="ctr"/>
+            <a:r>
+              <a:rPr lang="fr-FR" sz="6000">
+                <a:solidFill>
+                  <a:schemeClr val="accent4"/>
+                </a:solidFill>
+              </a:rPr>
+              <a:t>AVANCEMENT DU PROJET</a:t>
+            </a:r>
+            <a:endParaRPr lang="fr-FR" sz="6000" dirty="0">
+              <a:solidFill>
+                <a:schemeClr val="accent4"/>
+              </a:solidFill>
+            </a:endParaRPr>
+          </a:p>
+        </p:txBody>
+      </p:sp>
+      <p:pic>
+        <p:nvPicPr>
+          <p:cNvPr id="1032" name="Picture 8">
+            <a:extLst>
+              <a:ext uri="{FF2B5EF4-FFF2-40B4-BE49-F238E27FC236}">
+                <a16:creationId xmlns:a16="http://schemas.microsoft.com/office/drawing/2014/main" id="{4E1E10BC-F447-41B4-8FF2-346145AE35C9}"/>
+              </a:ext>
+            </a:extLst>
+          </p:cNvPr>
+          <p:cNvPicPr>
+            <a:picLocks noChangeAspect="1" noChangeArrowheads="1"/>
+          </p:cNvPicPr>
+          <p:nvPr/>
+        </p:nvPicPr>
+        <p:blipFill>
+          <a:blip r:embed="rId3">
+            <a:extLst>
+              <a:ext uri="{28A0092B-C50C-407E-A947-70E740481C1C}">
+                <a14:useLocalDpi xmlns:a14="http://schemas.microsoft.com/office/drawing/2010/main" val="0"/>
+              </a:ext>
+            </a:extLst>
+          </a:blip>
+          <a:srcRect/>
+          <a:stretch>
+            <a:fillRect/>
+          </a:stretch>
+        </p:blipFill>
+        <p:spPr bwMode="auto">
+          <a:xfrm>
+            <a:off x="1202870" y="1367248"/>
+            <a:ext cx="9786257" cy="5490752"/>
+          </a:xfrm>
+          <a:prstGeom prst="rect">
+            <a:avLst/>
+          </a:prstGeom>
+          <a:noFill/>
+          <a:extLst>
+            <a:ext uri="{909E8E84-426E-40DD-AFC4-6F175D3DCCD1}">
+              <a14:hiddenFill xmlns:a14="http://schemas.microsoft.com/office/drawing/2010/main">
+                <a:solidFill>
+                  <a:srgbClr val="FFFFFF"/>
+                </a:solidFill>
+              </a14:hiddenFill>
+            </a:ext>
+          </a:extLst>
+        </p:spPr>
+      </p:pic>
+      <p:sp>
+        <p:nvSpPr>
+          <p:cNvPr id="2" name="Espace réservé du numéro de diapositive 1"/>
+          <p:cNvSpPr>
+            <a:spLocks noGrp="1"/>
+          </p:cNvSpPr>
+          <p:nvPr>
+            <p:ph type="sldNum" sz="quarter" idx="12"/>
+          </p:nvPr>
+        </p:nvSpPr>
+        <p:spPr/>
+        <p:txBody>
+          <a:bodyPr/>
+          <a:lstStyle/>
+          <a:p>
+            <a:fld id="{88DFB1D4-2421-4D0B-B32A-595002F349BD}" type="slidenum">
+              <a:rPr lang="fr-FR" smtClean="0"/>
+              <a:t>4</a:t>
+            </a:fld>
+            <a:endParaRPr lang="fr-FR"/>
+          </a:p>
+        </p:txBody>
+      </p:sp>
+    </p:spTree>
+    <p:extLst>
+      <p:ext uri="{BB962C8B-B14F-4D97-AF65-F5344CB8AC3E}">
+        <p14:creationId xmlns:p14="http://schemas.microsoft.com/office/powerpoint/2010/main" val="3784089036"/>
+      </p:ext>
+    </p:extLst>
+  </p:cSld>
+  <p:clrMapOvr>
+    <a:masterClrMapping/>
   </p:clrMapOvr>
 </p:sld>
 </file>
@@ -6751,7 +6687,7 @@
                 <a16:creationId xmlns:a16="http://schemas.microsoft.com/office/drawing/2014/main" id="{0DE6A193-4755-479A-BC6F-A7EBCA73BE1A}"/>
               </a:ext>
               <a:ext uri="{C183D7F6-B498-43B3-948B-1728B52AA6E4}">
-                <adec:decorative xmlns="" xmlns:adec="http://schemas.microsoft.com/office/drawing/2017/decorative" val="1"/>
+                <adec:decorative xmlns:adec="http://schemas.microsoft.com/office/drawing/2017/decorative" val="1"/>
               </a:ext>
             </a:extLst>
           </p:cNvPr>
@@ -6814,7 +6750,7 @@
                 <a16:creationId xmlns:a16="http://schemas.microsoft.com/office/drawing/2014/main" id="{5A55B759-31A7-423C-9BC2-A8BC09FE98B9}"/>
               </a:ext>
               <a:ext uri="{C183D7F6-B498-43B3-948B-1728B52AA6E4}">
-                <adec:decorative xmlns="" xmlns:adec="http://schemas.microsoft.com/office/drawing/2017/decorative" val="1"/>
+                <adec:decorative xmlns:adec="http://schemas.microsoft.com/office/drawing/2017/decorative" val="1"/>
               </a:ext>
             </a:extLst>
           </p:cNvPr>
@@ -6971,7 +6907,7 @@
                 <a16:creationId xmlns:a16="http://schemas.microsoft.com/office/drawing/2014/main" id="{F78796AF-79A0-47AC-BEFD-BFFC00F968C4}"/>
               </a:ext>
               <a:ext uri="{C183D7F6-B498-43B3-948B-1728B52AA6E4}">
-                <adec:decorative xmlns="" xmlns:adec="http://schemas.microsoft.com/office/drawing/2017/decorative" val="1"/>
+                <adec:decorative xmlns:adec="http://schemas.microsoft.com/office/drawing/2017/decorative" val="1"/>
               </a:ext>
             </a:extLst>
           </p:cNvPr>
@@ -7365,7 +7301,7 @@
               </a:spcAft>
             </a:pPr>
             <a:r>
-              <a:rPr lang="en-US" sz="6000" dirty="0" smtClean="0">
+              <a:rPr lang="en-US" sz="6000" dirty="0">
                 <a:solidFill>
                   <a:schemeClr val="accent4"/>
                 </a:solidFill>
@@ -7375,14 +7311,6 @@
               </a:rPr>
               <a:t>ANNEXES</a:t>
             </a:r>
-            <a:endParaRPr lang="en-US" sz="6000" dirty="0">
-              <a:solidFill>
-                <a:schemeClr val="accent4"/>
-              </a:solidFill>
-              <a:latin typeface="+mn-lt"/>
-              <a:ea typeface="+mn-ea"/>
-              <a:cs typeface="+mn-cs"/>
-            </a:endParaRPr>
           </a:p>
         </p:txBody>
       </p:sp>
@@ -7496,7 +7424,7 @@
               </a:spcAft>
             </a:pPr>
             <a:r>
-              <a:rPr lang="en-US" sz="6000" dirty="0" smtClean="0">
+              <a:rPr lang="en-US" sz="6000" dirty="0">
                 <a:solidFill>
                   <a:schemeClr val="accent4"/>
                 </a:solidFill>
@@ -7506,14 +7434,6 @@
               </a:rPr>
               <a:t>DEFINITION D’UN PANORAMA</a:t>
             </a:r>
-            <a:endParaRPr lang="en-US" sz="6000" dirty="0">
-              <a:solidFill>
-                <a:schemeClr val="accent4"/>
-              </a:solidFill>
-              <a:latin typeface="+mn-lt"/>
-              <a:ea typeface="+mn-ea"/>
-              <a:cs typeface="+mn-cs"/>
-            </a:endParaRPr>
           </a:p>
         </p:txBody>
       </p:sp>
@@ -7659,7 +7579,7 @@
               </a:spcAft>
             </a:pPr>
             <a:r>
-              <a:rPr lang="en-US" sz="6000" dirty="0" smtClean="0">
+              <a:rPr lang="en-US" sz="6000" dirty="0">
                 <a:solidFill>
                   <a:schemeClr val="accent4"/>
                 </a:solidFill>
@@ -7669,14 +7589,6 @@
               </a:rPr>
               <a:t>ANALYSE DU PANORAMA</a:t>
             </a:r>
-            <a:endParaRPr lang="en-US" sz="6000" dirty="0">
-              <a:solidFill>
-                <a:schemeClr val="accent4"/>
-              </a:solidFill>
-              <a:latin typeface="+mn-lt"/>
-              <a:ea typeface="+mn-ea"/>
-              <a:cs typeface="+mn-cs"/>
-            </a:endParaRPr>
           </a:p>
         </p:txBody>
       </p:sp>
@@ -7728,18 +7640,13 @@
           <a:p>
             <a:pPr algn="ctr"/>
             <a:r>
-              <a:rPr lang="fr-FR" i="1" dirty="0" smtClean="0">
+              <a:rPr lang="fr-FR" i="1" dirty="0">
                 <a:solidFill>
                   <a:schemeClr val="bg1"/>
                 </a:solidFill>
               </a:rPr>
               <a:t>Diagramme de cas d’utilisation</a:t>
             </a:r>
-            <a:endParaRPr lang="fr-FR" i="1" dirty="0">
-              <a:solidFill>
-                <a:schemeClr val="bg1"/>
-              </a:solidFill>
-            </a:endParaRPr>
           </a:p>
         </p:txBody>
       </p:sp>
@@ -7853,7 +7760,7 @@
               </a:spcAft>
             </a:pPr>
             <a:r>
-              <a:rPr lang="en-US" sz="6000" dirty="0" smtClean="0">
+              <a:rPr lang="en-US" sz="6000" dirty="0">
                 <a:solidFill>
                   <a:schemeClr val="accent4"/>
                 </a:solidFill>
@@ -7863,14 +7770,6 @@
               </a:rPr>
               <a:t>ANALYSE DU PANORAMA</a:t>
             </a:r>
-            <a:endParaRPr lang="en-US" sz="6000" dirty="0">
-              <a:solidFill>
-                <a:schemeClr val="accent4"/>
-              </a:solidFill>
-              <a:latin typeface="+mn-lt"/>
-              <a:ea typeface="+mn-ea"/>
-              <a:cs typeface="+mn-cs"/>
-            </a:endParaRPr>
           </a:p>
         </p:txBody>
       </p:sp>
@@ -7898,18 +7797,13 @@
           <a:p>
             <a:pPr algn="ctr"/>
             <a:r>
-              <a:rPr lang="fr-FR" i="1" dirty="0" smtClean="0">
+              <a:rPr lang="fr-FR" i="1" dirty="0">
                 <a:solidFill>
                   <a:schemeClr val="bg1"/>
                 </a:solidFill>
               </a:rPr>
               <a:t>Diagramme de classe</a:t>
             </a:r>
-            <a:endParaRPr lang="fr-FR" i="1" dirty="0">
-              <a:solidFill>
-                <a:schemeClr val="bg1"/>
-              </a:solidFill>
-            </a:endParaRPr>
           </a:p>
         </p:txBody>
       </p:sp>

</xml_diff>

<commit_message>
slide bilan + répartition travail
</commit_message>
<xml_diff>
--- a/Soutenance/Diaporama soutenance.pptx
+++ b/Soutenance/Diaporama soutenance.pptx
@@ -5,7 +5,7 @@
     <p:sldMasterId id="2147483648" r:id="rId1"/>
   </p:sldMasterIdLst>
   <p:notesMasterIdLst>
-    <p:notesMasterId r:id="rId17"/>
+    <p:notesMasterId r:id="rId18"/>
   </p:notesMasterIdLst>
   <p:sldIdLst>
     <p:sldId id="276" r:id="rId2"/>
@@ -23,6 +23,7 @@
     <p:sldId id="269" r:id="rId14"/>
     <p:sldId id="271" r:id="rId15"/>
     <p:sldId id="272" r:id="rId16"/>
+    <p:sldId id="277" r:id="rId17"/>
   </p:sldIdLst>
   <p:sldSz cx="12192000" cy="6858000"/>
   <p:notesSz cx="6858000" cy="9144000"/>
@@ -4957,6 +4958,159 @@
 </p:sld>
 </file>
 
+<file path=ppt/slides/slide16.xml><?xml version="1.0" encoding="utf-8"?>
+<p:sld xmlns:a="http://schemas.openxmlformats.org/drawingml/2006/main" xmlns:r="http://schemas.openxmlformats.org/officeDocument/2006/relationships" xmlns:p="http://schemas.openxmlformats.org/presentationml/2006/main">
+  <p:cSld>
+    <p:spTree>
+      <p:nvGrpSpPr>
+        <p:cNvPr id="1" name=""/>
+        <p:cNvGrpSpPr/>
+        <p:nvPr/>
+      </p:nvGrpSpPr>
+      <p:grpSpPr>
+        <a:xfrm>
+          <a:off x="0" y="0"/>
+          <a:ext cx="0" cy="0"/>
+          <a:chOff x="0" y="0"/>
+          <a:chExt cx="0" cy="0"/>
+        </a:xfrm>
+      </p:grpSpPr>
+      <p:pic>
+        <p:nvPicPr>
+          <p:cNvPr id="6" name="Image 5"/>
+          <p:cNvPicPr>
+            <a:picLocks noChangeAspect="1"/>
+          </p:cNvPicPr>
+          <p:nvPr/>
+        </p:nvPicPr>
+        <p:blipFill rotWithShape="1">
+          <a:blip r:embed="rId2"/>
+          <a:srcRect r="23414" b="14640"/>
+          <a:stretch/>
+        </p:blipFill>
+        <p:spPr>
+          <a:xfrm>
+            <a:off x="0" y="0"/>
+            <a:ext cx="12192000" cy="6858000"/>
+          </a:xfrm>
+          <a:prstGeom prst="rect">
+            <a:avLst/>
+          </a:prstGeom>
+        </p:spPr>
+      </p:pic>
+      <p:sp>
+        <p:nvSpPr>
+          <p:cNvPr id="5" name="Espace réservé du numéro de diapositive 4"/>
+          <p:cNvSpPr>
+            <a:spLocks noGrp="1"/>
+          </p:cNvSpPr>
+          <p:nvPr>
+            <p:ph type="sldNum" sz="quarter" idx="12"/>
+          </p:nvPr>
+        </p:nvSpPr>
+        <p:spPr/>
+        <p:txBody>
+          <a:bodyPr/>
+          <a:lstStyle/>
+          <a:p>
+            <a:fld id="{88DFB1D4-2421-4D0B-B32A-595002F349BD}" type="slidenum">
+              <a:rPr lang="fr-FR" smtClean="0"/>
+              <a:t>16</a:t>
+            </a:fld>
+            <a:endParaRPr lang="fr-FR"/>
+          </a:p>
+        </p:txBody>
+      </p:sp>
+      <p:sp>
+        <p:nvSpPr>
+          <p:cNvPr id="7" name="Titre 1">
+            <a:extLst>
+              <a:ext uri="{FF2B5EF4-FFF2-40B4-BE49-F238E27FC236}">
+                <a16:creationId xmlns:a16="http://schemas.microsoft.com/office/drawing/2014/main" id="{1E93D889-9138-4324-B692-3587155996A7}"/>
+              </a:ext>
+            </a:extLst>
+          </p:cNvPr>
+          <p:cNvSpPr>
+            <a:spLocks noGrp="1"/>
+          </p:cNvSpPr>
+          <p:nvPr>
+            <p:ph type="title"/>
+          </p:nvPr>
+        </p:nvSpPr>
+        <p:spPr>
+          <a:xfrm>
+            <a:off x="0" y="669460"/>
+            <a:ext cx="12192000" cy="1134090"/>
+          </a:xfrm>
+        </p:spPr>
+        <p:txBody>
+          <a:bodyPr vert="horz" lIns="91440" tIns="45720" rIns="91440" bIns="45720" rtlCol="0" anchor="b">
+            <a:normAutofit/>
+          </a:bodyPr>
+          <a:lstStyle/>
+          <a:p>
+            <a:pPr algn="ctr">
+              <a:spcAft>
+                <a:spcPts val="600"/>
+              </a:spcAft>
+            </a:pPr>
+            <a:r>
+              <a:rPr lang="en-US" sz="6000" dirty="0">
+                <a:solidFill>
+                  <a:schemeClr val="accent4"/>
+                </a:solidFill>
+                <a:latin typeface="+mn-lt"/>
+                <a:ea typeface="+mn-ea"/>
+                <a:cs typeface="+mn-cs"/>
+              </a:rPr>
+              <a:t>REPARTITION DU TRAVAIL</a:t>
+            </a:r>
+          </a:p>
+        </p:txBody>
+      </p:sp>
+      <p:pic>
+        <p:nvPicPr>
+          <p:cNvPr id="10" name="Image 9">
+            <a:extLst>
+              <a:ext uri="{FF2B5EF4-FFF2-40B4-BE49-F238E27FC236}">
+                <a16:creationId xmlns:a16="http://schemas.microsoft.com/office/drawing/2014/main" id="{059773D1-AF08-4FCA-8384-245DC4F99EC7}"/>
+              </a:ext>
+            </a:extLst>
+          </p:cNvPr>
+          <p:cNvPicPr>
+            <a:picLocks noChangeAspect="1"/>
+          </p:cNvPicPr>
+          <p:nvPr/>
+        </p:nvPicPr>
+        <p:blipFill>
+          <a:blip r:embed="rId3"/>
+          <a:stretch>
+            <a:fillRect/>
+          </a:stretch>
+        </p:blipFill>
+        <p:spPr>
+          <a:xfrm>
+            <a:off x="1052601" y="2251150"/>
+            <a:ext cx="10086797" cy="3657600"/>
+          </a:xfrm>
+          <a:prstGeom prst="rect">
+            <a:avLst/>
+          </a:prstGeom>
+        </p:spPr>
+      </p:pic>
+    </p:spTree>
+    <p:extLst>
+      <p:ext uri="{BB962C8B-B14F-4D97-AF65-F5344CB8AC3E}">
+        <p14:creationId xmlns:p14="http://schemas.microsoft.com/office/powerpoint/2010/main" val="1707881204"/>
+      </p:ext>
+    </p:extLst>
+  </p:cSld>
+  <p:clrMapOvr>
+    <a:masterClrMapping/>
+  </p:clrMapOvr>
+</p:sld>
+</file>
+
 <file path=ppt/slides/slide2.xml><?xml version="1.0" encoding="utf-8"?>
 <p:sld xmlns:a="http://schemas.openxmlformats.org/drawingml/2006/main" xmlns:r="http://schemas.openxmlformats.org/officeDocument/2006/relationships" xmlns:p="http://schemas.openxmlformats.org/presentationml/2006/main">
   <p:cSld>
@@ -6742,6 +6896,36 @@
           </a:p>
         </p:txBody>
       </p:sp>
+      <p:pic>
+        <p:nvPicPr>
+          <p:cNvPr id="5" name="Image 4">
+            <a:extLst>
+              <a:ext uri="{FF2B5EF4-FFF2-40B4-BE49-F238E27FC236}">
+                <a16:creationId xmlns:a16="http://schemas.microsoft.com/office/drawing/2014/main" id="{65D7A710-E78B-4275-9F9B-4B35E11905D3}"/>
+              </a:ext>
+            </a:extLst>
+          </p:cNvPr>
+          <p:cNvPicPr>
+            <a:picLocks noChangeAspect="1"/>
+          </p:cNvPicPr>
+          <p:nvPr/>
+        </p:nvPicPr>
+        <p:blipFill>
+          <a:blip r:embed="rId2"/>
+          <a:stretch>
+            <a:fillRect/>
+          </a:stretch>
+        </p:blipFill>
+        <p:spPr>
+          <a:xfrm>
+            <a:off x="3092519" y="0"/>
+            <a:ext cx="9099480" cy="4172577"/>
+          </a:xfrm>
+          <a:prstGeom prst="rect">
+            <a:avLst/>
+          </a:prstGeom>
+        </p:spPr>
+      </p:pic>
       <p:sp>
         <p:nvSpPr>
           <p:cNvPr id="36" name="Freeform: Shape 30">
@@ -7104,10 +7288,10 @@
       </p:sp>
       <p:pic>
         <p:nvPicPr>
-          <p:cNvPr id="10" name="Image 9">
-            <a:extLst>
-              <a:ext uri="{FF2B5EF4-FFF2-40B4-BE49-F238E27FC236}">
-                <a16:creationId xmlns:a16="http://schemas.microsoft.com/office/drawing/2014/main" id="{7EBC7DD6-1F0C-49BB-BB6E-3BC341688DB7}"/>
+          <p:cNvPr id="13" name="Image 12">
+            <a:extLst>
+              <a:ext uri="{FF2B5EF4-FFF2-40B4-BE49-F238E27FC236}">
+                <a16:creationId xmlns:a16="http://schemas.microsoft.com/office/drawing/2014/main" id="{240CCAF0-A89C-4109-A936-B7CE59B07D95}"/>
               </a:ext>
             </a:extLst>
           </p:cNvPr>
@@ -7116,37 +7300,7 @@
           </p:cNvPicPr>
           <p:nvPr/>
         </p:nvPicPr>
-        <p:blipFill>
-          <a:blip r:embed="rId2"/>
-          <a:stretch>
-            <a:fillRect/>
-          </a:stretch>
-        </p:blipFill>
-        <p:spPr>
-          <a:xfrm>
-            <a:off x="7219043" y="400481"/>
-            <a:ext cx="4508232" cy="3696751"/>
-          </a:xfrm>
-          <a:prstGeom prst="rect">
-            <a:avLst/>
-          </a:prstGeom>
-        </p:spPr>
-      </p:pic>
-      <p:pic>
-        <p:nvPicPr>
-          <p:cNvPr id="13" name="Image 12">
-            <a:extLst>
-              <a:ext uri="{FF2B5EF4-FFF2-40B4-BE49-F238E27FC236}">
-                <a16:creationId xmlns:a16="http://schemas.microsoft.com/office/drawing/2014/main" id="{240CCAF0-A89C-4109-A936-B7CE59B07D95}"/>
-              </a:ext>
-            </a:extLst>
-          </p:cNvPr>
-          <p:cNvPicPr>
-            <a:picLocks noChangeAspect="1"/>
-          </p:cNvPicPr>
-          <p:nvPr/>
-        </p:nvPicPr>
-        <p:blipFill>
+        <p:blipFill rotWithShape="1">
           <a:blip r:embed="rId3">
             <a:extLst>
               <a:ext uri="{28A0092B-C50C-407E-A947-70E740481C1C}">
@@ -7154,14 +7308,13 @@
               </a:ext>
             </a:extLst>
           </a:blip>
-          <a:stretch>
-            <a:fillRect/>
-          </a:stretch>
+          <a:srcRect l="1061" t="2328" r="4706" b="14730"/>
+          <a:stretch/>
         </p:blipFill>
         <p:spPr>
           <a:xfrm>
-            <a:off x="5953781" y="4674227"/>
-            <a:ext cx="5702113" cy="1682123"/>
+            <a:off x="5401560" y="4696987"/>
+            <a:ext cx="5373278" cy="1395167"/>
           </a:xfrm>
           <a:prstGeom prst="rect">
             <a:avLst/>
@@ -7188,6 +7341,134 @@
               <a:t>5</a:t>
             </a:fld>
             <a:endParaRPr lang="fr-FR"/>
+          </a:p>
+        </p:txBody>
+      </p:sp>
+      <p:sp>
+        <p:nvSpPr>
+          <p:cNvPr id="6" name="ZoneTexte 5">
+            <a:extLst>
+              <a:ext uri="{FF2B5EF4-FFF2-40B4-BE49-F238E27FC236}">
+                <a16:creationId xmlns:a16="http://schemas.microsoft.com/office/drawing/2014/main" id="{364B7B6B-D5D4-4300-B901-C187B4D993F5}"/>
+              </a:ext>
+            </a:extLst>
+          </p:cNvPr>
+          <p:cNvSpPr txBox="1"/>
+          <p:nvPr/>
+        </p:nvSpPr>
+        <p:spPr>
+          <a:xfrm>
+            <a:off x="5278653" y="6092152"/>
+            <a:ext cx="1875933" cy="646331"/>
+          </a:xfrm>
+          <a:prstGeom prst="rect">
+            <a:avLst/>
+          </a:prstGeom>
+          <a:noFill/>
+        </p:spPr>
+        <p:txBody>
+          <a:bodyPr wrap="square" rtlCol="0">
+            <a:spAutoFit/>
+          </a:bodyPr>
+          <a:lstStyle/>
+          <a:p>
+            <a:pPr algn="ctr"/>
+            <a:r>
+              <a:rPr lang="fr-FR" dirty="0" err="1">
+                <a:solidFill>
+                  <a:schemeClr val="bg1"/>
+                </a:solidFill>
+              </a:rPr>
+              <a:t>Upload</a:t>
+            </a:r>
+            <a:r>
+              <a:rPr lang="fr-FR" dirty="0">
+                <a:solidFill>
+                  <a:schemeClr val="bg1"/>
+                </a:solidFill>
+              </a:rPr>
+              <a:t> et édition des images</a:t>
+            </a:r>
+          </a:p>
+        </p:txBody>
+      </p:sp>
+      <p:sp>
+        <p:nvSpPr>
+          <p:cNvPr id="7" name="ZoneTexte 6">
+            <a:extLst>
+              <a:ext uri="{FF2B5EF4-FFF2-40B4-BE49-F238E27FC236}">
+                <a16:creationId xmlns:a16="http://schemas.microsoft.com/office/drawing/2014/main" id="{76B62D18-7E67-472F-9494-DDCB475F612A}"/>
+              </a:ext>
+            </a:extLst>
+          </p:cNvPr>
+          <p:cNvSpPr txBox="1"/>
+          <p:nvPr/>
+        </p:nvSpPr>
+        <p:spPr>
+          <a:xfrm>
+            <a:off x="7215432" y="6092152"/>
+            <a:ext cx="1395167" cy="646331"/>
+          </a:xfrm>
+          <a:prstGeom prst="rect">
+            <a:avLst/>
+          </a:prstGeom>
+          <a:noFill/>
+        </p:spPr>
+        <p:txBody>
+          <a:bodyPr wrap="square" rtlCol="0">
+            <a:spAutoFit/>
+          </a:bodyPr>
+          <a:lstStyle/>
+          <a:p>
+            <a:pPr algn="ctr"/>
+            <a:r>
+              <a:rPr lang="fr-FR" dirty="0">
+                <a:solidFill>
+                  <a:schemeClr val="bg1"/>
+                </a:solidFill>
+              </a:rPr>
+              <a:t>Création de la carte</a:t>
+            </a:r>
+          </a:p>
+        </p:txBody>
+      </p:sp>
+      <p:sp>
+        <p:nvSpPr>
+          <p:cNvPr id="14" name="ZoneTexte 13">
+            <a:extLst>
+              <a:ext uri="{FF2B5EF4-FFF2-40B4-BE49-F238E27FC236}">
+                <a16:creationId xmlns:a16="http://schemas.microsoft.com/office/drawing/2014/main" id="{F4049530-27A8-4419-AF3F-C4C2ECC769B7}"/>
+              </a:ext>
+            </a:extLst>
+          </p:cNvPr>
+          <p:cNvSpPr txBox="1"/>
+          <p:nvPr/>
+        </p:nvSpPr>
+        <p:spPr>
+          <a:xfrm>
+            <a:off x="8733506" y="6094589"/>
+            <a:ext cx="1525177" cy="646331"/>
+          </a:xfrm>
+          <a:prstGeom prst="rect">
+            <a:avLst/>
+          </a:prstGeom>
+          <a:noFill/>
+        </p:spPr>
+        <p:txBody>
+          <a:bodyPr wrap="square" rtlCol="0">
+            <a:spAutoFit/>
+          </a:bodyPr>
+          <a:lstStyle/>
+          <a:p>
+            <a:pPr algn="ctr"/>
+            <a:r>
+              <a:rPr lang="fr-FR" dirty="0">
+                <a:solidFill>
+                  <a:schemeClr val="bg1"/>
+                </a:solidFill>
+              </a:rPr>
+              <a:t>Sauvegarde du panorama</a:t>
+            </a:r>
           </a:p>
         </p:txBody>
       </p:sp>

</xml_diff>

<commit_message>
update des diagrammes sur la slide
</commit_message>
<xml_diff>
--- a/Soutenance/Diaporama soutenance.pptx
+++ b/Soutenance/Diaporama soutenance.pptx
@@ -4096,8 +4096,8 @@
         </p:blipFill>
         <p:spPr>
           <a:xfrm>
-            <a:off x="2295829" y="1741479"/>
-            <a:ext cx="7611915" cy="4131783"/>
+            <a:off x="2093269" y="1641466"/>
+            <a:ext cx="8005455" cy="4450504"/>
           </a:xfrm>
           <a:prstGeom prst="rect">
             <a:avLst/>
@@ -4442,8 +4442,16 @@
       </p:sp>
       <p:pic>
         <p:nvPicPr>
-          <p:cNvPr id="7" name="Image 6"/>
-          <p:cNvPicPr/>
+          <p:cNvPr id="3" name="Image 2">
+            <a:extLst>
+              <a:ext uri="{FF2B5EF4-FFF2-40B4-BE49-F238E27FC236}">
+                <a16:creationId xmlns:a16="http://schemas.microsoft.com/office/drawing/2014/main" id="{006135B2-1B39-422F-9F18-1AEED88427C4}"/>
+              </a:ext>
+            </a:extLst>
+          </p:cNvPr>
+          <p:cNvPicPr>
+            <a:picLocks noChangeAspect="1"/>
+          </p:cNvPicPr>
           <p:nvPr/>
         </p:nvPicPr>
         <p:blipFill>
@@ -4454,8 +4462,8 @@
         </p:blipFill>
         <p:spPr>
           <a:xfrm>
-            <a:off x="2838306" y="1559283"/>
-            <a:ext cx="6907578" cy="4450504"/>
+            <a:off x="1976985" y="1443522"/>
+            <a:ext cx="8238023" cy="4821730"/>
           </a:xfrm>
           <a:prstGeom prst="rect">
             <a:avLst/>
@@ -7873,9 +7881,49 @@
           </a:p>
         </p:txBody>
       </p:sp>
+      <p:sp>
+        <p:nvSpPr>
+          <p:cNvPr id="12" name="ZoneTexte 11"/>
+          <p:cNvSpPr txBox="1"/>
+          <p:nvPr/>
+        </p:nvSpPr>
+        <p:spPr>
+          <a:xfrm>
+            <a:off x="1902289" y="6174154"/>
+            <a:ext cx="8387419" cy="382954"/>
+          </a:xfrm>
+          <a:prstGeom prst="rect">
+            <a:avLst/>
+          </a:prstGeom>
+          <a:noFill/>
+        </p:spPr>
+        <p:txBody>
+          <a:bodyPr wrap="square" rtlCol="0">
+            <a:spAutoFit/>
+          </a:bodyPr>
+          <a:lstStyle/>
+          <a:p>
+            <a:pPr algn="ctr"/>
+            <a:r>
+              <a:rPr lang="fr-FR" i="1" dirty="0">
+                <a:solidFill>
+                  <a:schemeClr val="bg1"/>
+                </a:solidFill>
+              </a:rPr>
+              <a:t>Diagramme de cas d’utilisation</a:t>
+            </a:r>
+          </a:p>
+        </p:txBody>
+      </p:sp>
       <p:pic>
         <p:nvPicPr>
-          <p:cNvPr id="10" name="Image 9"/>
+          <p:cNvPr id="3" name="Image 2">
+            <a:extLst>
+              <a:ext uri="{FF2B5EF4-FFF2-40B4-BE49-F238E27FC236}">
+                <a16:creationId xmlns:a16="http://schemas.microsoft.com/office/drawing/2014/main" id="{D3E84F70-197A-4564-AEAC-B09C525E4E3C}"/>
+              </a:ext>
+            </a:extLst>
+          </p:cNvPr>
           <p:cNvPicPr>
             <a:picLocks noChangeAspect="1"/>
           </p:cNvPicPr>
@@ -7889,48 +7937,14 @@
         </p:blipFill>
         <p:spPr>
           <a:xfrm>
-            <a:off x="1902290" y="2057452"/>
-            <a:ext cx="8387419" cy="4044996"/>
+            <a:off x="1430858" y="1670190"/>
+            <a:ext cx="9330280" cy="4503964"/>
           </a:xfrm>
           <a:prstGeom prst="rect">
             <a:avLst/>
           </a:prstGeom>
         </p:spPr>
       </p:pic>
-      <p:sp>
-        <p:nvSpPr>
-          <p:cNvPr id="12" name="ZoneTexte 11"/>
-          <p:cNvSpPr txBox="1"/>
-          <p:nvPr/>
-        </p:nvSpPr>
-        <p:spPr>
-          <a:xfrm>
-            <a:off x="1902289" y="6174154"/>
-            <a:ext cx="8387419" cy="382954"/>
-          </a:xfrm>
-          <a:prstGeom prst="rect">
-            <a:avLst/>
-          </a:prstGeom>
-          <a:noFill/>
-        </p:spPr>
-        <p:txBody>
-          <a:bodyPr wrap="square" rtlCol="0">
-            <a:spAutoFit/>
-          </a:bodyPr>
-          <a:lstStyle/>
-          <a:p>
-            <a:pPr algn="ctr"/>
-            <a:r>
-              <a:rPr lang="fr-FR" i="1" dirty="0">
-                <a:solidFill>
-                  <a:schemeClr val="bg1"/>
-                </a:solidFill>
-              </a:rPr>
-              <a:t>Diagramme de cas d’utilisation</a:t>
-            </a:r>
-          </a:p>
-        </p:txBody>
-      </p:sp>
     </p:spTree>
     <p:extLst>
       <p:ext uri="{BB962C8B-B14F-4D97-AF65-F5344CB8AC3E}">

</xml_diff>